<commit_message>
msg & channel implement
</commit_message>
<xml_diff>
--- a/docs.pptx
+++ b/docs.pptx
@@ -5,10 +5,10 @@
     <p:sldMasterId id="2147483648" r:id="rId1"/>
   </p:sldMasterIdLst>
   <p:notesMasterIdLst>
-    <p:notesMasterId r:id="rId33"/>
+    <p:notesMasterId r:id="rId35"/>
   </p:notesMasterIdLst>
   <p:handoutMasterIdLst>
-    <p:handoutMasterId r:id="rId34"/>
+    <p:handoutMasterId r:id="rId36"/>
   </p:handoutMasterIdLst>
   <p:sldIdLst>
     <p:sldId id="256" r:id="rId2"/>
@@ -31,17 +31,19 @@
     <p:sldId id="273" r:id="rId19"/>
     <p:sldId id="274" r:id="rId20"/>
     <p:sldId id="275" r:id="rId21"/>
-    <p:sldId id="276" r:id="rId22"/>
-    <p:sldId id="278" r:id="rId23"/>
-    <p:sldId id="280" r:id="rId24"/>
-    <p:sldId id="281" r:id="rId25"/>
-    <p:sldId id="286" r:id="rId26"/>
-    <p:sldId id="288" r:id="rId27"/>
-    <p:sldId id="287" r:id="rId28"/>
-    <p:sldId id="282" r:id="rId29"/>
-    <p:sldId id="285" r:id="rId30"/>
-    <p:sldId id="289" r:id="rId31"/>
-    <p:sldId id="277" r:id="rId32"/>
+    <p:sldId id="291" r:id="rId22"/>
+    <p:sldId id="276" r:id="rId23"/>
+    <p:sldId id="278" r:id="rId24"/>
+    <p:sldId id="280" r:id="rId25"/>
+    <p:sldId id="281" r:id="rId26"/>
+    <p:sldId id="286" r:id="rId27"/>
+    <p:sldId id="288" r:id="rId28"/>
+    <p:sldId id="287" r:id="rId29"/>
+    <p:sldId id="282" r:id="rId30"/>
+    <p:sldId id="285" r:id="rId31"/>
+    <p:sldId id="290" r:id="rId32"/>
+    <p:sldId id="289" r:id="rId33"/>
+    <p:sldId id="277" r:id="rId34"/>
   </p:sldIdLst>
   <p:sldSz cx="12192000" cy="6858000"/>
   <p:notesSz cx="6858000" cy="9144000"/>
@@ -4154,7 +4156,7 @@
     </p:spTree>
     <p:extLst>
       <p:ext uri="{BB962C8B-B14F-4D97-AF65-F5344CB8AC3E}">
-        <p14:creationId xmlns:p14="http://schemas.microsoft.com/office/powerpoint/2010/main" val="1996568888"/>
+        <p14:creationId xmlns:p14="http://schemas.microsoft.com/office/powerpoint/2010/main" val="2513515846"/>
       </p:ext>
     </p:extLst>
   </p:cSld>
@@ -4261,7 +4263,7 @@
     </p:spTree>
     <p:extLst>
       <p:ext uri="{BB962C8B-B14F-4D97-AF65-F5344CB8AC3E}">
-        <p14:creationId xmlns:p14="http://schemas.microsoft.com/office/powerpoint/2010/main" val="3660282832"/>
+        <p14:creationId xmlns:p14="http://schemas.microsoft.com/office/powerpoint/2010/main" val="1996568888"/>
       </p:ext>
     </p:extLst>
   </p:cSld>
@@ -4368,7 +4370,7 @@
     </p:spTree>
     <p:extLst>
       <p:ext uri="{BB962C8B-B14F-4D97-AF65-F5344CB8AC3E}">
-        <p14:creationId xmlns:p14="http://schemas.microsoft.com/office/powerpoint/2010/main" val="4139895867"/>
+        <p14:creationId xmlns:p14="http://schemas.microsoft.com/office/powerpoint/2010/main" val="3660282832"/>
       </p:ext>
     </p:extLst>
   </p:cSld>
@@ -4475,7 +4477,7 @@
     </p:spTree>
     <p:extLst>
       <p:ext uri="{BB962C8B-B14F-4D97-AF65-F5344CB8AC3E}">
-        <p14:creationId xmlns:p14="http://schemas.microsoft.com/office/powerpoint/2010/main" val="3258738097"/>
+        <p14:creationId xmlns:p14="http://schemas.microsoft.com/office/powerpoint/2010/main" val="4139895867"/>
       </p:ext>
     </p:extLst>
   </p:cSld>
@@ -4582,7 +4584,7 @@
     </p:spTree>
     <p:extLst>
       <p:ext uri="{BB962C8B-B14F-4D97-AF65-F5344CB8AC3E}">
-        <p14:creationId xmlns:p14="http://schemas.microsoft.com/office/powerpoint/2010/main" val="1903579263"/>
+        <p14:creationId xmlns:p14="http://schemas.microsoft.com/office/powerpoint/2010/main" val="3258738097"/>
       </p:ext>
     </p:extLst>
   </p:cSld>
@@ -4689,7 +4691,7 @@
     </p:spTree>
     <p:extLst>
       <p:ext uri="{BB962C8B-B14F-4D97-AF65-F5344CB8AC3E}">
-        <p14:creationId xmlns:p14="http://schemas.microsoft.com/office/powerpoint/2010/main" val="2028422299"/>
+        <p14:creationId xmlns:p14="http://schemas.microsoft.com/office/powerpoint/2010/main" val="1903579263"/>
       </p:ext>
     </p:extLst>
   </p:cSld>
@@ -4796,7 +4798,7 @@
     </p:spTree>
     <p:extLst>
       <p:ext uri="{BB962C8B-B14F-4D97-AF65-F5344CB8AC3E}">
-        <p14:creationId xmlns:p14="http://schemas.microsoft.com/office/powerpoint/2010/main" val="4024556115"/>
+        <p14:creationId xmlns:p14="http://schemas.microsoft.com/office/powerpoint/2010/main" val="2028422299"/>
       </p:ext>
     </p:extLst>
   </p:cSld>
@@ -4903,7 +4905,7 @@
     </p:spTree>
     <p:extLst>
       <p:ext uri="{BB962C8B-B14F-4D97-AF65-F5344CB8AC3E}">
-        <p14:creationId xmlns:p14="http://schemas.microsoft.com/office/powerpoint/2010/main" val="3017516162"/>
+        <p14:creationId xmlns:p14="http://schemas.microsoft.com/office/powerpoint/2010/main" val="4024556115"/>
       </p:ext>
     </p:extLst>
   </p:cSld>
@@ -4974,7 +4976,10 @@
               <a:tabLst/>
               <a:defRPr/>
             </a:pPr>
-            <a:endParaRPr lang="en-US" altLang="zh-CN" dirty="0"/>
+            <a:r>
+              <a:rPr lang="en-US" altLang="zh-CN" dirty="0"/>
+              <a:t>Channel is wrapper class for boost::socket</a:t>
+            </a:r>
           </a:p>
         </p:txBody>
       </p:sp>
@@ -5010,7 +5015,7 @@
     </p:spTree>
     <p:extLst>
       <p:ext uri="{BB962C8B-B14F-4D97-AF65-F5344CB8AC3E}">
-        <p14:creationId xmlns:p14="http://schemas.microsoft.com/office/powerpoint/2010/main" val="342683783"/>
+        <p14:creationId xmlns:p14="http://schemas.microsoft.com/office/powerpoint/2010/main" val="3017516162"/>
       </p:ext>
     </p:extLst>
   </p:cSld>
@@ -5117,7 +5122,7 @@
     </p:spTree>
     <p:extLst>
       <p:ext uri="{BB962C8B-B14F-4D97-AF65-F5344CB8AC3E}">
-        <p14:creationId xmlns:p14="http://schemas.microsoft.com/office/powerpoint/2010/main" val="2196480506"/>
+        <p14:creationId xmlns:p14="http://schemas.microsoft.com/office/powerpoint/2010/main" val="342683783"/>
       </p:ext>
     </p:extLst>
   </p:cSld>
@@ -5228,6 +5233,220 @@
 </file>
 
 <file path=ppt/notesSlides/notesSlide20.xml><?xml version="1.0" encoding="utf-8"?>
+<p:notes xmlns:a="http://schemas.openxmlformats.org/drawingml/2006/main" xmlns:r="http://schemas.openxmlformats.org/officeDocument/2006/relationships" xmlns:p="http://schemas.openxmlformats.org/presentationml/2006/main">
+  <p:cSld>
+    <p:spTree>
+      <p:nvGrpSpPr>
+        <p:cNvPr id="1" name=""/>
+        <p:cNvGrpSpPr/>
+        <p:nvPr/>
+      </p:nvGrpSpPr>
+      <p:grpSpPr>
+        <a:xfrm>
+          <a:off x="0" y="0"/>
+          <a:ext cx="0" cy="0"/>
+          <a:chOff x="0" y="0"/>
+          <a:chExt cx="0" cy="0"/>
+        </a:xfrm>
+      </p:grpSpPr>
+      <p:sp>
+        <p:nvSpPr>
+          <p:cNvPr id="2" name="Slide Image Placeholder 1"/>
+          <p:cNvSpPr>
+            <a:spLocks noGrp="1" noRot="1" noChangeAspect="1"/>
+          </p:cNvSpPr>
+          <p:nvPr>
+            <p:ph type="sldImg"/>
+          </p:nvPr>
+        </p:nvSpPr>
+        <p:spPr/>
+      </p:sp>
+      <p:sp>
+        <p:nvSpPr>
+          <p:cNvPr id="3" name="Notes Placeholder 2"/>
+          <p:cNvSpPr>
+            <a:spLocks noGrp="1"/>
+          </p:cNvSpPr>
+          <p:nvPr>
+            <p:ph type="body" idx="1"/>
+          </p:nvPr>
+        </p:nvSpPr>
+        <p:spPr/>
+        <p:txBody>
+          <a:bodyPr/>
+          <a:lstStyle/>
+          <a:p>
+            <a:pPr marL="0" marR="0" lvl="0" indent="0" algn="l" defTabSz="914400" rtl="0" eaLnBrk="1" fontAlgn="auto" latinLnBrk="0" hangingPunct="1">
+              <a:lnSpc>
+                <a:spcPct val="100000"/>
+              </a:lnSpc>
+              <a:spcBef>
+                <a:spcPts val="0"/>
+              </a:spcBef>
+              <a:spcAft>
+                <a:spcPts val="0"/>
+              </a:spcAft>
+              <a:buClrTx/>
+              <a:buSzTx/>
+              <a:buFontTx/>
+              <a:buNone/>
+              <a:tabLst/>
+              <a:defRPr/>
+            </a:pPr>
+            <a:endParaRPr lang="en-US" altLang="zh-CN" dirty="0"/>
+          </a:p>
+        </p:txBody>
+      </p:sp>
+      <p:sp>
+        <p:nvSpPr>
+          <p:cNvPr id="5" name="Header Placeholder 4">
+            <a:extLst>
+              <a:ext uri="{FF2B5EF4-FFF2-40B4-BE49-F238E27FC236}">
+                <a16:creationId xmlns:a16="http://schemas.microsoft.com/office/drawing/2014/main" id="{8B210C9E-C718-46D6-ABB0-7C4CD2082A98}"/>
+              </a:ext>
+            </a:extLst>
+          </p:cNvPr>
+          <p:cNvSpPr>
+            <a:spLocks noGrp="1"/>
+          </p:cNvSpPr>
+          <p:nvPr>
+            <p:ph type="hdr" sz="quarter" idx="10"/>
+          </p:nvPr>
+        </p:nvSpPr>
+        <p:spPr/>
+        <p:txBody>
+          <a:bodyPr/>
+          <a:lstStyle/>
+          <a:p>
+            <a:r>
+              <a:rPr lang="en-US" altLang="zh-CN"/>
+              <a:t>USE CASE</a:t>
+            </a:r>
+            <a:endParaRPr lang="zh-CN" altLang="en-US"/>
+          </a:p>
+        </p:txBody>
+      </p:sp>
+    </p:spTree>
+    <p:extLst>
+      <p:ext uri="{BB962C8B-B14F-4D97-AF65-F5344CB8AC3E}">
+        <p14:creationId xmlns:p14="http://schemas.microsoft.com/office/powerpoint/2010/main" val="1634110027"/>
+      </p:ext>
+    </p:extLst>
+  </p:cSld>
+  <p:clrMapOvr>
+    <a:masterClrMapping/>
+  </p:clrMapOvr>
+</p:notes>
+</file>
+
+<file path=ppt/notesSlides/notesSlide21.xml><?xml version="1.0" encoding="utf-8"?>
+<p:notes xmlns:a="http://schemas.openxmlformats.org/drawingml/2006/main" xmlns:r="http://schemas.openxmlformats.org/officeDocument/2006/relationships" xmlns:p="http://schemas.openxmlformats.org/presentationml/2006/main">
+  <p:cSld>
+    <p:spTree>
+      <p:nvGrpSpPr>
+        <p:cNvPr id="1" name=""/>
+        <p:cNvGrpSpPr/>
+        <p:nvPr/>
+      </p:nvGrpSpPr>
+      <p:grpSpPr>
+        <a:xfrm>
+          <a:off x="0" y="0"/>
+          <a:ext cx="0" cy="0"/>
+          <a:chOff x="0" y="0"/>
+          <a:chExt cx="0" cy="0"/>
+        </a:xfrm>
+      </p:grpSpPr>
+      <p:sp>
+        <p:nvSpPr>
+          <p:cNvPr id="2" name="Slide Image Placeholder 1"/>
+          <p:cNvSpPr>
+            <a:spLocks noGrp="1" noRot="1" noChangeAspect="1"/>
+          </p:cNvSpPr>
+          <p:nvPr>
+            <p:ph type="sldImg"/>
+          </p:nvPr>
+        </p:nvSpPr>
+        <p:spPr/>
+      </p:sp>
+      <p:sp>
+        <p:nvSpPr>
+          <p:cNvPr id="3" name="Notes Placeholder 2"/>
+          <p:cNvSpPr>
+            <a:spLocks noGrp="1"/>
+          </p:cNvSpPr>
+          <p:nvPr>
+            <p:ph type="body" idx="1"/>
+          </p:nvPr>
+        </p:nvSpPr>
+        <p:spPr/>
+        <p:txBody>
+          <a:bodyPr/>
+          <a:lstStyle/>
+          <a:p>
+            <a:pPr marL="0" marR="0" lvl="0" indent="0" algn="l" defTabSz="914400" rtl="0" eaLnBrk="1" fontAlgn="auto" latinLnBrk="0" hangingPunct="1">
+              <a:lnSpc>
+                <a:spcPct val="100000"/>
+              </a:lnSpc>
+              <a:spcBef>
+                <a:spcPts val="0"/>
+              </a:spcBef>
+              <a:spcAft>
+                <a:spcPts val="0"/>
+              </a:spcAft>
+              <a:buClrTx/>
+              <a:buSzTx/>
+              <a:buFontTx/>
+              <a:buNone/>
+              <a:tabLst/>
+              <a:defRPr/>
+            </a:pPr>
+            <a:endParaRPr lang="en-US" altLang="zh-CN" dirty="0"/>
+          </a:p>
+        </p:txBody>
+      </p:sp>
+      <p:sp>
+        <p:nvSpPr>
+          <p:cNvPr id="5" name="Header Placeholder 4">
+            <a:extLst>
+              <a:ext uri="{FF2B5EF4-FFF2-40B4-BE49-F238E27FC236}">
+                <a16:creationId xmlns:a16="http://schemas.microsoft.com/office/drawing/2014/main" id="{8B210C9E-C718-46D6-ABB0-7C4CD2082A98}"/>
+              </a:ext>
+            </a:extLst>
+          </p:cNvPr>
+          <p:cNvSpPr>
+            <a:spLocks noGrp="1"/>
+          </p:cNvSpPr>
+          <p:nvPr>
+            <p:ph type="hdr" sz="quarter" idx="10"/>
+          </p:nvPr>
+        </p:nvSpPr>
+        <p:spPr/>
+        <p:txBody>
+          <a:bodyPr/>
+          <a:lstStyle/>
+          <a:p>
+            <a:r>
+              <a:rPr lang="en-US" altLang="zh-CN"/>
+              <a:t>USE CASE</a:t>
+            </a:r>
+            <a:endParaRPr lang="zh-CN" altLang="en-US"/>
+          </a:p>
+        </p:txBody>
+      </p:sp>
+    </p:spTree>
+    <p:extLst>
+      <p:ext uri="{BB962C8B-B14F-4D97-AF65-F5344CB8AC3E}">
+        <p14:creationId xmlns:p14="http://schemas.microsoft.com/office/powerpoint/2010/main" val="2196480506"/>
+      </p:ext>
+    </p:extLst>
+  </p:cSld>
+  <p:clrMapOvr>
+    <a:masterClrMapping/>
+  </p:clrMapOvr>
+</p:notes>
+</file>
+
+<file path=ppt/notesSlides/notesSlide22.xml><?xml version="1.0" encoding="utf-8"?>
 <p:notes xmlns:a="http://schemas.openxmlformats.org/drawingml/2006/main" xmlns:r="http://schemas.openxmlformats.org/officeDocument/2006/relationships" xmlns:p="http://schemas.openxmlformats.org/presentationml/2006/main">
   <p:cSld>
     <p:spTree>
@@ -6352,7 +6571,7 @@
           <a:p>
             <a:fld id="{B2CAF260-C6E5-43C1-AB7D-1DDC31487812}" type="datetime1">
               <a:rPr lang="zh-CN" altLang="en-US" smtClean="0"/>
-              <a:t>2018/10/6</a:t>
+              <a:t>2018/10/7</a:t>
             </a:fld>
             <a:endParaRPr lang="zh-CN" altLang="en-US"/>
           </a:p>
@@ -6552,7 +6771,7 @@
           <a:p>
             <a:fld id="{E2FDE29B-B267-43B7-911F-8B7B5178DAAA}" type="datetime1">
               <a:rPr lang="zh-CN" altLang="en-US" smtClean="0"/>
-              <a:t>2018/10/6</a:t>
+              <a:t>2018/10/7</a:t>
             </a:fld>
             <a:endParaRPr lang="zh-CN" altLang="en-US"/>
           </a:p>
@@ -6762,7 +6981,7 @@
           <a:p>
             <a:fld id="{58F69AEE-EBB5-4094-A036-258B6CD5A691}" type="datetime1">
               <a:rPr lang="zh-CN" altLang="en-US" smtClean="0"/>
-              <a:t>2018/10/6</a:t>
+              <a:t>2018/10/7</a:t>
             </a:fld>
             <a:endParaRPr lang="zh-CN" altLang="en-US"/>
           </a:p>
@@ -6962,7 +7181,7 @@
           <a:p>
             <a:fld id="{EA0C55B6-15F8-47F2-BA17-6667D0884E94}" type="datetime1">
               <a:rPr lang="zh-CN" altLang="en-US" smtClean="0"/>
-              <a:t>2018/10/6</a:t>
+              <a:t>2018/10/7</a:t>
             </a:fld>
             <a:endParaRPr lang="zh-CN" altLang="en-US"/>
           </a:p>
@@ -7238,7 +7457,7 @@
           <a:p>
             <a:fld id="{E16475AB-DF1D-43B5-9314-A34969FDFCF1}" type="datetime1">
               <a:rPr lang="zh-CN" altLang="en-US" smtClean="0"/>
-              <a:t>2018/10/6</a:t>
+              <a:t>2018/10/7</a:t>
             </a:fld>
             <a:endParaRPr lang="zh-CN" altLang="en-US"/>
           </a:p>
@@ -7506,7 +7725,7 @@
           <a:p>
             <a:fld id="{3767A592-7E27-4E7D-A9C7-3B15B36FAD3A}" type="datetime1">
               <a:rPr lang="zh-CN" altLang="en-US" smtClean="0"/>
-              <a:t>2018/10/6</a:t>
+              <a:t>2018/10/7</a:t>
             </a:fld>
             <a:endParaRPr lang="zh-CN" altLang="en-US"/>
           </a:p>
@@ -7921,7 +8140,7 @@
           <a:p>
             <a:fld id="{7901F99E-C60E-4183-B8FD-840AF5CE3B57}" type="datetime1">
               <a:rPr lang="zh-CN" altLang="en-US" smtClean="0"/>
-              <a:t>2018/10/6</a:t>
+              <a:t>2018/10/7</a:t>
             </a:fld>
             <a:endParaRPr lang="zh-CN" altLang="en-US"/>
           </a:p>
@@ -8063,7 +8282,7 @@
           <a:p>
             <a:fld id="{7B195C80-D524-46BD-98B6-BA22A34855F7}" type="datetime1">
               <a:rPr lang="zh-CN" altLang="en-US" smtClean="0"/>
-              <a:t>2018/10/6</a:t>
+              <a:t>2018/10/7</a:t>
             </a:fld>
             <a:endParaRPr lang="zh-CN" altLang="en-US"/>
           </a:p>
@@ -8176,7 +8395,7 @@
           <a:p>
             <a:fld id="{B58FE623-1036-4545-9983-CC7ABA14B150}" type="datetime1">
               <a:rPr lang="zh-CN" altLang="en-US" smtClean="0"/>
-              <a:t>2018/10/6</a:t>
+              <a:t>2018/10/7</a:t>
             </a:fld>
             <a:endParaRPr lang="zh-CN" altLang="en-US"/>
           </a:p>
@@ -8489,7 +8708,7 @@
           <a:p>
             <a:fld id="{CA65BC31-ADFA-4939-ADF1-A57605AB2556}" type="datetime1">
               <a:rPr lang="zh-CN" altLang="en-US" smtClean="0"/>
-              <a:t>2018/10/6</a:t>
+              <a:t>2018/10/7</a:t>
             </a:fld>
             <a:endParaRPr lang="zh-CN" altLang="en-US"/>
           </a:p>
@@ -8778,7 +8997,7 @@
           <a:p>
             <a:fld id="{40F03ED0-6E5F-48BB-90A8-AD1EC3E9AF09}" type="datetime1">
               <a:rPr lang="zh-CN" altLang="en-US" smtClean="0"/>
-              <a:t>2018/10/6</a:t>
+              <a:t>2018/10/7</a:t>
             </a:fld>
             <a:endParaRPr lang="zh-CN" altLang="en-US"/>
           </a:p>
@@ -9021,7 +9240,7 @@
           <a:p>
             <a:fld id="{7BE51BE7-2DB2-422B-A0F1-EEC574E16519}" type="datetime1">
               <a:rPr lang="zh-CN" altLang="en-US" smtClean="0"/>
-              <a:t>2018/10/6</a:t>
+              <a:t>2018/10/7</a:t>
             </a:fld>
             <a:endParaRPr lang="zh-CN" altLang="en-US"/>
           </a:p>
@@ -17207,6 +17426,713 @@
       </p:grpSpPr>
       <p:sp>
         <p:nvSpPr>
+          <p:cNvPr id="16" name="Rectangle: Rounded Corners 15">
+            <a:extLst>
+              <a:ext uri="{FF2B5EF4-FFF2-40B4-BE49-F238E27FC236}">
+                <a16:creationId xmlns:a16="http://schemas.microsoft.com/office/drawing/2014/main" id="{43BAC5D7-1969-4E9C-BDF9-56E4D6245033}"/>
+              </a:ext>
+            </a:extLst>
+          </p:cNvPr>
+          <p:cNvSpPr/>
+          <p:nvPr/>
+        </p:nvSpPr>
+        <p:spPr>
+          <a:xfrm>
+            <a:off x="226509" y="1708273"/>
+            <a:ext cx="3223952" cy="334985"/>
+          </a:xfrm>
+          <a:prstGeom prst="roundRect">
+            <a:avLst/>
+          </a:prstGeom>
+          <a:solidFill>
+            <a:schemeClr val="accent3">
+              <a:lumMod val="60000"/>
+              <a:lumOff val="40000"/>
+            </a:schemeClr>
+          </a:solidFill>
+          <a:ln>
+            <a:solidFill>
+              <a:schemeClr val="accent3">
+                <a:lumMod val="20000"/>
+                <a:lumOff val="80000"/>
+              </a:schemeClr>
+            </a:solidFill>
+          </a:ln>
+        </p:spPr>
+        <p:style>
+          <a:lnRef idx="2">
+            <a:schemeClr val="accent1">
+              <a:shade val="50000"/>
+            </a:schemeClr>
+          </a:lnRef>
+          <a:fillRef idx="1">
+            <a:schemeClr val="accent1"/>
+          </a:fillRef>
+          <a:effectRef idx="0">
+            <a:schemeClr val="accent1"/>
+          </a:effectRef>
+          <a:fontRef idx="minor">
+            <a:schemeClr val="lt1"/>
+          </a:fontRef>
+        </p:style>
+        <p:txBody>
+          <a:bodyPr rtlCol="0" anchor="ctr"/>
+          <a:lstStyle/>
+          <a:p>
+            <a:pPr algn="ctr"/>
+            <a:r>
+              <a:rPr lang="en-US" altLang="zh-CN" sz="1400" dirty="0">
+                <a:latin typeface="Arial Black" panose="020B0A04020102020204" pitchFamily="34" charset="0"/>
+              </a:rPr>
+              <a:t>member variable</a:t>
+            </a:r>
+            <a:endParaRPr lang="zh-CN" altLang="en-US" sz="1400" dirty="0">
+              <a:latin typeface="Arial Black" panose="020B0A04020102020204" pitchFamily="34" charset="0"/>
+            </a:endParaRPr>
+          </a:p>
+        </p:txBody>
+      </p:sp>
+      <p:sp>
+        <p:nvSpPr>
+          <p:cNvPr id="17" name="Rectangle: Rounded Corners 16">
+            <a:extLst>
+              <a:ext uri="{FF2B5EF4-FFF2-40B4-BE49-F238E27FC236}">
+                <a16:creationId xmlns:a16="http://schemas.microsoft.com/office/drawing/2014/main" id="{EB938B34-8AED-4ED3-BAB9-C363B9203B77}"/>
+              </a:ext>
+            </a:extLst>
+          </p:cNvPr>
+          <p:cNvSpPr/>
+          <p:nvPr/>
+        </p:nvSpPr>
+        <p:spPr>
+          <a:xfrm>
+            <a:off x="226507" y="2324598"/>
+            <a:ext cx="3223954" cy="334986"/>
+          </a:xfrm>
+          <a:prstGeom prst="roundRect">
+            <a:avLst/>
+          </a:prstGeom>
+          <a:solidFill>
+            <a:schemeClr val="accent6">
+              <a:lumMod val="60000"/>
+              <a:lumOff val="40000"/>
+            </a:schemeClr>
+          </a:solidFill>
+          <a:ln>
+            <a:solidFill>
+              <a:schemeClr val="accent3">
+                <a:lumMod val="20000"/>
+                <a:lumOff val="80000"/>
+              </a:schemeClr>
+            </a:solidFill>
+          </a:ln>
+        </p:spPr>
+        <p:style>
+          <a:lnRef idx="2">
+            <a:schemeClr val="accent1">
+              <a:shade val="50000"/>
+            </a:schemeClr>
+          </a:lnRef>
+          <a:fillRef idx="1">
+            <a:schemeClr val="accent1"/>
+          </a:fillRef>
+          <a:effectRef idx="0">
+            <a:schemeClr val="accent1"/>
+          </a:effectRef>
+          <a:fontRef idx="minor">
+            <a:schemeClr val="lt1"/>
+          </a:fontRef>
+        </p:style>
+        <p:txBody>
+          <a:bodyPr rtlCol="0" anchor="ctr"/>
+          <a:lstStyle/>
+          <a:p>
+            <a:pPr algn="ctr"/>
+            <a:r>
+              <a:rPr lang="en-US" altLang="zh-CN" sz="1400" dirty="0">
+                <a:latin typeface="Arial Black" panose="020B0A04020102020204" pitchFamily="34" charset="0"/>
+              </a:rPr>
+              <a:t>member method</a:t>
+            </a:r>
+            <a:endParaRPr lang="zh-CN" altLang="en-US" sz="1400" dirty="0">
+              <a:latin typeface="Arial Black" panose="020B0A04020102020204" pitchFamily="34" charset="0"/>
+            </a:endParaRPr>
+          </a:p>
+        </p:txBody>
+      </p:sp>
+      <p:sp>
+        <p:nvSpPr>
+          <p:cNvPr id="18" name="Rectangle: Rounded Corners 17">
+            <a:extLst>
+              <a:ext uri="{FF2B5EF4-FFF2-40B4-BE49-F238E27FC236}">
+                <a16:creationId xmlns:a16="http://schemas.microsoft.com/office/drawing/2014/main" id="{09171126-D777-4F80-8CAE-E25C1C58C0FE}"/>
+              </a:ext>
+            </a:extLst>
+          </p:cNvPr>
+          <p:cNvSpPr/>
+          <p:nvPr/>
+        </p:nvSpPr>
+        <p:spPr>
+          <a:xfrm>
+            <a:off x="226507" y="2829691"/>
+            <a:ext cx="3223954" cy="334986"/>
+          </a:xfrm>
+          <a:prstGeom prst="roundRect">
+            <a:avLst/>
+          </a:prstGeom>
+          <a:solidFill>
+            <a:schemeClr val="accent6">
+              <a:lumMod val="60000"/>
+              <a:lumOff val="40000"/>
+            </a:schemeClr>
+          </a:solidFill>
+          <a:ln>
+            <a:solidFill>
+              <a:srgbClr val="00B0F0"/>
+            </a:solidFill>
+            <a:prstDash val="dash"/>
+          </a:ln>
+        </p:spPr>
+        <p:style>
+          <a:lnRef idx="2">
+            <a:schemeClr val="accent1">
+              <a:shade val="50000"/>
+            </a:schemeClr>
+          </a:lnRef>
+          <a:fillRef idx="1">
+            <a:schemeClr val="accent1"/>
+          </a:fillRef>
+          <a:effectRef idx="0">
+            <a:schemeClr val="accent1"/>
+          </a:effectRef>
+          <a:fontRef idx="minor">
+            <a:schemeClr val="lt1"/>
+          </a:fontRef>
+        </p:style>
+        <p:txBody>
+          <a:bodyPr rtlCol="0" anchor="ctr"/>
+          <a:lstStyle/>
+          <a:p>
+            <a:pPr algn="ctr"/>
+            <a:r>
+              <a:rPr lang="en-US" altLang="zh-CN" sz="1400" dirty="0">
+                <a:latin typeface="Arial Black" panose="020B0A04020102020204" pitchFamily="34" charset="0"/>
+              </a:rPr>
+              <a:t>virtual member method</a:t>
+            </a:r>
+            <a:endParaRPr lang="zh-CN" altLang="en-US" sz="1400" dirty="0">
+              <a:latin typeface="Arial Black" panose="020B0A04020102020204" pitchFamily="34" charset="0"/>
+            </a:endParaRPr>
+          </a:p>
+        </p:txBody>
+      </p:sp>
+      <p:sp>
+        <p:nvSpPr>
+          <p:cNvPr id="19" name="Rectangle: Rounded Corners 18">
+            <a:extLst>
+              <a:ext uri="{FF2B5EF4-FFF2-40B4-BE49-F238E27FC236}">
+                <a16:creationId xmlns:a16="http://schemas.microsoft.com/office/drawing/2014/main" id="{CFA61152-4475-4094-8B49-C0157A91E546}"/>
+              </a:ext>
+            </a:extLst>
+          </p:cNvPr>
+          <p:cNvSpPr/>
+          <p:nvPr/>
+        </p:nvSpPr>
+        <p:spPr>
+          <a:xfrm>
+            <a:off x="3703134" y="1737067"/>
+            <a:ext cx="3223952" cy="334985"/>
+          </a:xfrm>
+          <a:prstGeom prst="roundRect">
+            <a:avLst/>
+          </a:prstGeom>
+          <a:solidFill>
+            <a:schemeClr val="accent3">
+              <a:lumMod val="60000"/>
+              <a:lumOff val="40000"/>
+            </a:schemeClr>
+          </a:solidFill>
+          <a:ln>
+            <a:solidFill>
+              <a:srgbClr val="FF0000"/>
+            </a:solidFill>
+            <a:prstDash val="dash"/>
+          </a:ln>
+        </p:spPr>
+        <p:style>
+          <a:lnRef idx="2">
+            <a:schemeClr val="accent1">
+              <a:shade val="50000"/>
+            </a:schemeClr>
+          </a:lnRef>
+          <a:fillRef idx="1">
+            <a:schemeClr val="accent1"/>
+          </a:fillRef>
+          <a:effectRef idx="0">
+            <a:schemeClr val="accent1"/>
+          </a:effectRef>
+          <a:fontRef idx="minor">
+            <a:schemeClr val="lt1"/>
+          </a:fontRef>
+        </p:style>
+        <p:txBody>
+          <a:bodyPr rtlCol="0" anchor="ctr"/>
+          <a:lstStyle/>
+          <a:p>
+            <a:pPr algn="ctr"/>
+            <a:r>
+              <a:rPr lang="en-US" altLang="zh-CN" sz="1400" dirty="0">
+                <a:latin typeface="Arial Black" panose="020B0A04020102020204" pitchFamily="34" charset="0"/>
+              </a:rPr>
+              <a:t>static member variable</a:t>
+            </a:r>
+            <a:endParaRPr lang="zh-CN" altLang="en-US" sz="1400" dirty="0">
+              <a:latin typeface="Arial Black" panose="020B0A04020102020204" pitchFamily="34" charset="0"/>
+            </a:endParaRPr>
+          </a:p>
+        </p:txBody>
+      </p:sp>
+      <p:sp>
+        <p:nvSpPr>
+          <p:cNvPr id="20" name="Rectangle: Rounded Corners 19">
+            <a:extLst>
+              <a:ext uri="{FF2B5EF4-FFF2-40B4-BE49-F238E27FC236}">
+                <a16:creationId xmlns:a16="http://schemas.microsoft.com/office/drawing/2014/main" id="{99260C9B-B652-445A-8A68-EAFA95A93531}"/>
+              </a:ext>
+            </a:extLst>
+          </p:cNvPr>
+          <p:cNvSpPr/>
+          <p:nvPr/>
+        </p:nvSpPr>
+        <p:spPr>
+          <a:xfrm>
+            <a:off x="3703132" y="2324598"/>
+            <a:ext cx="3223954" cy="334986"/>
+          </a:xfrm>
+          <a:prstGeom prst="roundRect">
+            <a:avLst/>
+          </a:prstGeom>
+          <a:solidFill>
+            <a:schemeClr val="accent6">
+              <a:lumMod val="60000"/>
+              <a:lumOff val="40000"/>
+            </a:schemeClr>
+          </a:solidFill>
+          <a:ln>
+            <a:solidFill>
+              <a:srgbClr val="FF0000"/>
+            </a:solidFill>
+            <a:prstDash val="dash"/>
+          </a:ln>
+        </p:spPr>
+        <p:style>
+          <a:lnRef idx="2">
+            <a:schemeClr val="accent1">
+              <a:shade val="50000"/>
+            </a:schemeClr>
+          </a:lnRef>
+          <a:fillRef idx="1">
+            <a:schemeClr val="accent1"/>
+          </a:fillRef>
+          <a:effectRef idx="0">
+            <a:schemeClr val="accent1"/>
+          </a:effectRef>
+          <a:fontRef idx="minor">
+            <a:schemeClr val="lt1"/>
+          </a:fontRef>
+        </p:style>
+        <p:txBody>
+          <a:bodyPr rtlCol="0" anchor="ctr"/>
+          <a:lstStyle/>
+          <a:p>
+            <a:pPr algn="ctr"/>
+            <a:r>
+              <a:rPr lang="en-US" altLang="zh-CN" sz="1400" dirty="0">
+                <a:latin typeface="Arial Black" panose="020B0A04020102020204" pitchFamily="34" charset="0"/>
+              </a:rPr>
+              <a:t>static member method</a:t>
+            </a:r>
+            <a:endParaRPr lang="zh-CN" altLang="en-US" sz="1400" dirty="0">
+              <a:latin typeface="Arial Black" panose="020B0A04020102020204" pitchFamily="34" charset="0"/>
+            </a:endParaRPr>
+          </a:p>
+        </p:txBody>
+      </p:sp>
+      <p:sp>
+        <p:nvSpPr>
+          <p:cNvPr id="22" name="Rectangle: Rounded Corners 21">
+            <a:extLst>
+              <a:ext uri="{FF2B5EF4-FFF2-40B4-BE49-F238E27FC236}">
+                <a16:creationId xmlns:a16="http://schemas.microsoft.com/office/drawing/2014/main" id="{F693C7C4-BAE8-4C7B-8F25-0E09EA15B385}"/>
+              </a:ext>
+            </a:extLst>
+          </p:cNvPr>
+          <p:cNvSpPr/>
+          <p:nvPr/>
+        </p:nvSpPr>
+        <p:spPr>
+          <a:xfrm>
+            <a:off x="3703132" y="2829691"/>
+            <a:ext cx="3223954" cy="334986"/>
+          </a:xfrm>
+          <a:prstGeom prst="roundRect">
+            <a:avLst/>
+          </a:prstGeom>
+          <a:solidFill>
+            <a:schemeClr val="accent6">
+              <a:lumMod val="50000"/>
+            </a:schemeClr>
+          </a:solidFill>
+          <a:ln>
+            <a:solidFill>
+              <a:schemeClr val="accent6">
+                <a:lumMod val="50000"/>
+              </a:schemeClr>
+            </a:solidFill>
+            <a:prstDash val="dash"/>
+          </a:ln>
+        </p:spPr>
+        <p:style>
+          <a:lnRef idx="2">
+            <a:schemeClr val="accent1">
+              <a:shade val="50000"/>
+            </a:schemeClr>
+          </a:lnRef>
+          <a:fillRef idx="1">
+            <a:schemeClr val="accent1"/>
+          </a:fillRef>
+          <a:effectRef idx="0">
+            <a:schemeClr val="accent1"/>
+          </a:effectRef>
+          <a:fontRef idx="minor">
+            <a:schemeClr val="lt1"/>
+          </a:fontRef>
+        </p:style>
+        <p:txBody>
+          <a:bodyPr rtlCol="0" anchor="ctr"/>
+          <a:lstStyle/>
+          <a:p>
+            <a:pPr algn="ctr"/>
+            <a:r>
+              <a:rPr lang="en-US" altLang="zh-CN" sz="1400" dirty="0">
+                <a:latin typeface="Arial Black" panose="020B0A04020102020204" pitchFamily="34" charset="0"/>
+              </a:rPr>
+              <a:t>pure virtual member method</a:t>
+            </a:r>
+            <a:endParaRPr lang="zh-CN" altLang="en-US" sz="1400" dirty="0">
+              <a:latin typeface="Arial Black" panose="020B0A04020102020204" pitchFamily="34" charset="0"/>
+            </a:endParaRPr>
+          </a:p>
+        </p:txBody>
+      </p:sp>
+      <p:sp>
+        <p:nvSpPr>
+          <p:cNvPr id="23" name="Rectangle: Rounded Corners 22">
+            <a:extLst>
+              <a:ext uri="{FF2B5EF4-FFF2-40B4-BE49-F238E27FC236}">
+                <a16:creationId xmlns:a16="http://schemas.microsoft.com/office/drawing/2014/main" id="{ABE5A44F-81B8-426F-ADAF-5E77186C8585}"/>
+              </a:ext>
+            </a:extLst>
+          </p:cNvPr>
+          <p:cNvSpPr/>
+          <p:nvPr/>
+        </p:nvSpPr>
+        <p:spPr>
+          <a:xfrm>
+            <a:off x="479179" y="231208"/>
+            <a:ext cx="1435345" cy="334985"/>
+          </a:xfrm>
+          <a:prstGeom prst="roundRect">
+            <a:avLst/>
+          </a:prstGeom>
+          <a:solidFill>
+            <a:schemeClr val="accent3">
+              <a:lumMod val="60000"/>
+              <a:lumOff val="40000"/>
+            </a:schemeClr>
+          </a:solidFill>
+          <a:ln>
+            <a:solidFill>
+              <a:schemeClr val="accent3">
+                <a:lumMod val="20000"/>
+                <a:lumOff val="80000"/>
+              </a:schemeClr>
+            </a:solidFill>
+          </a:ln>
+        </p:spPr>
+        <p:style>
+          <a:lnRef idx="2">
+            <a:schemeClr val="accent1">
+              <a:shade val="50000"/>
+            </a:schemeClr>
+          </a:lnRef>
+          <a:fillRef idx="1">
+            <a:schemeClr val="accent1"/>
+          </a:fillRef>
+          <a:effectRef idx="0">
+            <a:schemeClr val="accent1"/>
+          </a:effectRef>
+          <a:fontRef idx="minor">
+            <a:schemeClr val="lt1"/>
+          </a:fontRef>
+        </p:style>
+        <p:txBody>
+          <a:bodyPr rtlCol="0" anchor="ctr"/>
+          <a:lstStyle/>
+          <a:p>
+            <a:r>
+              <a:rPr lang="en-US" altLang="zh-CN" sz="1400" dirty="0">
+                <a:latin typeface="Arial Black" panose="020B0A04020102020204" pitchFamily="34" charset="0"/>
+              </a:rPr>
+              <a:t>+: public</a:t>
+            </a:r>
+            <a:endParaRPr lang="zh-CN" altLang="en-US" sz="1400" dirty="0">
+              <a:latin typeface="Arial Black" panose="020B0A04020102020204" pitchFamily="34" charset="0"/>
+            </a:endParaRPr>
+          </a:p>
+        </p:txBody>
+      </p:sp>
+      <p:sp>
+        <p:nvSpPr>
+          <p:cNvPr id="24" name="Rectangle: Rounded Corners 23">
+            <a:extLst>
+              <a:ext uri="{FF2B5EF4-FFF2-40B4-BE49-F238E27FC236}">
+                <a16:creationId xmlns:a16="http://schemas.microsoft.com/office/drawing/2014/main" id="{487F9120-D61D-494F-AC39-8EFA5771A205}"/>
+              </a:ext>
+            </a:extLst>
+          </p:cNvPr>
+          <p:cNvSpPr/>
+          <p:nvPr/>
+        </p:nvSpPr>
+        <p:spPr>
+          <a:xfrm>
+            <a:off x="488704" y="636704"/>
+            <a:ext cx="1425819" cy="334985"/>
+          </a:xfrm>
+          <a:prstGeom prst="roundRect">
+            <a:avLst/>
+          </a:prstGeom>
+          <a:solidFill>
+            <a:schemeClr val="accent3">
+              <a:lumMod val="60000"/>
+              <a:lumOff val="40000"/>
+            </a:schemeClr>
+          </a:solidFill>
+          <a:ln>
+            <a:solidFill>
+              <a:schemeClr val="accent3">
+                <a:lumMod val="20000"/>
+                <a:lumOff val="80000"/>
+              </a:schemeClr>
+            </a:solidFill>
+          </a:ln>
+        </p:spPr>
+        <p:style>
+          <a:lnRef idx="2">
+            <a:schemeClr val="accent1">
+              <a:shade val="50000"/>
+            </a:schemeClr>
+          </a:lnRef>
+          <a:fillRef idx="1">
+            <a:schemeClr val="accent1"/>
+          </a:fillRef>
+          <a:effectRef idx="0">
+            <a:schemeClr val="accent1"/>
+          </a:effectRef>
+          <a:fontRef idx="minor">
+            <a:schemeClr val="lt1"/>
+          </a:fontRef>
+        </p:style>
+        <p:txBody>
+          <a:bodyPr rtlCol="0" anchor="ctr"/>
+          <a:lstStyle/>
+          <a:p>
+            <a:r>
+              <a:rPr lang="en-US" altLang="zh-CN" sz="1400" dirty="0">
+                <a:latin typeface="Arial Black" panose="020B0A04020102020204" pitchFamily="34" charset="0"/>
+              </a:rPr>
+              <a:t>-: private</a:t>
+            </a:r>
+            <a:endParaRPr lang="zh-CN" altLang="en-US" sz="1400" dirty="0">
+              <a:latin typeface="Arial Black" panose="020B0A04020102020204" pitchFamily="34" charset="0"/>
+            </a:endParaRPr>
+          </a:p>
+        </p:txBody>
+      </p:sp>
+      <p:sp>
+        <p:nvSpPr>
+          <p:cNvPr id="25" name="Rectangle: Rounded Corners 24">
+            <a:extLst>
+              <a:ext uri="{FF2B5EF4-FFF2-40B4-BE49-F238E27FC236}">
+                <a16:creationId xmlns:a16="http://schemas.microsoft.com/office/drawing/2014/main" id="{ECFBC9E4-394F-4728-97ED-8C03CA22E060}"/>
+              </a:ext>
+            </a:extLst>
+          </p:cNvPr>
+          <p:cNvSpPr/>
+          <p:nvPr/>
+        </p:nvSpPr>
+        <p:spPr>
+          <a:xfrm>
+            <a:off x="479179" y="1091948"/>
+            <a:ext cx="1425818" cy="334985"/>
+          </a:xfrm>
+          <a:prstGeom prst="roundRect">
+            <a:avLst/>
+          </a:prstGeom>
+          <a:solidFill>
+            <a:schemeClr val="accent3">
+              <a:lumMod val="60000"/>
+              <a:lumOff val="40000"/>
+            </a:schemeClr>
+          </a:solidFill>
+          <a:ln>
+            <a:solidFill>
+              <a:schemeClr val="accent3">
+                <a:lumMod val="20000"/>
+                <a:lumOff val="80000"/>
+              </a:schemeClr>
+            </a:solidFill>
+          </a:ln>
+        </p:spPr>
+        <p:style>
+          <a:lnRef idx="2">
+            <a:schemeClr val="accent1">
+              <a:shade val="50000"/>
+            </a:schemeClr>
+          </a:lnRef>
+          <a:fillRef idx="1">
+            <a:schemeClr val="accent1"/>
+          </a:fillRef>
+          <a:effectRef idx="0">
+            <a:schemeClr val="accent1"/>
+          </a:effectRef>
+          <a:fontRef idx="minor">
+            <a:schemeClr val="lt1"/>
+          </a:fontRef>
+        </p:style>
+        <p:txBody>
+          <a:bodyPr rtlCol="0" anchor="ctr"/>
+          <a:lstStyle/>
+          <a:p>
+            <a:pPr algn="ctr"/>
+            <a:r>
+              <a:rPr lang="en-US" altLang="zh-CN" sz="1400" dirty="0">
+                <a:latin typeface="Arial Black" panose="020B0A04020102020204" pitchFamily="34" charset="0"/>
+              </a:rPr>
+              <a:t>*: protected</a:t>
+            </a:r>
+            <a:endParaRPr lang="zh-CN" altLang="en-US" sz="1400" dirty="0">
+              <a:latin typeface="Arial Black" panose="020B0A04020102020204" pitchFamily="34" charset="0"/>
+            </a:endParaRPr>
+          </a:p>
+        </p:txBody>
+      </p:sp>
+      <p:sp>
+        <p:nvSpPr>
+          <p:cNvPr id="28" name="Rectangle: Rounded Corners 27">
+            <a:extLst>
+              <a:ext uri="{FF2B5EF4-FFF2-40B4-BE49-F238E27FC236}">
+                <a16:creationId xmlns:a16="http://schemas.microsoft.com/office/drawing/2014/main" id="{FAAB4448-C011-4B99-B2DE-A47BADDD15DF}"/>
+              </a:ext>
+            </a:extLst>
+          </p:cNvPr>
+          <p:cNvSpPr/>
+          <p:nvPr/>
+        </p:nvSpPr>
+        <p:spPr>
+          <a:xfrm>
+            <a:off x="479179" y="4375273"/>
+            <a:ext cx="3223952" cy="334985"/>
+          </a:xfrm>
+          <a:prstGeom prst="roundRect">
+            <a:avLst/>
+          </a:prstGeom>
+          <a:solidFill>
+            <a:schemeClr val="accent3">
+              <a:lumMod val="60000"/>
+              <a:lumOff val="40000"/>
+            </a:schemeClr>
+          </a:solidFill>
+          <a:ln>
+            <a:solidFill>
+              <a:schemeClr val="accent3">
+                <a:lumMod val="20000"/>
+                <a:lumOff val="80000"/>
+              </a:schemeClr>
+            </a:solidFill>
+          </a:ln>
+        </p:spPr>
+        <p:style>
+          <a:lnRef idx="2">
+            <a:schemeClr val="accent1">
+              <a:shade val="50000"/>
+            </a:schemeClr>
+          </a:lnRef>
+          <a:fillRef idx="1">
+            <a:schemeClr val="accent1"/>
+          </a:fillRef>
+          <a:effectRef idx="0">
+            <a:schemeClr val="accent1"/>
+          </a:effectRef>
+          <a:fontRef idx="minor">
+            <a:schemeClr val="lt1"/>
+          </a:fontRef>
+        </p:style>
+        <p:txBody>
+          <a:bodyPr rtlCol="0" anchor="ctr"/>
+          <a:lstStyle/>
+          <a:p>
+            <a:pPr algn="ctr"/>
+            <a:r>
+              <a:rPr lang="en-US" altLang="zh-CN" sz="1400" dirty="0">
+                <a:latin typeface="Arial Black" panose="020B0A04020102020204" pitchFamily="34" charset="0"/>
+              </a:rPr>
+              <a:t>+: </a:t>
+            </a:r>
+            <a:r>
+              <a:rPr lang="en-US" altLang="zh-CN" sz="1400" dirty="0" err="1">
+                <a:latin typeface="Arial Black" panose="020B0A04020102020204" pitchFamily="34" charset="0"/>
+              </a:rPr>
+              <a:t>m_name</a:t>
+            </a:r>
+            <a:endParaRPr lang="zh-CN" altLang="en-US" sz="1400" dirty="0">
+              <a:latin typeface="Arial Black" panose="020B0A04020102020204" pitchFamily="34" charset="0"/>
+            </a:endParaRPr>
+          </a:p>
+        </p:txBody>
+      </p:sp>
+    </p:spTree>
+    <p:extLst>
+      <p:ext uri="{BB962C8B-B14F-4D97-AF65-F5344CB8AC3E}">
+        <p14:creationId xmlns:p14="http://schemas.microsoft.com/office/powerpoint/2010/main" val="2401213058"/>
+      </p:ext>
+    </p:extLst>
+  </p:cSld>
+  <p:clrMapOvr>
+    <a:masterClrMapping/>
+  </p:clrMapOvr>
+</p:sld>
+</file>
+
+<file path=ppt/slides/slide22.xml><?xml version="1.0" encoding="utf-8"?>
+<p:sld xmlns:a="http://schemas.openxmlformats.org/drawingml/2006/main" xmlns:r="http://schemas.openxmlformats.org/officeDocument/2006/relationships" xmlns:p="http://schemas.openxmlformats.org/presentationml/2006/main">
+  <p:cSld>
+    <p:spTree>
+      <p:nvGrpSpPr>
+        <p:cNvPr id="1" name=""/>
+        <p:cNvGrpSpPr/>
+        <p:nvPr/>
+      </p:nvGrpSpPr>
+      <p:grpSpPr>
+        <a:xfrm>
+          <a:off x="0" y="0"/>
+          <a:ext cx="0" cy="0"/>
+          <a:chOff x="0" y="0"/>
+          <a:chExt cx="0" cy="0"/>
+        </a:xfrm>
+      </p:grpSpPr>
+      <p:sp>
+        <p:nvSpPr>
           <p:cNvPr id="2" name="TextBox 1">
             <a:extLst>
               <a:ext uri="{FF2B5EF4-FFF2-40B4-BE49-F238E27FC236}">
@@ -18840,7 +19766,7 @@
 </p:sld>
 </file>
 
-<file path=ppt/slides/slide22.xml><?xml version="1.0" encoding="utf-8"?>
+<file path=ppt/slides/slide23.xml><?xml version="1.0" encoding="utf-8"?>
 <p:sld xmlns:a="http://schemas.openxmlformats.org/drawingml/2006/main" xmlns:r="http://schemas.openxmlformats.org/officeDocument/2006/relationships" xmlns:p="http://schemas.openxmlformats.org/presentationml/2006/main">
   <p:cSld>
     <p:spTree>
@@ -20327,7 +21253,7 @@
 </p:sld>
 </file>
 
-<file path=ppt/slides/slide23.xml><?xml version="1.0" encoding="utf-8"?>
+<file path=ppt/slides/slide24.xml><?xml version="1.0" encoding="utf-8"?>
 <p:sld xmlns:a="http://schemas.openxmlformats.org/drawingml/2006/main" xmlns:r="http://schemas.openxmlformats.org/officeDocument/2006/relationships" xmlns:p="http://schemas.openxmlformats.org/presentationml/2006/main">
   <p:cSld>
     <p:spTree>
@@ -21852,7 +22778,7 @@
 </p:sld>
 </file>
 
-<file path=ppt/slides/slide24.xml><?xml version="1.0" encoding="utf-8"?>
+<file path=ppt/slides/slide25.xml><?xml version="1.0" encoding="utf-8"?>
 <p:sld xmlns:a="http://schemas.openxmlformats.org/drawingml/2006/main" xmlns:r="http://schemas.openxmlformats.org/officeDocument/2006/relationships" xmlns:p="http://schemas.openxmlformats.org/presentationml/2006/main">
   <p:cSld>
     <p:spTree>
@@ -22183,278 +23109,6 @@
     <p:extLst>
       <p:ext uri="{BB962C8B-B14F-4D97-AF65-F5344CB8AC3E}">
         <p14:creationId xmlns:p14="http://schemas.microsoft.com/office/powerpoint/2010/main" val="1816618966"/>
-      </p:ext>
-    </p:extLst>
-  </p:cSld>
-  <p:clrMapOvr>
-    <a:masterClrMapping/>
-  </p:clrMapOvr>
-</p:sld>
-</file>
-
-<file path=ppt/slides/slide25.xml><?xml version="1.0" encoding="utf-8"?>
-<p:sld xmlns:a="http://schemas.openxmlformats.org/drawingml/2006/main" xmlns:r="http://schemas.openxmlformats.org/officeDocument/2006/relationships" xmlns:p="http://schemas.openxmlformats.org/presentationml/2006/main">
-  <p:cSld>
-    <p:spTree>
-      <p:nvGrpSpPr>
-        <p:cNvPr id="1" name=""/>
-        <p:cNvGrpSpPr/>
-        <p:nvPr/>
-      </p:nvGrpSpPr>
-      <p:grpSpPr>
-        <a:xfrm>
-          <a:off x="0" y="0"/>
-          <a:ext cx="0" cy="0"/>
-          <a:chOff x="0" y="0"/>
-          <a:chExt cx="0" cy="0"/>
-        </a:xfrm>
-      </p:grpSpPr>
-      <p:sp>
-        <p:nvSpPr>
-          <p:cNvPr id="2" name="TextBox 1">
-            <a:extLst>
-              <a:ext uri="{FF2B5EF4-FFF2-40B4-BE49-F238E27FC236}">
-                <a16:creationId xmlns:a16="http://schemas.microsoft.com/office/drawing/2014/main" id="{6616D8AB-9DB0-4F58-B6DE-0689A6510426}"/>
-              </a:ext>
-            </a:extLst>
-          </p:cNvPr>
-          <p:cNvSpPr txBox="1"/>
-          <p:nvPr/>
-        </p:nvSpPr>
-        <p:spPr>
-          <a:xfrm>
-            <a:off x="562708" y="432079"/>
-            <a:ext cx="1386918" cy="369332"/>
-          </a:xfrm>
-          <a:prstGeom prst="rect">
-            <a:avLst/>
-          </a:prstGeom>
-          <a:noFill/>
-        </p:spPr>
-        <p:txBody>
-          <a:bodyPr wrap="none" rtlCol="0">
-            <a:spAutoFit/>
-          </a:bodyPr>
-          <a:lstStyle/>
-          <a:p>
-            <a:r>
-              <a:rPr lang="en-US" altLang="zh-CN" dirty="0">
-                <a:latin typeface="Clarendon Blk BT" panose="02040905050505020204" pitchFamily="18" charset="0"/>
-              </a:rPr>
-              <a:t>ICEMedia</a:t>
-            </a:r>
-            <a:endParaRPr lang="zh-CN" altLang="en-US" dirty="0">
-              <a:latin typeface="Clarendon Blk BT" panose="02040905050505020204" pitchFamily="18" charset="0"/>
-            </a:endParaRPr>
-          </a:p>
-        </p:txBody>
-      </p:sp>
-      <p:sp>
-        <p:nvSpPr>
-          <p:cNvPr id="20" name="Rectangle: Diagonal Corners Rounded 19">
-            <a:extLst>
-              <a:ext uri="{FF2B5EF4-FFF2-40B4-BE49-F238E27FC236}">
-                <a16:creationId xmlns:a16="http://schemas.microsoft.com/office/drawing/2014/main" id="{56D5BA8E-739B-4034-BFE6-0ACBB3A95E60}"/>
-              </a:ext>
-            </a:extLst>
-          </p:cNvPr>
-          <p:cNvSpPr/>
-          <p:nvPr/>
-        </p:nvSpPr>
-        <p:spPr>
-          <a:xfrm>
-            <a:off x="1438275" y="1052182"/>
-            <a:ext cx="3223951" cy="2529218"/>
-          </a:xfrm>
-          <a:prstGeom prst="round2DiagRect">
-            <a:avLst>
-              <a:gd name="adj1" fmla="val 6397"/>
-              <a:gd name="adj2" fmla="val 4890"/>
-            </a:avLst>
-          </a:prstGeom>
-          <a:solidFill>
-            <a:schemeClr val="accent1">
-              <a:lumMod val="60000"/>
-              <a:lumOff val="40000"/>
-            </a:schemeClr>
-          </a:solidFill>
-          <a:ln w="9525">
-            <a:prstDash val="dash"/>
-          </a:ln>
-        </p:spPr>
-        <p:style>
-          <a:lnRef idx="2">
-            <a:schemeClr val="accent1">
-              <a:shade val="50000"/>
-            </a:schemeClr>
-          </a:lnRef>
-          <a:fillRef idx="1">
-            <a:schemeClr val="accent1"/>
-          </a:fillRef>
-          <a:effectRef idx="0">
-            <a:schemeClr val="accent1"/>
-          </a:effectRef>
-          <a:fontRef idx="minor">
-            <a:schemeClr val="lt1"/>
-          </a:fontRef>
-        </p:style>
-        <p:txBody>
-          <a:bodyPr rtlCol="0" anchor="t" anchorCtr="1"/>
-          <a:lstStyle/>
-          <a:p>
-            <a:pPr algn="ctr"/>
-            <a:r>
-              <a:rPr lang="en-US" altLang="zh-CN" dirty="0">
-                <a:latin typeface="Britannic Bold" panose="020B0903060703020204" pitchFamily="34" charset="0"/>
-              </a:rPr>
-              <a:t>ICEMedia</a:t>
-            </a:r>
-            <a:endParaRPr lang="zh-CN" altLang="en-US" dirty="0">
-              <a:latin typeface="Britannic Bold" panose="020B0903060703020204" pitchFamily="34" charset="0"/>
-            </a:endParaRPr>
-          </a:p>
-        </p:txBody>
-      </p:sp>
-      <p:sp>
-        <p:nvSpPr>
-          <p:cNvPr id="5" name="Rectangle: Rounded Corners 4">
-            <a:extLst>
-              <a:ext uri="{FF2B5EF4-FFF2-40B4-BE49-F238E27FC236}">
-                <a16:creationId xmlns:a16="http://schemas.microsoft.com/office/drawing/2014/main" id="{BD17C6FC-CBB2-4572-995A-772AAFC4AF04}"/>
-              </a:ext>
-            </a:extLst>
-          </p:cNvPr>
-          <p:cNvSpPr/>
-          <p:nvPr/>
-        </p:nvSpPr>
-        <p:spPr>
-          <a:xfrm>
-            <a:off x="1438274" y="1687813"/>
-            <a:ext cx="3223952" cy="369331"/>
-          </a:xfrm>
-          <a:prstGeom prst="roundRect">
-            <a:avLst/>
-          </a:prstGeom>
-          <a:solidFill>
-            <a:schemeClr val="accent3">
-              <a:lumMod val="60000"/>
-              <a:lumOff val="40000"/>
-            </a:schemeClr>
-          </a:solidFill>
-          <a:ln>
-            <a:solidFill>
-              <a:schemeClr val="accent3">
-                <a:lumMod val="20000"/>
-                <a:lumOff val="80000"/>
-              </a:schemeClr>
-            </a:solidFill>
-          </a:ln>
-        </p:spPr>
-        <p:style>
-          <a:lnRef idx="2">
-            <a:schemeClr val="accent1">
-              <a:shade val="50000"/>
-            </a:schemeClr>
-          </a:lnRef>
-          <a:fillRef idx="1">
-            <a:schemeClr val="accent1"/>
-          </a:fillRef>
-          <a:effectRef idx="0">
-            <a:schemeClr val="accent1"/>
-          </a:effectRef>
-          <a:fontRef idx="minor">
-            <a:schemeClr val="lt1"/>
-          </a:fontRef>
-        </p:style>
-        <p:txBody>
-          <a:bodyPr rtlCol="0" anchor="ctr"/>
-          <a:lstStyle/>
-          <a:p>
-            <a:pPr algn="ctr"/>
-            <a:r>
-              <a:rPr lang="en-US" altLang="zh-CN" sz="1400" dirty="0">
-                <a:latin typeface="Arial Black" panose="020B0A04020102020204" pitchFamily="34" charset="0"/>
-              </a:rPr>
-              <a:t>ICEMediaConfig</a:t>
-            </a:r>
-            <a:endParaRPr lang="zh-CN" altLang="en-US" sz="1400" dirty="0">
-              <a:latin typeface="Arial Black" panose="020B0A04020102020204" pitchFamily="34" charset="0"/>
-            </a:endParaRPr>
-          </a:p>
-        </p:txBody>
-      </p:sp>
-      <p:sp>
-        <p:nvSpPr>
-          <p:cNvPr id="6" name="Rectangle: Rounded Corners 5">
-            <a:extLst>
-              <a:ext uri="{FF2B5EF4-FFF2-40B4-BE49-F238E27FC236}">
-                <a16:creationId xmlns:a16="http://schemas.microsoft.com/office/drawing/2014/main" id="{964A89E0-5787-4C20-84B7-0EC972339DDE}"/>
-              </a:ext>
-            </a:extLst>
-          </p:cNvPr>
-          <p:cNvSpPr/>
-          <p:nvPr/>
-        </p:nvSpPr>
-        <p:spPr>
-          <a:xfrm>
-            <a:off x="1438274" y="2071469"/>
-            <a:ext cx="3223952" cy="369331"/>
-          </a:xfrm>
-          <a:prstGeom prst="roundRect">
-            <a:avLst/>
-          </a:prstGeom>
-          <a:solidFill>
-            <a:schemeClr val="accent3">
-              <a:lumMod val="60000"/>
-              <a:lumOff val="40000"/>
-            </a:schemeClr>
-          </a:solidFill>
-          <a:ln>
-            <a:solidFill>
-              <a:schemeClr val="accent3">
-                <a:lumMod val="20000"/>
-                <a:lumOff val="80000"/>
-              </a:schemeClr>
-            </a:solidFill>
-          </a:ln>
-        </p:spPr>
-        <p:style>
-          <a:lnRef idx="2">
-            <a:schemeClr val="accent1">
-              <a:shade val="50000"/>
-            </a:schemeClr>
-          </a:lnRef>
-          <a:fillRef idx="1">
-            <a:schemeClr val="accent1"/>
-          </a:fillRef>
-          <a:effectRef idx="0">
-            <a:schemeClr val="accent1"/>
-          </a:effectRef>
-          <a:fontRef idx="minor">
-            <a:schemeClr val="lt1"/>
-          </a:fontRef>
-        </p:style>
-        <p:txBody>
-          <a:bodyPr rtlCol="0" anchor="ctr"/>
-          <a:lstStyle/>
-          <a:p>
-            <a:pPr algn="ctr"/>
-            <a:r>
-              <a:rPr lang="en-US" altLang="zh-CN" sz="1400" dirty="0">
-                <a:latin typeface="Arial Black" panose="020B0A04020102020204" pitchFamily="34" charset="0"/>
-              </a:rPr>
-              <a:t>ICEPeer</a:t>
-            </a:r>
-            <a:endParaRPr lang="zh-CN" altLang="en-US" sz="1400" dirty="0">
-              <a:latin typeface="Arial Black" panose="020B0A04020102020204" pitchFamily="34" charset="0"/>
-            </a:endParaRPr>
-          </a:p>
-        </p:txBody>
-      </p:sp>
-    </p:spTree>
-    <p:extLst>
-      <p:ext uri="{BB962C8B-B14F-4D97-AF65-F5344CB8AC3E}">
-        <p14:creationId xmlns:p14="http://schemas.microsoft.com/office/powerpoint/2010/main" val="4125926458"/>
       </p:ext>
     </p:extLst>
   </p:cSld>
@@ -22496,7 +23150,7 @@
         <p:spPr>
           <a:xfrm>
             <a:off x="562708" y="432079"/>
-            <a:ext cx="1180964" cy="369332"/>
+            <a:ext cx="1386918" cy="369332"/>
           </a:xfrm>
           <a:prstGeom prst="rect">
             <a:avLst/>
@@ -22513,7 +23167,7 @@
               <a:rPr lang="en-US" altLang="zh-CN" dirty="0">
                 <a:latin typeface="Clarendon Blk BT" panose="02040905050505020204" pitchFamily="18" charset="0"/>
               </a:rPr>
-              <a:t>ICEPeer</a:t>
+              <a:t>ICEMedia</a:t>
             </a:r>
             <a:endParaRPr lang="zh-CN" altLang="en-US" dirty="0">
               <a:latin typeface="Clarendon Blk BT" panose="02040905050505020204" pitchFamily="18" charset="0"/>
@@ -22536,7 +23190,7 @@
         <p:spPr>
           <a:xfrm>
             <a:off x="1438275" y="1052182"/>
-            <a:ext cx="3223951" cy="1434540"/>
+            <a:ext cx="3223951" cy="2529218"/>
           </a:xfrm>
           <a:prstGeom prst="round2DiagRect">
             <a:avLst>
@@ -22579,7 +23233,7 @@
               <a:rPr lang="en-US" altLang="zh-CN" dirty="0">
                 <a:latin typeface="Britannic Bold" panose="020B0903060703020204" pitchFamily="34" charset="0"/>
               </a:rPr>
-              <a:t>ICEPeer</a:t>
+              <a:t>ICEMedia</a:t>
             </a:r>
             <a:endParaRPr lang="zh-CN" altLang="en-US" dirty="0">
               <a:latin typeface="Britannic Bold" panose="020B0903060703020204" pitchFamily="34" charset="0"/>
@@ -22589,10 +23243,10 @@
       </p:sp>
       <p:sp>
         <p:nvSpPr>
-          <p:cNvPr id="4" name="Rectangle: Rounded Corners 3">
-            <a:extLst>
-              <a:ext uri="{FF2B5EF4-FFF2-40B4-BE49-F238E27FC236}">
-                <a16:creationId xmlns:a16="http://schemas.microsoft.com/office/drawing/2014/main" id="{EEF339AA-1100-47BA-98AE-A4F110C5C14C}"/>
+          <p:cNvPr id="5" name="Rectangle: Rounded Corners 4">
+            <a:extLst>
+              <a:ext uri="{FF2B5EF4-FFF2-40B4-BE49-F238E27FC236}">
+                <a16:creationId xmlns:a16="http://schemas.microsoft.com/office/drawing/2014/main" id="{BD17C6FC-CBB2-4572-995A-772AAFC4AF04}"/>
               </a:ext>
             </a:extLst>
           </p:cNvPr>
@@ -22601,7 +23255,7 @@
         </p:nvSpPr>
         <p:spPr>
           <a:xfrm>
-            <a:off x="1438275" y="1541503"/>
+            <a:off x="1438274" y="1687813"/>
             <a:ext cx="3223952" cy="369331"/>
           </a:xfrm>
           <a:prstGeom prst="roundRect">
@@ -22647,7 +23301,7 @@
               <a:rPr lang="en-US" altLang="zh-CN" sz="1400" dirty="0">
                 <a:latin typeface="Arial Black" panose="020B0A04020102020204" pitchFamily="34" charset="0"/>
               </a:rPr>
-              <a:t>local-candidate</a:t>
+              <a:t>ICEMediaConfig</a:t>
             </a:r>
             <a:endParaRPr lang="zh-CN" altLang="en-US" sz="1400" dirty="0">
               <a:latin typeface="Arial Black" panose="020B0A04020102020204" pitchFamily="34" charset="0"/>
@@ -22657,10 +23311,10 @@
       </p:sp>
       <p:sp>
         <p:nvSpPr>
-          <p:cNvPr id="5" name="Rectangle: Rounded Corners 4">
-            <a:extLst>
-              <a:ext uri="{FF2B5EF4-FFF2-40B4-BE49-F238E27FC236}">
-                <a16:creationId xmlns:a16="http://schemas.microsoft.com/office/drawing/2014/main" id="{AD583B34-A2BA-4884-B20B-FD1E6C21631D}"/>
+          <p:cNvPr id="6" name="Rectangle: Rounded Corners 5">
+            <a:extLst>
+              <a:ext uri="{FF2B5EF4-FFF2-40B4-BE49-F238E27FC236}">
+                <a16:creationId xmlns:a16="http://schemas.microsoft.com/office/drawing/2014/main" id="{964A89E0-5787-4C20-84B7-0EC972339DDE}"/>
               </a:ext>
             </a:extLst>
           </p:cNvPr>
@@ -22669,7 +23323,7 @@
         </p:nvSpPr>
         <p:spPr>
           <a:xfrm>
-            <a:off x="1438274" y="1925158"/>
+            <a:off x="1438274" y="2071469"/>
             <a:ext cx="3223952" cy="369331"/>
           </a:xfrm>
           <a:prstGeom prst="roundRect">
@@ -22715,7 +23369,7 @@
               <a:rPr lang="en-US" altLang="zh-CN" sz="1400" dirty="0">
                 <a:latin typeface="Arial Black" panose="020B0A04020102020204" pitchFamily="34" charset="0"/>
               </a:rPr>
-              <a:t>remote-candidate</a:t>
+              <a:t>ICEPeer</a:t>
             </a:r>
             <a:endParaRPr lang="zh-CN" altLang="en-US" sz="1400" dirty="0">
               <a:latin typeface="Arial Black" panose="020B0A04020102020204" pitchFamily="34" charset="0"/>
@@ -22726,7 +23380,7 @@
     </p:spTree>
     <p:extLst>
       <p:ext uri="{BB962C8B-B14F-4D97-AF65-F5344CB8AC3E}">
-        <p14:creationId xmlns:p14="http://schemas.microsoft.com/office/powerpoint/2010/main" val="3846128388"/>
+        <p14:creationId xmlns:p14="http://schemas.microsoft.com/office/powerpoint/2010/main" val="4125926458"/>
       </p:ext>
     </p:extLst>
   </p:cSld>
@@ -22768,7 +23422,7 @@
         <p:spPr>
           <a:xfrm>
             <a:off x="562708" y="432079"/>
-            <a:ext cx="1880643" cy="369332"/>
+            <a:ext cx="1180964" cy="369332"/>
           </a:xfrm>
           <a:prstGeom prst="rect">
             <a:avLst/>
@@ -22785,7 +23439,7 @@
               <a:rPr lang="en-US" altLang="zh-CN" dirty="0">
                 <a:latin typeface="Clarendon Blk BT" panose="02040905050505020204" pitchFamily="18" charset="0"/>
               </a:rPr>
-              <a:t>ICECandidate</a:t>
+              <a:t>ICEPeer</a:t>
             </a:r>
             <a:endParaRPr lang="zh-CN" altLang="en-US" dirty="0">
               <a:latin typeface="Clarendon Blk BT" panose="02040905050505020204" pitchFamily="18" charset="0"/>
@@ -22807,8 +23461,8 @@
         </p:nvSpPr>
         <p:spPr>
           <a:xfrm>
-            <a:off x="1337914" y="899782"/>
-            <a:ext cx="3223951" cy="2529218"/>
+            <a:off x="1438275" y="1052182"/>
+            <a:ext cx="3223951" cy="1434540"/>
           </a:xfrm>
           <a:prstGeom prst="round2DiagRect">
             <a:avLst>
@@ -22851,7 +23505,7 @@
               <a:rPr lang="en-US" altLang="zh-CN" dirty="0">
                 <a:latin typeface="Britannic Bold" panose="020B0903060703020204" pitchFamily="34" charset="0"/>
               </a:rPr>
-              <a:t>ICECandidate</a:t>
+              <a:t>ICEPeer</a:t>
             </a:r>
             <a:endParaRPr lang="zh-CN" altLang="en-US" dirty="0">
               <a:latin typeface="Britannic Bold" panose="020B0903060703020204" pitchFamily="34" charset="0"/>
@@ -22861,10 +23515,10 @@
       </p:sp>
       <p:sp>
         <p:nvSpPr>
-          <p:cNvPr id="6" name="Rectangle: Rounded Corners 5">
-            <a:extLst>
-              <a:ext uri="{FF2B5EF4-FFF2-40B4-BE49-F238E27FC236}">
-                <a16:creationId xmlns:a16="http://schemas.microsoft.com/office/drawing/2014/main" id="{58A841A3-96BB-4A11-87D0-856FFEC66129}"/>
+          <p:cNvPr id="4" name="Rectangle: Rounded Corners 3">
+            <a:extLst>
+              <a:ext uri="{FF2B5EF4-FFF2-40B4-BE49-F238E27FC236}">
+                <a16:creationId xmlns:a16="http://schemas.microsoft.com/office/drawing/2014/main" id="{EEF339AA-1100-47BA-98AE-A4F110C5C14C}"/>
               </a:ext>
             </a:extLst>
           </p:cNvPr>
@@ -22873,7 +23527,7 @@
         </p:nvSpPr>
         <p:spPr>
           <a:xfrm>
-            <a:off x="1337913" y="1513903"/>
+            <a:off x="1438275" y="1541503"/>
             <a:ext cx="3223952" cy="369331"/>
           </a:xfrm>
           <a:prstGeom prst="roundRect">
@@ -22919,7 +23573,7 @@
               <a:rPr lang="en-US" altLang="zh-CN" sz="1400" dirty="0">
                 <a:latin typeface="Arial Black" panose="020B0A04020102020204" pitchFamily="34" charset="0"/>
               </a:rPr>
-              <a:t>ICEChannel</a:t>
+              <a:t>local-candidate</a:t>
             </a:r>
             <a:endParaRPr lang="zh-CN" altLang="en-US" sz="1400" dirty="0">
               <a:latin typeface="Arial Black" panose="020B0A04020102020204" pitchFamily="34" charset="0"/>
@@ -22927,10 +23581,78 @@
           </a:p>
         </p:txBody>
       </p:sp>
+      <p:sp>
+        <p:nvSpPr>
+          <p:cNvPr id="5" name="Rectangle: Rounded Corners 4">
+            <a:extLst>
+              <a:ext uri="{FF2B5EF4-FFF2-40B4-BE49-F238E27FC236}">
+                <a16:creationId xmlns:a16="http://schemas.microsoft.com/office/drawing/2014/main" id="{AD583B34-A2BA-4884-B20B-FD1E6C21631D}"/>
+              </a:ext>
+            </a:extLst>
+          </p:cNvPr>
+          <p:cNvSpPr/>
+          <p:nvPr/>
+        </p:nvSpPr>
+        <p:spPr>
+          <a:xfrm>
+            <a:off x="1438274" y="1925158"/>
+            <a:ext cx="3223952" cy="369331"/>
+          </a:xfrm>
+          <a:prstGeom prst="roundRect">
+            <a:avLst/>
+          </a:prstGeom>
+          <a:solidFill>
+            <a:schemeClr val="accent3">
+              <a:lumMod val="60000"/>
+              <a:lumOff val="40000"/>
+            </a:schemeClr>
+          </a:solidFill>
+          <a:ln>
+            <a:solidFill>
+              <a:schemeClr val="accent3">
+                <a:lumMod val="20000"/>
+                <a:lumOff val="80000"/>
+              </a:schemeClr>
+            </a:solidFill>
+          </a:ln>
+        </p:spPr>
+        <p:style>
+          <a:lnRef idx="2">
+            <a:schemeClr val="accent1">
+              <a:shade val="50000"/>
+            </a:schemeClr>
+          </a:lnRef>
+          <a:fillRef idx="1">
+            <a:schemeClr val="accent1"/>
+          </a:fillRef>
+          <a:effectRef idx="0">
+            <a:schemeClr val="accent1"/>
+          </a:effectRef>
+          <a:fontRef idx="minor">
+            <a:schemeClr val="lt1"/>
+          </a:fontRef>
+        </p:style>
+        <p:txBody>
+          <a:bodyPr rtlCol="0" anchor="ctr"/>
+          <a:lstStyle/>
+          <a:p>
+            <a:pPr algn="ctr"/>
+            <a:r>
+              <a:rPr lang="en-US" altLang="zh-CN" sz="1400" dirty="0">
+                <a:latin typeface="Arial Black" panose="020B0A04020102020204" pitchFamily="34" charset="0"/>
+              </a:rPr>
+              <a:t>remote-candidate</a:t>
+            </a:r>
+            <a:endParaRPr lang="zh-CN" altLang="en-US" sz="1400" dirty="0">
+              <a:latin typeface="Arial Black" panose="020B0A04020102020204" pitchFamily="34" charset="0"/>
+            </a:endParaRPr>
+          </a:p>
+        </p:txBody>
+      </p:sp>
     </p:spTree>
     <p:extLst>
       <p:ext uri="{BB962C8B-B14F-4D97-AF65-F5344CB8AC3E}">
-        <p14:creationId xmlns:p14="http://schemas.microsoft.com/office/powerpoint/2010/main" val="1727513912"/>
+        <p14:creationId xmlns:p14="http://schemas.microsoft.com/office/powerpoint/2010/main" val="3846128388"/>
       </p:ext>
     </p:extLst>
   </p:cSld>
@@ -22972,7 +23694,7 @@
         <p:spPr>
           <a:xfrm>
             <a:off x="562708" y="432079"/>
-            <a:ext cx="1643399" cy="369332"/>
+            <a:ext cx="1880643" cy="369332"/>
           </a:xfrm>
           <a:prstGeom prst="rect">
             <a:avLst/>
@@ -22989,7 +23711,7 @@
               <a:rPr lang="en-US" altLang="zh-CN" dirty="0">
                 <a:latin typeface="Clarendon Blk BT" panose="02040905050505020204" pitchFamily="18" charset="0"/>
               </a:rPr>
-              <a:t>ICEChannel</a:t>
+              <a:t>ICECandidate</a:t>
             </a:r>
             <a:endParaRPr lang="zh-CN" altLang="en-US" dirty="0">
               <a:latin typeface="Clarendon Blk BT" panose="02040905050505020204" pitchFamily="18" charset="0"/>
@@ -23011,7 +23733,7 @@
         </p:nvSpPr>
         <p:spPr>
           <a:xfrm>
-            <a:off x="1438275" y="1052182"/>
+            <a:off x="1337914" y="899782"/>
             <a:ext cx="3223951" cy="2529218"/>
           </a:xfrm>
           <a:prstGeom prst="round2DiagRect">
@@ -23055,7 +23777,7 @@
               <a:rPr lang="en-US" altLang="zh-CN" dirty="0">
                 <a:latin typeface="Britannic Bold" panose="020B0903060703020204" pitchFamily="34" charset="0"/>
               </a:rPr>
-              <a:t>ICEChannel</a:t>
+              <a:t>ICECandidate</a:t>
             </a:r>
             <a:endParaRPr lang="zh-CN" altLang="en-US" dirty="0">
               <a:latin typeface="Britannic Bold" panose="020B0903060703020204" pitchFamily="34" charset="0"/>
@@ -23063,10 +23785,78 @@
           </a:p>
         </p:txBody>
       </p:sp>
+      <p:sp>
+        <p:nvSpPr>
+          <p:cNvPr id="6" name="Rectangle: Rounded Corners 5">
+            <a:extLst>
+              <a:ext uri="{FF2B5EF4-FFF2-40B4-BE49-F238E27FC236}">
+                <a16:creationId xmlns:a16="http://schemas.microsoft.com/office/drawing/2014/main" id="{58A841A3-96BB-4A11-87D0-856FFEC66129}"/>
+              </a:ext>
+            </a:extLst>
+          </p:cNvPr>
+          <p:cNvSpPr/>
+          <p:nvPr/>
+        </p:nvSpPr>
+        <p:spPr>
+          <a:xfrm>
+            <a:off x="1337913" y="1513903"/>
+            <a:ext cx="3223952" cy="369331"/>
+          </a:xfrm>
+          <a:prstGeom prst="roundRect">
+            <a:avLst/>
+          </a:prstGeom>
+          <a:solidFill>
+            <a:schemeClr val="accent3">
+              <a:lumMod val="60000"/>
+              <a:lumOff val="40000"/>
+            </a:schemeClr>
+          </a:solidFill>
+          <a:ln>
+            <a:solidFill>
+              <a:schemeClr val="accent3">
+                <a:lumMod val="20000"/>
+                <a:lumOff val="80000"/>
+              </a:schemeClr>
+            </a:solidFill>
+          </a:ln>
+        </p:spPr>
+        <p:style>
+          <a:lnRef idx="2">
+            <a:schemeClr val="accent1">
+              <a:shade val="50000"/>
+            </a:schemeClr>
+          </a:lnRef>
+          <a:fillRef idx="1">
+            <a:schemeClr val="accent1"/>
+          </a:fillRef>
+          <a:effectRef idx="0">
+            <a:schemeClr val="accent1"/>
+          </a:effectRef>
+          <a:fontRef idx="minor">
+            <a:schemeClr val="lt1"/>
+          </a:fontRef>
+        </p:style>
+        <p:txBody>
+          <a:bodyPr rtlCol="0" anchor="ctr"/>
+          <a:lstStyle/>
+          <a:p>
+            <a:pPr algn="ctr"/>
+            <a:r>
+              <a:rPr lang="en-US" altLang="zh-CN" sz="1400" dirty="0">
+                <a:latin typeface="Arial Black" panose="020B0A04020102020204" pitchFamily="34" charset="0"/>
+              </a:rPr>
+              <a:t>ICEChannel</a:t>
+            </a:r>
+            <a:endParaRPr lang="zh-CN" altLang="en-US" sz="1400" dirty="0">
+              <a:latin typeface="Arial Black" panose="020B0A04020102020204" pitchFamily="34" charset="0"/>
+            </a:endParaRPr>
+          </a:p>
+        </p:txBody>
+      </p:sp>
     </p:spTree>
     <p:extLst>
       <p:ext uri="{BB962C8B-B14F-4D97-AF65-F5344CB8AC3E}">
-        <p14:creationId xmlns:p14="http://schemas.microsoft.com/office/powerpoint/2010/main" val="1224220718"/>
+        <p14:creationId xmlns:p14="http://schemas.microsoft.com/office/powerpoint/2010/main" val="1727513912"/>
       </p:ext>
     </p:extLst>
   </p:cSld>
@@ -23108,7 +23898,7 @@
         <p:spPr>
           <a:xfrm>
             <a:off x="562708" y="432079"/>
-            <a:ext cx="1867819" cy="369332"/>
+            <a:ext cx="1643399" cy="369332"/>
           </a:xfrm>
           <a:prstGeom prst="rect">
             <a:avLst/>
@@ -23125,7 +23915,7 @@
               <a:rPr lang="en-US" altLang="zh-CN" dirty="0">
                 <a:latin typeface="Clarendon Blk BT" panose="02040905050505020204" pitchFamily="18" charset="0"/>
               </a:rPr>
-              <a:t>StunMessage</a:t>
+              <a:t>ICEChannel</a:t>
             </a:r>
             <a:endParaRPr lang="zh-CN" altLang="en-US" dirty="0">
               <a:latin typeface="Clarendon Blk BT" panose="02040905050505020204" pitchFamily="18" charset="0"/>
@@ -23147,8 +23937,8 @@
         </p:nvSpPr>
         <p:spPr>
           <a:xfrm>
-            <a:off x="1438275" y="1052182"/>
-            <a:ext cx="3223951" cy="2529218"/>
+            <a:off x="4344620" y="123881"/>
+            <a:ext cx="3223951" cy="2800601"/>
           </a:xfrm>
           <a:prstGeom prst="round2DiagRect">
             <a:avLst>
@@ -23191,7 +23981,7 @@
               <a:rPr lang="en-US" altLang="zh-CN" dirty="0">
                 <a:latin typeface="Britannic Bold" panose="020B0903060703020204" pitchFamily="34" charset="0"/>
               </a:rPr>
-              <a:t>StunMessage</a:t>
+              <a:t>ICEChannel</a:t>
             </a:r>
             <a:endParaRPr lang="zh-CN" altLang="en-US" dirty="0">
               <a:latin typeface="Britannic Bold" panose="020B0903060703020204" pitchFamily="34" charset="0"/>
@@ -23199,10 +23989,1343 @@
           </a:p>
         </p:txBody>
       </p:sp>
+      <p:sp>
+        <p:nvSpPr>
+          <p:cNvPr id="4" name="Rectangle: Diagonal Corners Rounded 3">
+            <a:extLst>
+              <a:ext uri="{FF2B5EF4-FFF2-40B4-BE49-F238E27FC236}">
+                <a16:creationId xmlns:a16="http://schemas.microsoft.com/office/drawing/2014/main" id="{B1C085AA-E151-4ABD-A398-5DACE94891E9}"/>
+              </a:ext>
+            </a:extLst>
+          </p:cNvPr>
+          <p:cNvSpPr/>
+          <p:nvPr/>
+        </p:nvSpPr>
+        <p:spPr>
+          <a:xfrm>
+            <a:off x="310421" y="3686936"/>
+            <a:ext cx="2330035" cy="2800601"/>
+          </a:xfrm>
+          <a:prstGeom prst="round2DiagRect">
+            <a:avLst>
+              <a:gd name="adj1" fmla="val 6397"/>
+              <a:gd name="adj2" fmla="val 4890"/>
+            </a:avLst>
+          </a:prstGeom>
+          <a:solidFill>
+            <a:schemeClr val="accent1">
+              <a:lumMod val="60000"/>
+              <a:lumOff val="40000"/>
+            </a:schemeClr>
+          </a:solidFill>
+          <a:ln w="9525">
+            <a:prstDash val="dash"/>
+          </a:ln>
+        </p:spPr>
+        <p:style>
+          <a:lnRef idx="2">
+            <a:schemeClr val="accent1">
+              <a:shade val="50000"/>
+            </a:schemeClr>
+          </a:lnRef>
+          <a:fillRef idx="1">
+            <a:schemeClr val="accent1"/>
+          </a:fillRef>
+          <a:effectRef idx="0">
+            <a:schemeClr val="accent1"/>
+          </a:effectRef>
+          <a:fontRef idx="minor">
+            <a:schemeClr val="lt1"/>
+          </a:fontRef>
+        </p:style>
+        <p:txBody>
+          <a:bodyPr rtlCol="0" anchor="t" anchorCtr="1"/>
+          <a:lstStyle/>
+          <a:p>
+            <a:pPr algn="ctr"/>
+            <a:r>
+              <a:rPr lang="en-US" altLang="zh-CN" sz="1400" dirty="0">
+                <a:latin typeface="Britannic Bold" panose="020B0903060703020204" pitchFamily="34" charset="0"/>
+              </a:rPr>
+              <a:t>TCPChannel</a:t>
+            </a:r>
+            <a:endParaRPr lang="zh-CN" altLang="en-US" sz="1400" dirty="0">
+              <a:latin typeface="Britannic Bold" panose="020B0903060703020204" pitchFamily="34" charset="0"/>
+            </a:endParaRPr>
+          </a:p>
+        </p:txBody>
+      </p:sp>
+      <p:sp>
+        <p:nvSpPr>
+          <p:cNvPr id="5" name="Rectangle: Diagonal Corners Rounded 4">
+            <a:extLst>
+              <a:ext uri="{FF2B5EF4-FFF2-40B4-BE49-F238E27FC236}">
+                <a16:creationId xmlns:a16="http://schemas.microsoft.com/office/drawing/2014/main" id="{0AC601F2-6FE5-4242-A2F5-573E74D8FB5F}"/>
+              </a:ext>
+            </a:extLst>
+          </p:cNvPr>
+          <p:cNvSpPr/>
+          <p:nvPr/>
+        </p:nvSpPr>
+        <p:spPr>
+          <a:xfrm>
+            <a:off x="8657632" y="3686936"/>
+            <a:ext cx="2253524" cy="2800601"/>
+          </a:xfrm>
+          <a:prstGeom prst="round2DiagRect">
+            <a:avLst>
+              <a:gd name="adj1" fmla="val 6397"/>
+              <a:gd name="adj2" fmla="val 4890"/>
+            </a:avLst>
+          </a:prstGeom>
+          <a:solidFill>
+            <a:schemeClr val="accent1">
+              <a:lumMod val="60000"/>
+              <a:lumOff val="40000"/>
+            </a:schemeClr>
+          </a:solidFill>
+          <a:ln w="9525">
+            <a:prstDash val="dash"/>
+          </a:ln>
+        </p:spPr>
+        <p:style>
+          <a:lnRef idx="2">
+            <a:schemeClr val="accent1">
+              <a:shade val="50000"/>
+            </a:schemeClr>
+          </a:lnRef>
+          <a:fillRef idx="1">
+            <a:schemeClr val="accent1"/>
+          </a:fillRef>
+          <a:effectRef idx="0">
+            <a:schemeClr val="accent1"/>
+          </a:effectRef>
+          <a:fontRef idx="minor">
+            <a:schemeClr val="lt1"/>
+          </a:fontRef>
+        </p:style>
+        <p:txBody>
+          <a:bodyPr rtlCol="0" anchor="t" anchorCtr="1"/>
+          <a:lstStyle/>
+          <a:p>
+            <a:pPr algn="ctr"/>
+            <a:r>
+              <a:rPr lang="en-US" altLang="zh-CN" sz="1400" dirty="0">
+                <a:latin typeface="Britannic Bold" panose="020B0903060703020204" pitchFamily="34" charset="0"/>
+              </a:rPr>
+              <a:t>UDPChannel</a:t>
+            </a:r>
+            <a:endParaRPr lang="zh-CN" altLang="en-US" sz="1400" dirty="0">
+              <a:latin typeface="Britannic Bold" panose="020B0903060703020204" pitchFamily="34" charset="0"/>
+            </a:endParaRPr>
+          </a:p>
+        </p:txBody>
+      </p:sp>
+      <p:sp>
+        <p:nvSpPr>
+          <p:cNvPr id="6" name="Rectangle: Rounded Corners 5">
+            <a:extLst>
+              <a:ext uri="{FF2B5EF4-FFF2-40B4-BE49-F238E27FC236}">
+                <a16:creationId xmlns:a16="http://schemas.microsoft.com/office/drawing/2014/main" id="{F362282D-39F8-4396-9F34-6F938833CA74}"/>
+              </a:ext>
+            </a:extLst>
+          </p:cNvPr>
+          <p:cNvSpPr/>
+          <p:nvPr/>
+        </p:nvSpPr>
+        <p:spPr>
+          <a:xfrm>
+            <a:off x="4344620" y="685289"/>
+            <a:ext cx="3223954" cy="334986"/>
+          </a:xfrm>
+          <a:prstGeom prst="roundRect">
+            <a:avLst/>
+          </a:prstGeom>
+          <a:solidFill>
+            <a:schemeClr val="accent6">
+              <a:lumMod val="50000"/>
+            </a:schemeClr>
+          </a:solidFill>
+          <a:ln>
+            <a:solidFill>
+              <a:schemeClr val="accent6">
+                <a:lumMod val="50000"/>
+              </a:schemeClr>
+            </a:solidFill>
+            <a:prstDash val="dash"/>
+          </a:ln>
+        </p:spPr>
+        <p:style>
+          <a:lnRef idx="2">
+            <a:schemeClr val="accent1">
+              <a:shade val="50000"/>
+            </a:schemeClr>
+          </a:lnRef>
+          <a:fillRef idx="1">
+            <a:schemeClr val="accent1"/>
+          </a:fillRef>
+          <a:effectRef idx="0">
+            <a:schemeClr val="accent1"/>
+          </a:effectRef>
+          <a:fontRef idx="minor">
+            <a:schemeClr val="lt1"/>
+          </a:fontRef>
+        </p:style>
+        <p:txBody>
+          <a:bodyPr rtlCol="0" anchor="ctr"/>
+          <a:lstStyle/>
+          <a:p>
+            <a:r>
+              <a:rPr lang="en-US" altLang="zh-CN" sz="1400" dirty="0">
+                <a:latin typeface="Arial Black" panose="020B0A04020102020204" pitchFamily="34" charset="0"/>
+              </a:rPr>
+              <a:t>+: GetIPString</a:t>
+            </a:r>
+            <a:endParaRPr lang="zh-CN" altLang="en-US" sz="1400" dirty="0">
+              <a:latin typeface="Arial Black" panose="020B0A04020102020204" pitchFamily="34" charset="0"/>
+            </a:endParaRPr>
+          </a:p>
+        </p:txBody>
+      </p:sp>
+      <p:sp>
+        <p:nvSpPr>
+          <p:cNvPr id="7" name="Rectangle: Rounded Corners 6">
+            <a:extLst>
+              <a:ext uri="{FF2B5EF4-FFF2-40B4-BE49-F238E27FC236}">
+                <a16:creationId xmlns:a16="http://schemas.microsoft.com/office/drawing/2014/main" id="{BC7996F3-4C27-4B58-8ED7-DC9F0D008915}"/>
+              </a:ext>
+            </a:extLst>
+          </p:cNvPr>
+          <p:cNvSpPr/>
+          <p:nvPr/>
+        </p:nvSpPr>
+        <p:spPr>
+          <a:xfrm>
+            <a:off x="4344620" y="1045968"/>
+            <a:ext cx="3223954" cy="334986"/>
+          </a:xfrm>
+          <a:prstGeom prst="roundRect">
+            <a:avLst/>
+          </a:prstGeom>
+          <a:solidFill>
+            <a:schemeClr val="accent6">
+              <a:lumMod val="50000"/>
+            </a:schemeClr>
+          </a:solidFill>
+          <a:ln>
+            <a:solidFill>
+              <a:schemeClr val="accent6">
+                <a:lumMod val="50000"/>
+              </a:schemeClr>
+            </a:solidFill>
+            <a:prstDash val="dash"/>
+          </a:ln>
+        </p:spPr>
+        <p:style>
+          <a:lnRef idx="2">
+            <a:schemeClr val="accent1">
+              <a:shade val="50000"/>
+            </a:schemeClr>
+          </a:lnRef>
+          <a:fillRef idx="1">
+            <a:schemeClr val="accent1"/>
+          </a:fillRef>
+          <a:effectRef idx="0">
+            <a:schemeClr val="accent1"/>
+          </a:effectRef>
+          <a:fontRef idx="minor">
+            <a:schemeClr val="lt1"/>
+          </a:fontRef>
+        </p:style>
+        <p:txBody>
+          <a:bodyPr rtlCol="0" anchor="ctr"/>
+          <a:lstStyle/>
+          <a:p>
+            <a:r>
+              <a:rPr lang="en-US" altLang="zh-CN" sz="1400" dirty="0">
+                <a:latin typeface="Arial Black" panose="020B0A04020102020204" pitchFamily="34" charset="0"/>
+              </a:rPr>
+              <a:t>+: GetPort</a:t>
+            </a:r>
+            <a:endParaRPr lang="zh-CN" altLang="en-US" sz="1400" dirty="0">
+              <a:latin typeface="Arial Black" panose="020B0A04020102020204" pitchFamily="34" charset="0"/>
+            </a:endParaRPr>
+          </a:p>
+        </p:txBody>
+      </p:sp>
+      <p:sp>
+        <p:nvSpPr>
+          <p:cNvPr id="8" name="Rectangle: Rounded Corners 7">
+            <a:extLst>
+              <a:ext uri="{FF2B5EF4-FFF2-40B4-BE49-F238E27FC236}">
+                <a16:creationId xmlns:a16="http://schemas.microsoft.com/office/drawing/2014/main" id="{33FA4E78-6FB0-4B4B-AC08-10403787A862}"/>
+              </a:ext>
+            </a:extLst>
+          </p:cNvPr>
+          <p:cNvSpPr/>
+          <p:nvPr/>
+        </p:nvSpPr>
+        <p:spPr>
+          <a:xfrm>
+            <a:off x="4344617" y="1403916"/>
+            <a:ext cx="3223954" cy="334986"/>
+          </a:xfrm>
+          <a:prstGeom prst="roundRect">
+            <a:avLst/>
+          </a:prstGeom>
+          <a:solidFill>
+            <a:schemeClr val="accent6">
+              <a:lumMod val="50000"/>
+            </a:schemeClr>
+          </a:solidFill>
+          <a:ln>
+            <a:solidFill>
+              <a:schemeClr val="accent6">
+                <a:lumMod val="50000"/>
+              </a:schemeClr>
+            </a:solidFill>
+            <a:prstDash val="dash"/>
+          </a:ln>
+        </p:spPr>
+        <p:style>
+          <a:lnRef idx="2">
+            <a:schemeClr val="accent1">
+              <a:shade val="50000"/>
+            </a:schemeClr>
+          </a:lnRef>
+          <a:fillRef idx="1">
+            <a:schemeClr val="accent1"/>
+          </a:fillRef>
+          <a:effectRef idx="0">
+            <a:schemeClr val="accent1"/>
+          </a:effectRef>
+          <a:fontRef idx="minor">
+            <a:schemeClr val="lt1"/>
+          </a:fontRef>
+        </p:style>
+        <p:txBody>
+          <a:bodyPr rtlCol="0" anchor="ctr"/>
+          <a:lstStyle/>
+          <a:p>
+            <a:r>
+              <a:rPr lang="en-US" altLang="zh-CN" sz="1400" dirty="0">
+                <a:latin typeface="Arial Black" panose="020B0A04020102020204" pitchFamily="34" charset="0"/>
+              </a:rPr>
+              <a:t>+: BindLocal</a:t>
+            </a:r>
+            <a:endParaRPr lang="zh-CN" altLang="en-US" sz="1400" dirty="0">
+              <a:latin typeface="Arial Black" panose="020B0A04020102020204" pitchFamily="34" charset="0"/>
+            </a:endParaRPr>
+          </a:p>
+        </p:txBody>
+      </p:sp>
+      <p:sp>
+        <p:nvSpPr>
+          <p:cNvPr id="9" name="Rectangle: Rounded Corners 8">
+            <a:extLst>
+              <a:ext uri="{FF2B5EF4-FFF2-40B4-BE49-F238E27FC236}">
+                <a16:creationId xmlns:a16="http://schemas.microsoft.com/office/drawing/2014/main" id="{7A57735D-77DA-4650-A040-AC81F661AB25}"/>
+              </a:ext>
+            </a:extLst>
+          </p:cNvPr>
+          <p:cNvSpPr/>
+          <p:nvPr/>
+        </p:nvSpPr>
+        <p:spPr>
+          <a:xfrm>
+            <a:off x="4344617" y="1762181"/>
+            <a:ext cx="3223954" cy="334986"/>
+          </a:xfrm>
+          <a:prstGeom prst="roundRect">
+            <a:avLst/>
+          </a:prstGeom>
+          <a:solidFill>
+            <a:schemeClr val="accent6">
+              <a:lumMod val="50000"/>
+            </a:schemeClr>
+          </a:solidFill>
+          <a:ln>
+            <a:solidFill>
+              <a:schemeClr val="accent6">
+                <a:lumMod val="50000"/>
+              </a:schemeClr>
+            </a:solidFill>
+            <a:prstDash val="dash"/>
+          </a:ln>
+        </p:spPr>
+        <p:style>
+          <a:lnRef idx="2">
+            <a:schemeClr val="accent1">
+              <a:shade val="50000"/>
+            </a:schemeClr>
+          </a:lnRef>
+          <a:fillRef idx="1">
+            <a:schemeClr val="accent1"/>
+          </a:fillRef>
+          <a:effectRef idx="0">
+            <a:schemeClr val="accent1"/>
+          </a:effectRef>
+          <a:fontRef idx="minor">
+            <a:schemeClr val="lt1"/>
+          </a:fontRef>
+        </p:style>
+        <p:txBody>
+          <a:bodyPr rtlCol="0" anchor="ctr"/>
+          <a:lstStyle/>
+          <a:p>
+            <a:r>
+              <a:rPr lang="en-US" altLang="zh-CN" sz="1400" dirty="0">
+                <a:latin typeface="Arial Black" panose="020B0A04020102020204" pitchFamily="34" charset="0"/>
+              </a:rPr>
+              <a:t>+: BindRemote</a:t>
+            </a:r>
+            <a:endParaRPr lang="zh-CN" altLang="en-US" sz="1400" dirty="0">
+              <a:latin typeface="Arial Black" panose="020B0A04020102020204" pitchFamily="34" charset="0"/>
+            </a:endParaRPr>
+          </a:p>
+        </p:txBody>
+      </p:sp>
+      <p:sp>
+        <p:nvSpPr>
+          <p:cNvPr id="10" name="Rectangle: Rounded Corners 9">
+            <a:extLst>
+              <a:ext uri="{FF2B5EF4-FFF2-40B4-BE49-F238E27FC236}">
+                <a16:creationId xmlns:a16="http://schemas.microsoft.com/office/drawing/2014/main" id="{0B29A1D6-2AEB-4E2C-88EA-BF5A574AA8F8}"/>
+              </a:ext>
+            </a:extLst>
+          </p:cNvPr>
+          <p:cNvSpPr/>
+          <p:nvPr/>
+        </p:nvSpPr>
+        <p:spPr>
+          <a:xfrm>
+            <a:off x="4344617" y="2120446"/>
+            <a:ext cx="3223954" cy="334986"/>
+          </a:xfrm>
+          <a:prstGeom prst="roundRect">
+            <a:avLst/>
+          </a:prstGeom>
+          <a:solidFill>
+            <a:schemeClr val="accent6">
+              <a:lumMod val="50000"/>
+            </a:schemeClr>
+          </a:solidFill>
+          <a:ln>
+            <a:solidFill>
+              <a:schemeClr val="accent6">
+                <a:lumMod val="50000"/>
+              </a:schemeClr>
+            </a:solidFill>
+            <a:prstDash val="dash"/>
+          </a:ln>
+        </p:spPr>
+        <p:style>
+          <a:lnRef idx="2">
+            <a:schemeClr val="accent1">
+              <a:shade val="50000"/>
+            </a:schemeClr>
+          </a:lnRef>
+          <a:fillRef idx="1">
+            <a:schemeClr val="accent1"/>
+          </a:fillRef>
+          <a:effectRef idx="0">
+            <a:schemeClr val="accent1"/>
+          </a:effectRef>
+          <a:fontRef idx="minor">
+            <a:schemeClr val="lt1"/>
+          </a:fontRef>
+        </p:style>
+        <p:txBody>
+          <a:bodyPr rtlCol="0" anchor="ctr"/>
+          <a:lstStyle/>
+          <a:p>
+            <a:r>
+              <a:rPr lang="en-US" altLang="zh-CN" sz="1400" dirty="0">
+                <a:latin typeface="Arial Black" panose="020B0A04020102020204" pitchFamily="34" charset="0"/>
+              </a:rPr>
+              <a:t>+: Write</a:t>
+            </a:r>
+            <a:endParaRPr lang="zh-CN" altLang="en-US" sz="1400" dirty="0">
+              <a:latin typeface="Arial Black" panose="020B0A04020102020204" pitchFamily="34" charset="0"/>
+            </a:endParaRPr>
+          </a:p>
+        </p:txBody>
+      </p:sp>
+      <p:sp>
+        <p:nvSpPr>
+          <p:cNvPr id="11" name="Rectangle: Rounded Corners 10">
+            <a:extLst>
+              <a:ext uri="{FF2B5EF4-FFF2-40B4-BE49-F238E27FC236}">
+                <a16:creationId xmlns:a16="http://schemas.microsoft.com/office/drawing/2014/main" id="{C25F2242-8FB2-4482-BCF8-91239D3AB63D}"/>
+              </a:ext>
+            </a:extLst>
+          </p:cNvPr>
+          <p:cNvSpPr/>
+          <p:nvPr/>
+        </p:nvSpPr>
+        <p:spPr>
+          <a:xfrm>
+            <a:off x="4344617" y="2491399"/>
+            <a:ext cx="3223954" cy="334986"/>
+          </a:xfrm>
+          <a:prstGeom prst="roundRect">
+            <a:avLst/>
+          </a:prstGeom>
+          <a:solidFill>
+            <a:schemeClr val="accent6">
+              <a:lumMod val="50000"/>
+            </a:schemeClr>
+          </a:solidFill>
+          <a:ln>
+            <a:solidFill>
+              <a:schemeClr val="accent6">
+                <a:lumMod val="50000"/>
+              </a:schemeClr>
+            </a:solidFill>
+            <a:prstDash val="dash"/>
+          </a:ln>
+        </p:spPr>
+        <p:style>
+          <a:lnRef idx="2">
+            <a:schemeClr val="accent1">
+              <a:shade val="50000"/>
+            </a:schemeClr>
+          </a:lnRef>
+          <a:fillRef idx="1">
+            <a:schemeClr val="accent1"/>
+          </a:fillRef>
+          <a:effectRef idx="0">
+            <a:schemeClr val="accent1"/>
+          </a:effectRef>
+          <a:fontRef idx="minor">
+            <a:schemeClr val="lt1"/>
+          </a:fontRef>
+        </p:style>
+        <p:txBody>
+          <a:bodyPr rtlCol="0" anchor="ctr"/>
+          <a:lstStyle/>
+          <a:p>
+            <a:r>
+              <a:rPr lang="en-US" altLang="zh-CN" sz="1400" dirty="0">
+                <a:latin typeface="Arial Black" panose="020B0A04020102020204" pitchFamily="34" charset="0"/>
+              </a:rPr>
+              <a:t>+: Read</a:t>
+            </a:r>
+            <a:endParaRPr lang="zh-CN" altLang="en-US" sz="1400" dirty="0">
+              <a:latin typeface="Arial Black" panose="020B0A04020102020204" pitchFamily="34" charset="0"/>
+            </a:endParaRPr>
+          </a:p>
+        </p:txBody>
+      </p:sp>
+      <p:sp>
+        <p:nvSpPr>
+          <p:cNvPr id="13" name="Rectangle: Rounded Corners 12">
+            <a:extLst>
+              <a:ext uri="{FF2B5EF4-FFF2-40B4-BE49-F238E27FC236}">
+                <a16:creationId xmlns:a16="http://schemas.microsoft.com/office/drawing/2014/main" id="{A1984F65-00AF-4143-B767-507515BD11EC}"/>
+              </a:ext>
+            </a:extLst>
+          </p:cNvPr>
+          <p:cNvSpPr/>
+          <p:nvPr/>
+        </p:nvSpPr>
+        <p:spPr>
+          <a:xfrm>
+            <a:off x="310418" y="4204805"/>
+            <a:ext cx="2330038" cy="334986"/>
+          </a:xfrm>
+          <a:prstGeom prst="roundRect">
+            <a:avLst/>
+          </a:prstGeom>
+          <a:solidFill>
+            <a:schemeClr val="accent6">
+              <a:lumMod val="60000"/>
+              <a:lumOff val="40000"/>
+            </a:schemeClr>
+          </a:solidFill>
+          <a:ln>
+            <a:solidFill>
+              <a:srgbClr val="00B0F0"/>
+            </a:solidFill>
+            <a:prstDash val="dash"/>
+          </a:ln>
+        </p:spPr>
+        <p:style>
+          <a:lnRef idx="2">
+            <a:schemeClr val="accent1">
+              <a:shade val="50000"/>
+            </a:schemeClr>
+          </a:lnRef>
+          <a:fillRef idx="1">
+            <a:schemeClr val="accent1"/>
+          </a:fillRef>
+          <a:effectRef idx="0">
+            <a:schemeClr val="accent1"/>
+          </a:effectRef>
+          <a:fontRef idx="minor">
+            <a:schemeClr val="lt1"/>
+          </a:fontRef>
+        </p:style>
+        <p:txBody>
+          <a:bodyPr rtlCol="0" anchor="ctr"/>
+          <a:lstStyle/>
+          <a:p>
+            <a:r>
+              <a:rPr lang="en-US" altLang="zh-CN" sz="1000" dirty="0">
+                <a:latin typeface="Arial Black" panose="020B0A04020102020204" pitchFamily="34" charset="0"/>
+              </a:rPr>
+              <a:t>+: BindRemote (connect)</a:t>
+            </a:r>
+            <a:endParaRPr lang="zh-CN" altLang="en-US" sz="1000" dirty="0">
+              <a:latin typeface="Arial Black" panose="020B0A04020102020204" pitchFamily="34" charset="0"/>
+            </a:endParaRPr>
+          </a:p>
+        </p:txBody>
+      </p:sp>
+      <p:sp>
+        <p:nvSpPr>
+          <p:cNvPr id="14" name="Rectangle: Rounded Corners 13">
+            <a:extLst>
+              <a:ext uri="{FF2B5EF4-FFF2-40B4-BE49-F238E27FC236}">
+                <a16:creationId xmlns:a16="http://schemas.microsoft.com/office/drawing/2014/main" id="{01F847B1-0CA5-4365-8720-E4DFDEFD8E97}"/>
+              </a:ext>
+            </a:extLst>
+          </p:cNvPr>
+          <p:cNvSpPr/>
+          <p:nvPr/>
+        </p:nvSpPr>
+        <p:spPr>
+          <a:xfrm>
+            <a:off x="8657625" y="4204805"/>
+            <a:ext cx="2253530" cy="334986"/>
+          </a:xfrm>
+          <a:prstGeom prst="roundRect">
+            <a:avLst/>
+          </a:prstGeom>
+          <a:solidFill>
+            <a:schemeClr val="accent6">
+              <a:lumMod val="60000"/>
+              <a:lumOff val="40000"/>
+            </a:schemeClr>
+          </a:solidFill>
+          <a:ln>
+            <a:solidFill>
+              <a:srgbClr val="00B0F0"/>
+            </a:solidFill>
+            <a:prstDash val="dash"/>
+          </a:ln>
+        </p:spPr>
+        <p:style>
+          <a:lnRef idx="2">
+            <a:schemeClr val="accent1">
+              <a:shade val="50000"/>
+            </a:schemeClr>
+          </a:lnRef>
+          <a:fillRef idx="1">
+            <a:schemeClr val="accent1"/>
+          </a:fillRef>
+          <a:effectRef idx="0">
+            <a:schemeClr val="accent1"/>
+          </a:effectRef>
+          <a:fontRef idx="minor">
+            <a:schemeClr val="lt1"/>
+          </a:fontRef>
+        </p:style>
+        <p:txBody>
+          <a:bodyPr rtlCol="0" anchor="ctr"/>
+          <a:lstStyle/>
+          <a:p>
+            <a:r>
+              <a:rPr lang="en-US" altLang="zh-CN" sz="1000" dirty="0">
+                <a:latin typeface="Arial Black" panose="020B0A04020102020204" pitchFamily="34" charset="0"/>
+              </a:rPr>
+              <a:t>+: BindRemote</a:t>
+            </a:r>
+            <a:endParaRPr lang="zh-CN" altLang="en-US" sz="1000" dirty="0">
+              <a:latin typeface="Arial Black" panose="020B0A04020102020204" pitchFamily="34" charset="0"/>
+            </a:endParaRPr>
+          </a:p>
+        </p:txBody>
+      </p:sp>
+      <p:sp>
+        <p:nvSpPr>
+          <p:cNvPr id="15" name="Rectangle: Diagonal Corners Rounded 14">
+            <a:extLst>
+              <a:ext uri="{FF2B5EF4-FFF2-40B4-BE49-F238E27FC236}">
+                <a16:creationId xmlns:a16="http://schemas.microsoft.com/office/drawing/2014/main" id="{7571B7D1-CACB-4C2C-9D98-E846E26268B6}"/>
+              </a:ext>
+            </a:extLst>
+          </p:cNvPr>
+          <p:cNvSpPr/>
+          <p:nvPr/>
+        </p:nvSpPr>
+        <p:spPr>
+          <a:xfrm>
+            <a:off x="4365166" y="3718798"/>
+            <a:ext cx="2588295" cy="2800601"/>
+          </a:xfrm>
+          <a:prstGeom prst="round2DiagRect">
+            <a:avLst>
+              <a:gd name="adj1" fmla="val 6397"/>
+              <a:gd name="adj2" fmla="val 4890"/>
+            </a:avLst>
+          </a:prstGeom>
+          <a:solidFill>
+            <a:schemeClr val="accent1">
+              <a:lumMod val="60000"/>
+              <a:lumOff val="40000"/>
+            </a:schemeClr>
+          </a:solidFill>
+          <a:ln w="9525">
+            <a:prstDash val="dash"/>
+          </a:ln>
+        </p:spPr>
+        <p:style>
+          <a:lnRef idx="2">
+            <a:schemeClr val="accent1">
+              <a:shade val="50000"/>
+            </a:schemeClr>
+          </a:lnRef>
+          <a:fillRef idx="1">
+            <a:schemeClr val="accent1"/>
+          </a:fillRef>
+          <a:effectRef idx="0">
+            <a:schemeClr val="accent1"/>
+          </a:effectRef>
+          <a:fontRef idx="minor">
+            <a:schemeClr val="lt1"/>
+          </a:fontRef>
+        </p:style>
+        <p:txBody>
+          <a:bodyPr rtlCol="0" anchor="t" anchorCtr="1"/>
+          <a:lstStyle/>
+          <a:p>
+            <a:pPr algn="ctr"/>
+            <a:r>
+              <a:rPr lang="en-US" altLang="zh-CN" sz="1400" dirty="0">
+                <a:latin typeface="Britannic Bold" panose="020B0903060703020204" pitchFamily="34" charset="0"/>
+              </a:rPr>
+              <a:t>TCPServerChannel</a:t>
+            </a:r>
+            <a:endParaRPr lang="zh-CN" altLang="en-US" sz="1400" dirty="0">
+              <a:latin typeface="Britannic Bold" panose="020B0903060703020204" pitchFamily="34" charset="0"/>
+            </a:endParaRPr>
+          </a:p>
+        </p:txBody>
+      </p:sp>
+      <p:sp>
+        <p:nvSpPr>
+          <p:cNvPr id="16" name="Rectangle: Rounded Corners 15">
+            <a:extLst>
+              <a:ext uri="{FF2B5EF4-FFF2-40B4-BE49-F238E27FC236}">
+                <a16:creationId xmlns:a16="http://schemas.microsoft.com/office/drawing/2014/main" id="{F28836CB-2B0F-447E-9C68-835B6FA4AF77}"/>
+              </a:ext>
+            </a:extLst>
+          </p:cNvPr>
+          <p:cNvSpPr/>
+          <p:nvPr/>
+        </p:nvSpPr>
+        <p:spPr>
+          <a:xfrm>
+            <a:off x="310420" y="4539791"/>
+            <a:ext cx="2330038" cy="334985"/>
+          </a:xfrm>
+          <a:prstGeom prst="roundRect">
+            <a:avLst/>
+          </a:prstGeom>
+          <a:solidFill>
+            <a:schemeClr val="accent3">
+              <a:lumMod val="60000"/>
+              <a:lumOff val="40000"/>
+            </a:schemeClr>
+          </a:solidFill>
+          <a:ln>
+            <a:solidFill>
+              <a:schemeClr val="accent3">
+                <a:lumMod val="20000"/>
+                <a:lumOff val="80000"/>
+              </a:schemeClr>
+            </a:solidFill>
+          </a:ln>
+        </p:spPr>
+        <p:style>
+          <a:lnRef idx="2">
+            <a:schemeClr val="accent1">
+              <a:shade val="50000"/>
+            </a:schemeClr>
+          </a:lnRef>
+          <a:fillRef idx="1">
+            <a:schemeClr val="accent1"/>
+          </a:fillRef>
+          <a:effectRef idx="0">
+            <a:schemeClr val="accent1"/>
+          </a:effectRef>
+          <a:fontRef idx="minor">
+            <a:schemeClr val="lt1"/>
+          </a:fontRef>
+        </p:style>
+        <p:txBody>
+          <a:bodyPr rtlCol="0" anchor="ctr"/>
+          <a:lstStyle/>
+          <a:p>
+            <a:r>
+              <a:rPr lang="en-US" altLang="zh-CN" sz="1000" dirty="0">
+                <a:latin typeface="Arial Black" panose="020B0A04020102020204" pitchFamily="34" charset="0"/>
+              </a:rPr>
+              <a:t>*: boost::asio::ip::tcp::socket</a:t>
+            </a:r>
+            <a:endParaRPr lang="zh-CN" altLang="en-US" sz="1000" dirty="0">
+              <a:latin typeface="Arial Black" panose="020B0A04020102020204" pitchFamily="34" charset="0"/>
+            </a:endParaRPr>
+          </a:p>
+        </p:txBody>
+      </p:sp>
+      <p:sp>
+        <p:nvSpPr>
+          <p:cNvPr id="17" name="Rectangle: Rounded Corners 16">
+            <a:extLst>
+              <a:ext uri="{FF2B5EF4-FFF2-40B4-BE49-F238E27FC236}">
+                <a16:creationId xmlns:a16="http://schemas.microsoft.com/office/drawing/2014/main" id="{180636F7-D53C-42A0-A1A9-B3196BC50C73}"/>
+              </a:ext>
+            </a:extLst>
+          </p:cNvPr>
+          <p:cNvSpPr/>
+          <p:nvPr/>
+        </p:nvSpPr>
+        <p:spPr>
+          <a:xfrm>
+            <a:off x="8657622" y="4550064"/>
+            <a:ext cx="2253533" cy="334985"/>
+          </a:xfrm>
+          <a:prstGeom prst="roundRect">
+            <a:avLst/>
+          </a:prstGeom>
+          <a:solidFill>
+            <a:schemeClr val="accent3">
+              <a:lumMod val="60000"/>
+              <a:lumOff val="40000"/>
+            </a:schemeClr>
+          </a:solidFill>
+          <a:ln>
+            <a:solidFill>
+              <a:schemeClr val="accent3">
+                <a:lumMod val="20000"/>
+                <a:lumOff val="80000"/>
+              </a:schemeClr>
+            </a:solidFill>
+          </a:ln>
+        </p:spPr>
+        <p:style>
+          <a:lnRef idx="2">
+            <a:schemeClr val="accent1">
+              <a:shade val="50000"/>
+            </a:schemeClr>
+          </a:lnRef>
+          <a:fillRef idx="1">
+            <a:schemeClr val="accent1"/>
+          </a:fillRef>
+          <a:effectRef idx="0">
+            <a:schemeClr val="accent1"/>
+          </a:effectRef>
+          <a:fontRef idx="minor">
+            <a:schemeClr val="lt1"/>
+          </a:fontRef>
+        </p:style>
+        <p:txBody>
+          <a:bodyPr rtlCol="0" anchor="ctr"/>
+          <a:lstStyle/>
+          <a:p>
+            <a:r>
+              <a:rPr lang="en-US" altLang="zh-CN" sz="1000" dirty="0">
+                <a:latin typeface="Arial Black" panose="020B0A04020102020204" pitchFamily="34" charset="0"/>
+              </a:rPr>
+              <a:t>*: boost::asio::ip::udp::socket</a:t>
+            </a:r>
+            <a:endParaRPr lang="zh-CN" altLang="en-US" sz="1000" dirty="0">
+              <a:latin typeface="Arial Black" panose="020B0A04020102020204" pitchFamily="34" charset="0"/>
+            </a:endParaRPr>
+          </a:p>
+        </p:txBody>
+      </p:sp>
+      <p:sp>
+        <p:nvSpPr>
+          <p:cNvPr id="3" name="Isosceles Triangle 2">
+            <a:extLst>
+              <a:ext uri="{FF2B5EF4-FFF2-40B4-BE49-F238E27FC236}">
+                <a16:creationId xmlns:a16="http://schemas.microsoft.com/office/drawing/2014/main" id="{8EB90C99-6C95-4795-B9E8-CEE93496E04C}"/>
+              </a:ext>
+            </a:extLst>
+          </p:cNvPr>
+          <p:cNvSpPr/>
+          <p:nvPr/>
+        </p:nvSpPr>
+        <p:spPr>
+          <a:xfrm>
+            <a:off x="5865093" y="2929832"/>
+            <a:ext cx="182997" cy="157756"/>
+          </a:xfrm>
+          <a:prstGeom prst="triangle">
+            <a:avLst/>
+          </a:prstGeom>
+        </p:spPr>
+        <p:style>
+          <a:lnRef idx="2">
+            <a:schemeClr val="accent1">
+              <a:shade val="50000"/>
+            </a:schemeClr>
+          </a:lnRef>
+          <a:fillRef idx="1">
+            <a:schemeClr val="accent1"/>
+          </a:fillRef>
+          <a:effectRef idx="0">
+            <a:schemeClr val="accent1"/>
+          </a:effectRef>
+          <a:fontRef idx="minor">
+            <a:schemeClr val="lt1"/>
+          </a:fontRef>
+        </p:style>
+        <p:txBody>
+          <a:bodyPr rtlCol="0" anchor="ctr"/>
+          <a:lstStyle/>
+          <a:p>
+            <a:pPr algn="ctr"/>
+            <a:endParaRPr lang="zh-CN" altLang="en-US"/>
+          </a:p>
+        </p:txBody>
+      </p:sp>
+      <p:cxnSp>
+        <p:nvCxnSpPr>
+          <p:cNvPr id="19" name="Connector: Elbow 18">
+            <a:extLst>
+              <a:ext uri="{FF2B5EF4-FFF2-40B4-BE49-F238E27FC236}">
+                <a16:creationId xmlns:a16="http://schemas.microsoft.com/office/drawing/2014/main" id="{3F9CCEE6-6057-4569-92AE-84D58AF08E27}"/>
+              </a:ext>
+            </a:extLst>
+          </p:cNvPr>
+          <p:cNvCxnSpPr>
+            <a:cxnSpLocks/>
+            <a:stCxn id="3" idx="3"/>
+            <a:endCxn id="4" idx="3"/>
+          </p:cNvCxnSpPr>
+          <p:nvPr/>
+        </p:nvCxnSpPr>
+        <p:spPr>
+          <a:xfrm rot="5400000">
+            <a:off x="3416342" y="1146686"/>
+            <a:ext cx="599348" cy="4481153"/>
+          </a:xfrm>
+          <a:prstGeom prst="bentConnector3">
+            <a:avLst/>
+          </a:prstGeom>
+        </p:spPr>
+        <p:style>
+          <a:lnRef idx="1">
+            <a:schemeClr val="accent1"/>
+          </a:lnRef>
+          <a:fillRef idx="0">
+            <a:schemeClr val="accent1"/>
+          </a:fillRef>
+          <a:effectRef idx="0">
+            <a:schemeClr val="accent1"/>
+          </a:effectRef>
+          <a:fontRef idx="minor">
+            <a:schemeClr val="tx1"/>
+          </a:fontRef>
+        </p:style>
+      </p:cxnSp>
+      <p:cxnSp>
+        <p:nvCxnSpPr>
+          <p:cNvPr id="22" name="Connector: Elbow 21">
+            <a:extLst>
+              <a:ext uri="{FF2B5EF4-FFF2-40B4-BE49-F238E27FC236}">
+                <a16:creationId xmlns:a16="http://schemas.microsoft.com/office/drawing/2014/main" id="{4D749AF5-46CD-4F00-B2C5-25A623DA7D5E}"/>
+              </a:ext>
+            </a:extLst>
+          </p:cNvPr>
+          <p:cNvCxnSpPr>
+            <a:cxnSpLocks/>
+            <a:stCxn id="3" idx="3"/>
+            <a:endCxn id="5" idx="3"/>
+          </p:cNvCxnSpPr>
+          <p:nvPr/>
+        </p:nvCxnSpPr>
+        <p:spPr>
+          <a:xfrm rot="16200000" flipH="1">
+            <a:off x="7570819" y="1473361"/>
+            <a:ext cx="599348" cy="3827802"/>
+          </a:xfrm>
+          <a:prstGeom prst="bentConnector3">
+            <a:avLst>
+              <a:gd name="adj1" fmla="val 50000"/>
+            </a:avLst>
+          </a:prstGeom>
+        </p:spPr>
+        <p:style>
+          <a:lnRef idx="1">
+            <a:schemeClr val="accent1"/>
+          </a:lnRef>
+          <a:fillRef idx="0">
+            <a:schemeClr val="accent1"/>
+          </a:fillRef>
+          <a:effectRef idx="0">
+            <a:schemeClr val="accent1"/>
+          </a:effectRef>
+          <a:fontRef idx="minor">
+            <a:schemeClr val="tx1"/>
+          </a:fontRef>
+        </p:style>
+      </p:cxnSp>
+      <p:sp>
+        <p:nvSpPr>
+          <p:cNvPr id="24" name="Isosceles Triangle 23">
+            <a:extLst>
+              <a:ext uri="{FF2B5EF4-FFF2-40B4-BE49-F238E27FC236}">
+                <a16:creationId xmlns:a16="http://schemas.microsoft.com/office/drawing/2014/main" id="{5653A31A-C6C8-4E50-B1E8-83EB771E511E}"/>
+              </a:ext>
+            </a:extLst>
+          </p:cNvPr>
+          <p:cNvSpPr/>
+          <p:nvPr/>
+        </p:nvSpPr>
+        <p:spPr>
+          <a:xfrm rot="16200000">
+            <a:off x="2627702" y="4795062"/>
+            <a:ext cx="184935" cy="159427"/>
+          </a:xfrm>
+          <a:prstGeom prst="triangle">
+            <a:avLst/>
+          </a:prstGeom>
+        </p:spPr>
+        <p:style>
+          <a:lnRef idx="2">
+            <a:schemeClr val="accent1">
+              <a:shade val="50000"/>
+            </a:schemeClr>
+          </a:lnRef>
+          <a:fillRef idx="1">
+            <a:schemeClr val="accent1"/>
+          </a:fillRef>
+          <a:effectRef idx="0">
+            <a:schemeClr val="accent1"/>
+          </a:effectRef>
+          <a:fontRef idx="minor">
+            <a:schemeClr val="lt1"/>
+          </a:fontRef>
+        </p:style>
+        <p:txBody>
+          <a:bodyPr rtlCol="0" anchor="ctr"/>
+          <a:lstStyle/>
+          <a:p>
+            <a:pPr algn="ctr"/>
+            <a:endParaRPr lang="zh-CN" altLang="en-US"/>
+          </a:p>
+        </p:txBody>
+      </p:sp>
+      <p:cxnSp>
+        <p:nvCxnSpPr>
+          <p:cNvPr id="26" name="Straight Connector 25">
+            <a:extLst>
+              <a:ext uri="{FF2B5EF4-FFF2-40B4-BE49-F238E27FC236}">
+                <a16:creationId xmlns:a16="http://schemas.microsoft.com/office/drawing/2014/main" id="{434C82C3-5587-4F12-A7CD-F6F15F0A55AD}"/>
+              </a:ext>
+            </a:extLst>
+          </p:cNvPr>
+          <p:cNvCxnSpPr>
+            <a:cxnSpLocks/>
+            <a:stCxn id="24" idx="3"/>
+          </p:cNvCxnSpPr>
+          <p:nvPr/>
+        </p:nvCxnSpPr>
+        <p:spPr>
+          <a:xfrm>
+            <a:off x="2799883" y="4874775"/>
+            <a:ext cx="1544734" cy="0"/>
+          </a:xfrm>
+          <a:prstGeom prst="line">
+            <a:avLst/>
+          </a:prstGeom>
+        </p:spPr>
+        <p:style>
+          <a:lnRef idx="1">
+            <a:schemeClr val="accent1"/>
+          </a:lnRef>
+          <a:fillRef idx="0">
+            <a:schemeClr val="accent1"/>
+          </a:fillRef>
+          <a:effectRef idx="0">
+            <a:schemeClr val="accent1"/>
+          </a:effectRef>
+          <a:fontRef idx="minor">
+            <a:schemeClr val="tx1"/>
+          </a:fontRef>
+        </p:style>
+      </p:cxnSp>
+      <p:sp>
+        <p:nvSpPr>
+          <p:cNvPr id="31" name="Rectangle: Rounded Corners 30">
+            <a:extLst>
+              <a:ext uri="{FF2B5EF4-FFF2-40B4-BE49-F238E27FC236}">
+                <a16:creationId xmlns:a16="http://schemas.microsoft.com/office/drawing/2014/main" id="{14B74A03-BC12-4C55-9093-E13D8F3DDBC9}"/>
+              </a:ext>
+            </a:extLst>
+          </p:cNvPr>
+          <p:cNvSpPr/>
+          <p:nvPr/>
+        </p:nvSpPr>
+        <p:spPr>
+          <a:xfrm>
+            <a:off x="4365163" y="4151598"/>
+            <a:ext cx="2588295" cy="334986"/>
+          </a:xfrm>
+          <a:prstGeom prst="roundRect">
+            <a:avLst/>
+          </a:prstGeom>
+          <a:solidFill>
+            <a:schemeClr val="accent6">
+              <a:lumMod val="60000"/>
+              <a:lumOff val="40000"/>
+            </a:schemeClr>
+          </a:solidFill>
+          <a:ln>
+            <a:solidFill>
+              <a:srgbClr val="00B0F0"/>
+            </a:solidFill>
+            <a:prstDash val="dash"/>
+          </a:ln>
+        </p:spPr>
+        <p:style>
+          <a:lnRef idx="2">
+            <a:schemeClr val="accent1">
+              <a:shade val="50000"/>
+            </a:schemeClr>
+          </a:lnRef>
+          <a:fillRef idx="1">
+            <a:schemeClr val="accent1"/>
+          </a:fillRef>
+          <a:effectRef idx="0">
+            <a:schemeClr val="accent1"/>
+          </a:effectRef>
+          <a:fontRef idx="minor">
+            <a:schemeClr val="lt1"/>
+          </a:fontRef>
+        </p:style>
+        <p:txBody>
+          <a:bodyPr rtlCol="0" anchor="ctr"/>
+          <a:lstStyle/>
+          <a:p>
+            <a:r>
+              <a:rPr lang="en-US" altLang="zh-CN" sz="1000" dirty="0">
+                <a:latin typeface="Arial Black" panose="020B0A04020102020204" pitchFamily="34" charset="0"/>
+              </a:rPr>
+              <a:t>+: BindRemote ()</a:t>
+            </a:r>
+            <a:endParaRPr lang="zh-CN" altLang="en-US" sz="1000" dirty="0">
+              <a:latin typeface="Arial Black" panose="020B0A04020102020204" pitchFamily="34" charset="0"/>
+            </a:endParaRPr>
+          </a:p>
+        </p:txBody>
+      </p:sp>
+      <p:sp>
+        <p:nvSpPr>
+          <p:cNvPr id="32" name="Rectangle: Rounded Corners 31">
+            <a:extLst>
+              <a:ext uri="{FF2B5EF4-FFF2-40B4-BE49-F238E27FC236}">
+                <a16:creationId xmlns:a16="http://schemas.microsoft.com/office/drawing/2014/main" id="{B578B769-73C3-4AF2-9A73-9547256F2A67}"/>
+              </a:ext>
+            </a:extLst>
+          </p:cNvPr>
+          <p:cNvSpPr/>
+          <p:nvPr/>
+        </p:nvSpPr>
+        <p:spPr>
+          <a:xfrm>
+            <a:off x="4375441" y="5313334"/>
+            <a:ext cx="2588295" cy="334985"/>
+          </a:xfrm>
+          <a:prstGeom prst="roundRect">
+            <a:avLst/>
+          </a:prstGeom>
+          <a:solidFill>
+            <a:schemeClr val="accent3">
+              <a:lumMod val="60000"/>
+              <a:lumOff val="40000"/>
+            </a:schemeClr>
+          </a:solidFill>
+          <a:ln>
+            <a:solidFill>
+              <a:schemeClr val="accent3">
+                <a:lumMod val="20000"/>
+                <a:lumOff val="80000"/>
+              </a:schemeClr>
+            </a:solidFill>
+          </a:ln>
+        </p:spPr>
+        <p:style>
+          <a:lnRef idx="2">
+            <a:schemeClr val="accent1">
+              <a:shade val="50000"/>
+            </a:schemeClr>
+          </a:lnRef>
+          <a:fillRef idx="1">
+            <a:schemeClr val="accent1"/>
+          </a:fillRef>
+          <a:effectRef idx="0">
+            <a:schemeClr val="accent1"/>
+          </a:effectRef>
+          <a:fontRef idx="minor">
+            <a:schemeClr val="lt1"/>
+          </a:fontRef>
+        </p:style>
+        <p:txBody>
+          <a:bodyPr rtlCol="0" anchor="ctr"/>
+          <a:lstStyle/>
+          <a:p>
+            <a:r>
+              <a:rPr lang="en-US" altLang="zh-CN" sz="1000" dirty="0">
+                <a:latin typeface="Arial Black" panose="020B0A04020102020204" pitchFamily="34" charset="0"/>
+              </a:rPr>
+              <a:t>*: boost::asio::ip::tcp::acceptor</a:t>
+            </a:r>
+            <a:endParaRPr lang="zh-CN" altLang="en-US" sz="1000" dirty="0">
+              <a:latin typeface="Arial Black" panose="020B0A04020102020204" pitchFamily="34" charset="0"/>
+            </a:endParaRPr>
+          </a:p>
+        </p:txBody>
+      </p:sp>
+      <p:sp>
+        <p:nvSpPr>
+          <p:cNvPr id="33" name="Rectangle: Rounded Corners 32">
+            <a:extLst>
+              <a:ext uri="{FF2B5EF4-FFF2-40B4-BE49-F238E27FC236}">
+                <a16:creationId xmlns:a16="http://schemas.microsoft.com/office/drawing/2014/main" id="{E59CDF9F-D85D-4649-B5F2-2A66EB72BE2D}"/>
+              </a:ext>
+            </a:extLst>
+          </p:cNvPr>
+          <p:cNvSpPr/>
+          <p:nvPr/>
+        </p:nvSpPr>
+        <p:spPr>
+          <a:xfrm>
+            <a:off x="4375440" y="4520031"/>
+            <a:ext cx="2588295" cy="334986"/>
+          </a:xfrm>
+          <a:prstGeom prst="roundRect">
+            <a:avLst/>
+          </a:prstGeom>
+          <a:solidFill>
+            <a:schemeClr val="accent6">
+              <a:lumMod val="60000"/>
+              <a:lumOff val="40000"/>
+            </a:schemeClr>
+          </a:solidFill>
+          <a:ln>
+            <a:solidFill>
+              <a:srgbClr val="00B0F0"/>
+            </a:solidFill>
+            <a:prstDash val="dash"/>
+          </a:ln>
+        </p:spPr>
+        <p:style>
+          <a:lnRef idx="2">
+            <a:schemeClr val="accent1">
+              <a:shade val="50000"/>
+            </a:schemeClr>
+          </a:lnRef>
+          <a:fillRef idx="1">
+            <a:schemeClr val="accent1"/>
+          </a:fillRef>
+          <a:effectRef idx="0">
+            <a:schemeClr val="accent1"/>
+          </a:effectRef>
+          <a:fontRef idx="minor">
+            <a:schemeClr val="lt1"/>
+          </a:fontRef>
+        </p:style>
+        <p:txBody>
+          <a:bodyPr rtlCol="0" anchor="ctr"/>
+          <a:lstStyle/>
+          <a:p>
+            <a:r>
+              <a:rPr lang="en-US" altLang="zh-CN" sz="1000" dirty="0">
+                <a:latin typeface="Arial Black" panose="020B0A04020102020204" pitchFamily="34" charset="0"/>
+              </a:rPr>
+              <a:t>+: accept ()</a:t>
+            </a:r>
+            <a:endParaRPr lang="zh-CN" altLang="en-US" sz="1000" dirty="0">
+              <a:latin typeface="Arial Black" panose="020B0A04020102020204" pitchFamily="34" charset="0"/>
+            </a:endParaRPr>
+          </a:p>
+        </p:txBody>
+      </p:sp>
+      <p:sp>
+        <p:nvSpPr>
+          <p:cNvPr id="34" name="Rectangle: Rounded Corners 33">
+            <a:extLst>
+              <a:ext uri="{FF2B5EF4-FFF2-40B4-BE49-F238E27FC236}">
+                <a16:creationId xmlns:a16="http://schemas.microsoft.com/office/drawing/2014/main" id="{2EB14DF6-85C0-47F4-B705-B5CE381807B8}"/>
+              </a:ext>
+            </a:extLst>
+          </p:cNvPr>
+          <p:cNvSpPr/>
+          <p:nvPr/>
+        </p:nvSpPr>
+        <p:spPr>
+          <a:xfrm>
+            <a:off x="4365162" y="4912872"/>
+            <a:ext cx="2588295" cy="334986"/>
+          </a:xfrm>
+          <a:prstGeom prst="roundRect">
+            <a:avLst/>
+          </a:prstGeom>
+          <a:solidFill>
+            <a:schemeClr val="accent6">
+              <a:lumMod val="60000"/>
+              <a:lumOff val="40000"/>
+            </a:schemeClr>
+          </a:solidFill>
+          <a:ln>
+            <a:solidFill>
+              <a:srgbClr val="00B0F0"/>
+            </a:solidFill>
+            <a:prstDash val="dash"/>
+          </a:ln>
+        </p:spPr>
+        <p:style>
+          <a:lnRef idx="2">
+            <a:schemeClr val="accent1">
+              <a:shade val="50000"/>
+            </a:schemeClr>
+          </a:lnRef>
+          <a:fillRef idx="1">
+            <a:schemeClr val="accent1"/>
+          </a:fillRef>
+          <a:effectRef idx="0">
+            <a:schemeClr val="accent1"/>
+          </a:effectRef>
+          <a:fontRef idx="minor">
+            <a:schemeClr val="lt1"/>
+          </a:fontRef>
+        </p:style>
+        <p:txBody>
+          <a:bodyPr rtlCol="0" anchor="ctr"/>
+          <a:lstStyle/>
+          <a:p>
+            <a:r>
+              <a:rPr lang="en-US" altLang="zh-CN" sz="1000" dirty="0">
+                <a:latin typeface="Arial Black" panose="020B0A04020102020204" pitchFamily="34" charset="0"/>
+              </a:rPr>
+              <a:t>+: listen ()</a:t>
+            </a:r>
+            <a:endParaRPr lang="zh-CN" altLang="en-US" sz="1000" dirty="0">
+              <a:latin typeface="Arial Black" panose="020B0A04020102020204" pitchFamily="34" charset="0"/>
+            </a:endParaRPr>
+          </a:p>
+        </p:txBody>
+      </p:sp>
     </p:spTree>
     <p:extLst>
       <p:ext uri="{BB962C8B-B14F-4D97-AF65-F5344CB8AC3E}">
-        <p14:creationId xmlns:p14="http://schemas.microsoft.com/office/powerpoint/2010/main" val="1584148413"/>
+        <p14:creationId xmlns:p14="http://schemas.microsoft.com/office/powerpoint/2010/main" val="1224220718"/>
       </p:ext>
     </p:extLst>
   </p:cSld>
@@ -25464,7 +27587,7 @@
         <p:spPr>
           <a:xfrm>
             <a:off x="562708" y="432079"/>
-            <a:ext cx="1334020" cy="369332"/>
+            <a:ext cx="1867819" cy="369332"/>
           </a:xfrm>
           <a:prstGeom prst="rect">
             <a:avLst/>
@@ -25481,7 +27604,7 @@
               <a:rPr lang="en-US" altLang="zh-CN" dirty="0">
                 <a:latin typeface="Clarendon Blk BT" panose="02040905050505020204" pitchFamily="18" charset="0"/>
               </a:rPr>
-              <a:t>PGObject</a:t>
+              <a:t>StunMessage</a:t>
             </a:r>
             <a:endParaRPr lang="zh-CN" altLang="en-US" dirty="0">
               <a:latin typeface="Clarendon Blk BT" panose="02040905050505020204" pitchFamily="18" charset="0"/>
@@ -25503,8 +27626,8 @@
         </p:nvSpPr>
         <p:spPr>
           <a:xfrm>
-            <a:off x="562708" y="939060"/>
-            <a:ext cx="1267218" cy="1436494"/>
+            <a:off x="1438275" y="1052182"/>
+            <a:ext cx="3223951" cy="2529218"/>
           </a:xfrm>
           <a:prstGeom prst="round2DiagRect">
             <a:avLst>
@@ -25547,7 +27670,7 @@
               <a:rPr lang="en-US" altLang="zh-CN" dirty="0">
                 <a:latin typeface="Britannic Bold" panose="020B0903060703020204" pitchFamily="34" charset="0"/>
               </a:rPr>
-              <a:t>CObject</a:t>
+              <a:t>StunMessage</a:t>
             </a:r>
             <a:endParaRPr lang="zh-CN" altLang="en-US" dirty="0">
               <a:latin typeface="Britannic Bold" panose="020B0903060703020204" pitchFamily="34" charset="0"/>
@@ -25555,12 +27678,42 @@
           </a:p>
         </p:txBody>
       </p:sp>
-      <p:sp>
-        <p:nvSpPr>
-          <p:cNvPr id="4" name="TextBox 3">
-            <a:extLst>
-              <a:ext uri="{FF2B5EF4-FFF2-40B4-BE49-F238E27FC236}">
-                <a16:creationId xmlns:a16="http://schemas.microsoft.com/office/drawing/2014/main" id="{6D11BA10-47CC-4B50-BD52-65EE7B64D614}"/>
+    </p:spTree>
+    <p:extLst>
+      <p:ext uri="{BB962C8B-B14F-4D97-AF65-F5344CB8AC3E}">
+        <p14:creationId xmlns:p14="http://schemas.microsoft.com/office/powerpoint/2010/main" val="1584148413"/>
+      </p:ext>
+    </p:extLst>
+  </p:cSld>
+  <p:clrMapOvr>
+    <a:masterClrMapping/>
+  </p:clrMapOvr>
+</p:sld>
+</file>
+
+<file path=ppt/slides/slide31.xml><?xml version="1.0" encoding="utf-8"?>
+<p:sld xmlns:a="http://schemas.openxmlformats.org/drawingml/2006/main" xmlns:r="http://schemas.openxmlformats.org/officeDocument/2006/relationships" xmlns:p="http://schemas.openxmlformats.org/presentationml/2006/main">
+  <p:cSld>
+    <p:spTree>
+      <p:nvGrpSpPr>
+        <p:cNvPr id="1" name=""/>
+        <p:cNvGrpSpPr/>
+        <p:nvPr/>
+      </p:nvGrpSpPr>
+      <p:grpSpPr>
+        <a:xfrm>
+          <a:off x="0" y="0"/>
+          <a:ext cx="0" cy="0"/>
+          <a:chOff x="0" y="0"/>
+          <a:chExt cx="0" cy="0"/>
+        </a:xfrm>
+      </p:grpSpPr>
+      <p:sp>
+        <p:nvSpPr>
+          <p:cNvPr id="2" name="TextBox 1">
+            <a:extLst>
+              <a:ext uri="{FF2B5EF4-FFF2-40B4-BE49-F238E27FC236}">
+                <a16:creationId xmlns:a16="http://schemas.microsoft.com/office/drawing/2014/main" id="{6616D8AB-9DB0-4F58-B6DE-0689A6510426}"/>
               </a:ext>
             </a:extLst>
           </p:cNvPr>
@@ -25569,8 +27722,8 @@
         </p:nvSpPr>
         <p:spPr>
           <a:xfrm>
-            <a:off x="3288625" y="432079"/>
-            <a:ext cx="1157689" cy="369332"/>
+            <a:off x="562708" y="432079"/>
+            <a:ext cx="1334020" cy="369332"/>
           </a:xfrm>
           <a:prstGeom prst="rect">
             <a:avLst/>
@@ -25585,6 +27738,46 @@
           <a:p>
             <a:r>
               <a:rPr lang="en-US" altLang="zh-CN" dirty="0">
+                <a:latin typeface="Clarendon Blk BT" panose="02040905050505020204" pitchFamily="18" charset="0"/>
+              </a:rPr>
+              <a:t>PGObject</a:t>
+            </a:r>
+            <a:endParaRPr lang="zh-CN" altLang="en-US" dirty="0">
+              <a:latin typeface="Clarendon Blk BT" panose="02040905050505020204" pitchFamily="18" charset="0"/>
+            </a:endParaRPr>
+          </a:p>
+        </p:txBody>
+      </p:sp>
+      <p:sp>
+        <p:nvSpPr>
+          <p:cNvPr id="4" name="TextBox 3">
+            <a:extLst>
+              <a:ext uri="{FF2B5EF4-FFF2-40B4-BE49-F238E27FC236}">
+                <a16:creationId xmlns:a16="http://schemas.microsoft.com/office/drawing/2014/main" id="{6D11BA10-47CC-4B50-BD52-65EE7B64D614}"/>
+              </a:ext>
+            </a:extLst>
+          </p:cNvPr>
+          <p:cNvSpPr txBox="1"/>
+          <p:nvPr/>
+        </p:nvSpPr>
+        <p:spPr>
+          <a:xfrm>
+            <a:off x="4693218" y="432079"/>
+            <a:ext cx="1157689" cy="369332"/>
+          </a:xfrm>
+          <a:prstGeom prst="rect">
+            <a:avLst/>
+          </a:prstGeom>
+          <a:noFill/>
+        </p:spPr>
+        <p:txBody>
+          <a:bodyPr wrap="none" rtlCol="0">
+            <a:spAutoFit/>
+          </a:bodyPr>
+          <a:lstStyle/>
+          <a:p>
+            <a:r>
+              <a:rPr lang="en-US" altLang="zh-CN" dirty="0">
                 <a:latin typeface="Britannic Bold" panose="020B0903060703020204" pitchFamily="34" charset="0"/>
               </a:rPr>
               <a:t>MsgEntity</a:t>
@@ -25595,6 +27788,223 @@
           </a:p>
         </p:txBody>
       </p:sp>
+      <p:grpSp>
+        <p:nvGrpSpPr>
+          <p:cNvPr id="18" name="Group 17">
+            <a:extLst>
+              <a:ext uri="{FF2B5EF4-FFF2-40B4-BE49-F238E27FC236}">
+                <a16:creationId xmlns:a16="http://schemas.microsoft.com/office/drawing/2014/main" id="{E2D1E559-E79D-4851-9BC5-9B5DB8CAB74D}"/>
+              </a:ext>
+            </a:extLst>
+          </p:cNvPr>
+          <p:cNvGrpSpPr/>
+          <p:nvPr/>
+        </p:nvGrpSpPr>
+        <p:grpSpPr>
+          <a:xfrm>
+            <a:off x="562707" y="901352"/>
+            <a:ext cx="2807376" cy="2096372"/>
+            <a:chOff x="562707" y="939059"/>
+            <a:chExt cx="2807376" cy="2096372"/>
+          </a:xfrm>
+        </p:grpSpPr>
+        <p:sp>
+          <p:nvSpPr>
+            <p:cNvPr id="20" name="Rectangle: Diagonal Corners Rounded 19">
+              <a:extLst>
+                <a:ext uri="{FF2B5EF4-FFF2-40B4-BE49-F238E27FC236}">
+                  <a16:creationId xmlns:a16="http://schemas.microsoft.com/office/drawing/2014/main" id="{56D5BA8E-739B-4034-BFE6-0ACBB3A95E60}"/>
+                </a:ext>
+              </a:extLst>
+            </p:cNvPr>
+            <p:cNvSpPr/>
+            <p:nvPr/>
+          </p:nvSpPr>
+          <p:spPr>
+            <a:xfrm>
+              <a:off x="562707" y="939059"/>
+              <a:ext cx="2807376" cy="2096372"/>
+            </a:xfrm>
+            <a:prstGeom prst="round2DiagRect">
+              <a:avLst>
+                <a:gd name="adj1" fmla="val 6397"/>
+                <a:gd name="adj2" fmla="val 4890"/>
+              </a:avLst>
+            </a:prstGeom>
+            <a:solidFill>
+              <a:schemeClr val="accent1">
+                <a:lumMod val="60000"/>
+                <a:lumOff val="40000"/>
+              </a:schemeClr>
+            </a:solidFill>
+            <a:ln w="9525">
+              <a:prstDash val="dash"/>
+            </a:ln>
+          </p:spPr>
+          <p:style>
+            <a:lnRef idx="2">
+              <a:schemeClr val="accent1">
+                <a:shade val="50000"/>
+              </a:schemeClr>
+            </a:lnRef>
+            <a:fillRef idx="1">
+              <a:schemeClr val="accent1"/>
+            </a:fillRef>
+            <a:effectRef idx="0">
+              <a:schemeClr val="accent1"/>
+            </a:effectRef>
+            <a:fontRef idx="minor">
+              <a:schemeClr val="lt1"/>
+            </a:fontRef>
+          </p:style>
+          <p:txBody>
+            <a:bodyPr rtlCol="0" anchor="t" anchorCtr="1"/>
+            <a:lstStyle/>
+            <a:p>
+              <a:pPr algn="ctr"/>
+              <a:r>
+                <a:rPr lang="en-US" altLang="zh-CN" dirty="0">
+                  <a:latin typeface="Britannic Bold" panose="020B0903060703020204" pitchFamily="34" charset="0"/>
+                </a:rPr>
+                <a:t>CObject</a:t>
+              </a:r>
+              <a:endParaRPr lang="zh-CN" altLang="en-US" dirty="0">
+                <a:latin typeface="Britannic Bold" panose="020B0903060703020204" pitchFamily="34" charset="0"/>
+              </a:endParaRPr>
+            </a:p>
+          </p:txBody>
+        </p:sp>
+        <p:sp>
+          <p:nvSpPr>
+            <p:cNvPr id="10" name="Rectangle: Rounded Corners 9">
+              <a:extLst>
+                <a:ext uri="{FF2B5EF4-FFF2-40B4-BE49-F238E27FC236}">
+                  <a16:creationId xmlns:a16="http://schemas.microsoft.com/office/drawing/2014/main" id="{A85C8A71-51D8-40E9-94F8-EDAA547A6349}"/>
+                </a:ext>
+              </a:extLst>
+            </p:cNvPr>
+            <p:cNvSpPr/>
+            <p:nvPr/>
+          </p:nvSpPr>
+          <p:spPr>
+            <a:xfrm>
+              <a:off x="609841" y="2168543"/>
+              <a:ext cx="2708394" cy="334986"/>
+            </a:xfrm>
+            <a:prstGeom prst="roundRect">
+              <a:avLst/>
+            </a:prstGeom>
+            <a:solidFill>
+              <a:schemeClr val="accent6">
+                <a:lumMod val="60000"/>
+                <a:lumOff val="40000"/>
+              </a:schemeClr>
+            </a:solidFill>
+            <a:ln w="12700" cmpd="sng">
+              <a:noFill/>
+              <a:prstDash val="dash"/>
+            </a:ln>
+          </p:spPr>
+          <p:style>
+            <a:lnRef idx="2">
+              <a:schemeClr val="accent1">
+                <a:shade val="50000"/>
+              </a:schemeClr>
+            </a:lnRef>
+            <a:fillRef idx="1">
+              <a:schemeClr val="accent1"/>
+            </a:fillRef>
+            <a:effectRef idx="0">
+              <a:schemeClr val="accent1"/>
+            </a:effectRef>
+            <a:fontRef idx="minor">
+              <a:schemeClr val="lt1"/>
+            </a:fontRef>
+          </p:style>
+          <p:txBody>
+            <a:bodyPr rtlCol="0" anchor="ctr"/>
+            <a:lstStyle/>
+            <a:p>
+              <a:pPr algn="ctr"/>
+              <a:r>
+                <a:rPr lang="en-US" altLang="zh-CN" sz="1400" dirty="0">
+                  <a:latin typeface="Arial Black" panose="020B0A04020102020204" pitchFamily="34" charset="0"/>
+                </a:rPr>
+                <a:t>UniqueName</a:t>
+              </a:r>
+              <a:endParaRPr lang="zh-CN" altLang="en-US" sz="1400" dirty="0">
+                <a:latin typeface="Arial Black" panose="020B0A04020102020204" pitchFamily="34" charset="0"/>
+              </a:endParaRPr>
+            </a:p>
+          </p:txBody>
+        </p:sp>
+        <p:sp>
+          <p:nvSpPr>
+            <p:cNvPr id="11" name="Rectangle: Rounded Corners 10">
+              <a:extLst>
+                <a:ext uri="{FF2B5EF4-FFF2-40B4-BE49-F238E27FC236}">
+                  <a16:creationId xmlns:a16="http://schemas.microsoft.com/office/drawing/2014/main" id="{06AC964E-3BC6-4EEA-B6AC-63DD8996F3F1}"/>
+                </a:ext>
+              </a:extLst>
+            </p:cNvPr>
+            <p:cNvSpPr/>
+            <p:nvPr/>
+          </p:nvSpPr>
+          <p:spPr>
+            <a:xfrm>
+              <a:off x="606162" y="2524441"/>
+              <a:ext cx="2708394" cy="369332"/>
+            </a:xfrm>
+            <a:prstGeom prst="roundRect">
+              <a:avLst/>
+            </a:prstGeom>
+            <a:solidFill>
+              <a:schemeClr val="accent3">
+                <a:lumMod val="60000"/>
+                <a:lumOff val="40000"/>
+              </a:schemeClr>
+            </a:solidFill>
+            <a:ln>
+              <a:solidFill>
+                <a:srgbClr val="FF0000"/>
+              </a:solidFill>
+              <a:prstDash val="dash"/>
+            </a:ln>
+          </p:spPr>
+          <p:style>
+            <a:lnRef idx="2">
+              <a:schemeClr val="accent1">
+                <a:shade val="50000"/>
+              </a:schemeClr>
+            </a:lnRef>
+            <a:fillRef idx="1">
+              <a:schemeClr val="accent1"/>
+            </a:fillRef>
+            <a:effectRef idx="0">
+              <a:schemeClr val="accent1"/>
+            </a:effectRef>
+            <a:fontRef idx="minor">
+              <a:schemeClr val="lt1"/>
+            </a:fontRef>
+          </p:style>
+          <p:txBody>
+            <a:bodyPr rtlCol="0" anchor="ctr"/>
+            <a:lstStyle/>
+            <a:p>
+              <a:pPr algn="ctr"/>
+              <a:r>
+                <a:rPr lang="en-US" altLang="zh-CN" sz="1400" dirty="0">
+                  <a:latin typeface="Clarendon Blk BT" panose="02040905050505020204" pitchFamily="18" charset="0"/>
+                </a:rPr>
+                <a:t>ObjectsContainer : set</a:t>
+              </a:r>
+              <a:endParaRPr lang="zh-CN" altLang="en-US" sz="1400" dirty="0">
+                <a:latin typeface="Clarendon Blk BT" panose="02040905050505020204" pitchFamily="18" charset="0"/>
+              </a:endParaRPr>
+            </a:p>
+          </p:txBody>
+        </p:sp>
+      </p:grpSp>
       <p:sp>
         <p:nvSpPr>
           <p:cNvPr id="5" name="Rectangle: Diagonal Corners Rounded 4">
@@ -25609,8 +28019,8 @@
         </p:nvSpPr>
         <p:spPr>
           <a:xfrm>
-            <a:off x="3288624" y="939060"/>
-            <a:ext cx="1500191" cy="4387084"/>
+            <a:off x="6277459" y="432078"/>
+            <a:ext cx="2952266" cy="6425921"/>
           </a:xfrm>
           <a:prstGeom prst="round2DiagRect">
             <a:avLst>
@@ -25661,6 +28071,1197 @@
           </a:p>
         </p:txBody>
       </p:sp>
+      <p:sp>
+        <p:nvSpPr>
+          <p:cNvPr id="6" name="Rectangle: Rounded Corners 5">
+            <a:extLst>
+              <a:ext uri="{FF2B5EF4-FFF2-40B4-BE49-F238E27FC236}">
+                <a16:creationId xmlns:a16="http://schemas.microsoft.com/office/drawing/2014/main" id="{27E0CDCE-1F77-44B1-A724-627F5BC5387B}"/>
+              </a:ext>
+            </a:extLst>
+          </p:cNvPr>
+          <p:cNvSpPr/>
+          <p:nvPr/>
+        </p:nvSpPr>
+        <p:spPr>
+          <a:xfrm>
+            <a:off x="6341096" y="1320593"/>
+            <a:ext cx="2807376" cy="353489"/>
+          </a:xfrm>
+          <a:prstGeom prst="roundRect">
+            <a:avLst/>
+          </a:prstGeom>
+          <a:solidFill>
+            <a:schemeClr val="accent6">
+              <a:lumMod val="60000"/>
+              <a:lumOff val="40000"/>
+            </a:schemeClr>
+          </a:solidFill>
+          <a:ln>
+            <a:solidFill>
+              <a:srgbClr val="FF0000"/>
+            </a:solidFill>
+            <a:prstDash val="dash"/>
+          </a:ln>
+        </p:spPr>
+        <p:style>
+          <a:lnRef idx="2">
+            <a:schemeClr val="accent1">
+              <a:shade val="50000"/>
+            </a:schemeClr>
+          </a:lnRef>
+          <a:fillRef idx="1">
+            <a:schemeClr val="accent1"/>
+          </a:fillRef>
+          <a:effectRef idx="0">
+            <a:schemeClr val="accent1"/>
+          </a:effectRef>
+          <a:fontRef idx="minor">
+            <a:schemeClr val="lt1"/>
+          </a:fontRef>
+        </p:style>
+        <p:txBody>
+          <a:bodyPr rtlCol="0" anchor="ctr"/>
+          <a:lstStyle/>
+          <a:p>
+            <a:r>
+              <a:rPr lang="en-US" altLang="zh-CN" sz="1000" dirty="0">
+                <a:latin typeface="Arial Black" panose="020B0A04020102020204" pitchFamily="34" charset="0"/>
+              </a:rPr>
+              <a:t>+: SendMessage</a:t>
+            </a:r>
+            <a:endParaRPr lang="zh-CN" altLang="en-US" sz="1400" dirty="0">
+              <a:latin typeface="Arial Black" panose="020B0A04020102020204" pitchFamily="34" charset="0"/>
+            </a:endParaRPr>
+          </a:p>
+        </p:txBody>
+      </p:sp>
+      <p:sp>
+        <p:nvSpPr>
+          <p:cNvPr id="7" name="Rectangle: Rounded Corners 6">
+            <a:extLst>
+              <a:ext uri="{FF2B5EF4-FFF2-40B4-BE49-F238E27FC236}">
+                <a16:creationId xmlns:a16="http://schemas.microsoft.com/office/drawing/2014/main" id="{09D384E2-F07C-43A0-9440-BBFC497C7E59}"/>
+              </a:ext>
+            </a:extLst>
+          </p:cNvPr>
+          <p:cNvSpPr/>
+          <p:nvPr/>
+        </p:nvSpPr>
+        <p:spPr>
+          <a:xfrm>
+            <a:off x="6341090" y="6438970"/>
+            <a:ext cx="2807376" cy="363316"/>
+          </a:xfrm>
+          <a:prstGeom prst="roundRect">
+            <a:avLst/>
+          </a:prstGeom>
+          <a:solidFill>
+            <a:schemeClr val="accent3">
+              <a:lumMod val="60000"/>
+              <a:lumOff val="40000"/>
+            </a:schemeClr>
+          </a:solidFill>
+          <a:ln>
+            <a:solidFill>
+              <a:srgbClr val="FF0000"/>
+            </a:solidFill>
+            <a:prstDash val="dash"/>
+          </a:ln>
+        </p:spPr>
+        <p:style>
+          <a:lnRef idx="2">
+            <a:schemeClr val="accent1">
+              <a:shade val="50000"/>
+            </a:schemeClr>
+          </a:lnRef>
+          <a:fillRef idx="1">
+            <a:schemeClr val="accent1"/>
+          </a:fillRef>
+          <a:effectRef idx="0">
+            <a:schemeClr val="accent1"/>
+          </a:effectRef>
+          <a:fontRef idx="minor">
+            <a:schemeClr val="lt1"/>
+          </a:fontRef>
+        </p:style>
+        <p:txBody>
+          <a:bodyPr rtlCol="0" anchor="ctr"/>
+          <a:lstStyle/>
+          <a:p>
+            <a:r>
+              <a:rPr lang="en-US" altLang="zh-CN" sz="1000" dirty="0">
+                <a:latin typeface="Clarendon Blk BT" panose="02040905050505020204" pitchFamily="18" charset="0"/>
+              </a:rPr>
+              <a:t>-: MsgEntityContainer : Map(std::string, MsgEntity*)</a:t>
+            </a:r>
+            <a:endParaRPr lang="zh-CN" altLang="en-US" sz="1000" dirty="0">
+              <a:latin typeface="Clarendon Blk BT" panose="02040905050505020204" pitchFamily="18" charset="0"/>
+            </a:endParaRPr>
+          </a:p>
+        </p:txBody>
+      </p:sp>
+      <p:sp>
+        <p:nvSpPr>
+          <p:cNvPr id="8" name="Rectangle: Rounded Corners 7">
+            <a:extLst>
+              <a:ext uri="{FF2B5EF4-FFF2-40B4-BE49-F238E27FC236}">
+                <a16:creationId xmlns:a16="http://schemas.microsoft.com/office/drawing/2014/main" id="{4D7CBF82-EC0B-4AF7-9133-F67D8AA62BB4}"/>
+              </a:ext>
+            </a:extLst>
+          </p:cNvPr>
+          <p:cNvSpPr/>
+          <p:nvPr/>
+        </p:nvSpPr>
+        <p:spPr>
+          <a:xfrm>
+            <a:off x="6341090" y="2845404"/>
+            <a:ext cx="2807376" cy="353489"/>
+          </a:xfrm>
+          <a:prstGeom prst="roundRect">
+            <a:avLst/>
+          </a:prstGeom>
+          <a:solidFill>
+            <a:schemeClr val="accent6">
+              <a:lumMod val="60000"/>
+              <a:lumOff val="40000"/>
+            </a:schemeClr>
+          </a:solidFill>
+          <a:ln w="12700" cmpd="sng">
+            <a:solidFill>
+              <a:srgbClr val="FF0000"/>
+            </a:solidFill>
+            <a:prstDash val="dash"/>
+          </a:ln>
+        </p:spPr>
+        <p:style>
+          <a:lnRef idx="2">
+            <a:schemeClr val="accent1">
+              <a:shade val="50000"/>
+            </a:schemeClr>
+          </a:lnRef>
+          <a:fillRef idx="1">
+            <a:schemeClr val="accent1"/>
+          </a:fillRef>
+          <a:effectRef idx="0">
+            <a:schemeClr val="accent1"/>
+          </a:effectRef>
+          <a:fontRef idx="minor">
+            <a:schemeClr val="lt1"/>
+          </a:fontRef>
+        </p:style>
+        <p:txBody>
+          <a:bodyPr rtlCol="0" anchor="ctr"/>
+          <a:lstStyle/>
+          <a:p>
+            <a:r>
+              <a:rPr lang="en-US" altLang="zh-CN" sz="1000" dirty="0">
+                <a:latin typeface="Arial Black" panose="020B0A04020102020204" pitchFamily="34" charset="0"/>
+              </a:rPr>
+              <a:t>-: MsgDispitcherThread</a:t>
+            </a:r>
+            <a:endParaRPr lang="zh-CN" altLang="en-US" sz="1000" dirty="0">
+              <a:latin typeface="Arial Black" panose="020B0A04020102020204" pitchFamily="34" charset="0"/>
+            </a:endParaRPr>
+          </a:p>
+        </p:txBody>
+      </p:sp>
+      <p:sp>
+        <p:nvSpPr>
+          <p:cNvPr id="12" name="Rectangle: Rounded Corners 11">
+            <a:extLst>
+              <a:ext uri="{FF2B5EF4-FFF2-40B4-BE49-F238E27FC236}">
+                <a16:creationId xmlns:a16="http://schemas.microsoft.com/office/drawing/2014/main" id="{6D4DDBC7-0D63-454C-AA56-3D59DE0D284D}"/>
+              </a:ext>
+            </a:extLst>
+          </p:cNvPr>
+          <p:cNvSpPr/>
+          <p:nvPr/>
+        </p:nvSpPr>
+        <p:spPr>
+          <a:xfrm>
+            <a:off x="6341096" y="1699543"/>
+            <a:ext cx="2807376" cy="353489"/>
+          </a:xfrm>
+          <a:prstGeom prst="roundRect">
+            <a:avLst/>
+          </a:prstGeom>
+          <a:solidFill>
+            <a:schemeClr val="accent6">
+              <a:lumMod val="60000"/>
+              <a:lumOff val="40000"/>
+            </a:schemeClr>
+          </a:solidFill>
+          <a:ln>
+            <a:solidFill>
+              <a:srgbClr val="FF0000"/>
+            </a:solidFill>
+            <a:prstDash val="dash"/>
+          </a:ln>
+        </p:spPr>
+        <p:style>
+          <a:lnRef idx="2">
+            <a:schemeClr val="accent1">
+              <a:shade val="50000"/>
+            </a:schemeClr>
+          </a:lnRef>
+          <a:fillRef idx="1">
+            <a:schemeClr val="accent1"/>
+          </a:fillRef>
+          <a:effectRef idx="0">
+            <a:schemeClr val="accent1"/>
+          </a:effectRef>
+          <a:fontRef idx="minor">
+            <a:schemeClr val="lt1"/>
+          </a:fontRef>
+        </p:style>
+        <p:txBody>
+          <a:bodyPr rtlCol="0" anchor="ctr"/>
+          <a:lstStyle/>
+          <a:p>
+            <a:r>
+              <a:rPr lang="en-US" altLang="zh-CN" sz="1000" dirty="0">
+                <a:latin typeface="Arial Black" panose="020B0A04020102020204" pitchFamily="34" charset="0"/>
+              </a:rPr>
+              <a:t>+: PostMessage</a:t>
+            </a:r>
+            <a:endParaRPr lang="zh-CN" altLang="en-US" sz="1400" dirty="0">
+              <a:latin typeface="Arial Black" panose="020B0A04020102020204" pitchFamily="34" charset="0"/>
+            </a:endParaRPr>
+          </a:p>
+        </p:txBody>
+      </p:sp>
+      <p:sp>
+        <p:nvSpPr>
+          <p:cNvPr id="13" name="Rectangle: Rounded Corners 12">
+            <a:extLst>
+              <a:ext uri="{FF2B5EF4-FFF2-40B4-BE49-F238E27FC236}">
+                <a16:creationId xmlns:a16="http://schemas.microsoft.com/office/drawing/2014/main" id="{D4D3EE8B-3B82-4575-97DD-6E4F5E4A1CF6}"/>
+              </a:ext>
+            </a:extLst>
+          </p:cNvPr>
+          <p:cNvSpPr/>
+          <p:nvPr/>
+        </p:nvSpPr>
+        <p:spPr>
+          <a:xfrm>
+            <a:off x="6341093" y="4945257"/>
+            <a:ext cx="2807376" cy="363316"/>
+          </a:xfrm>
+          <a:prstGeom prst="roundRect">
+            <a:avLst/>
+          </a:prstGeom>
+          <a:solidFill>
+            <a:schemeClr val="accent3">
+              <a:lumMod val="60000"/>
+              <a:lumOff val="40000"/>
+            </a:schemeClr>
+          </a:solidFill>
+          <a:ln>
+            <a:solidFill>
+              <a:schemeClr val="bg2"/>
+            </a:solidFill>
+            <a:prstDash val="dash"/>
+          </a:ln>
+        </p:spPr>
+        <p:style>
+          <a:lnRef idx="2">
+            <a:schemeClr val="accent1">
+              <a:shade val="50000"/>
+            </a:schemeClr>
+          </a:lnRef>
+          <a:fillRef idx="1">
+            <a:schemeClr val="accent1"/>
+          </a:fillRef>
+          <a:effectRef idx="0">
+            <a:schemeClr val="accent1"/>
+          </a:effectRef>
+          <a:fontRef idx="minor">
+            <a:schemeClr val="lt1"/>
+          </a:fontRef>
+        </p:style>
+        <p:txBody>
+          <a:bodyPr rtlCol="0" anchor="ctr"/>
+          <a:lstStyle/>
+          <a:p>
+            <a:r>
+              <a:rPr lang="en-US" altLang="zh-CN" sz="1000" dirty="0">
+                <a:latin typeface="Clarendon Blk BT" panose="02040905050505020204" pitchFamily="18" charset="0"/>
+              </a:rPr>
+              <a:t>-: MsgQueue</a:t>
+            </a:r>
+            <a:endParaRPr lang="zh-CN" altLang="en-US" sz="1000" dirty="0">
+              <a:latin typeface="Clarendon Blk BT" panose="02040905050505020204" pitchFamily="18" charset="0"/>
+            </a:endParaRPr>
+          </a:p>
+        </p:txBody>
+      </p:sp>
+      <p:sp>
+        <p:nvSpPr>
+          <p:cNvPr id="14" name="Rectangle: Rounded Corners 13">
+            <a:extLst>
+              <a:ext uri="{FF2B5EF4-FFF2-40B4-BE49-F238E27FC236}">
+                <a16:creationId xmlns:a16="http://schemas.microsoft.com/office/drawing/2014/main" id="{634AD08E-2A44-44A5-9562-C74D03E87ECB}"/>
+              </a:ext>
+            </a:extLst>
+          </p:cNvPr>
+          <p:cNvSpPr/>
+          <p:nvPr/>
+        </p:nvSpPr>
+        <p:spPr>
+          <a:xfrm>
+            <a:off x="6341093" y="5308573"/>
+            <a:ext cx="2807376" cy="363316"/>
+          </a:xfrm>
+          <a:prstGeom prst="roundRect">
+            <a:avLst/>
+          </a:prstGeom>
+          <a:solidFill>
+            <a:schemeClr val="accent3">
+              <a:lumMod val="60000"/>
+              <a:lumOff val="40000"/>
+            </a:schemeClr>
+          </a:solidFill>
+          <a:ln>
+            <a:solidFill>
+              <a:schemeClr val="bg2"/>
+            </a:solidFill>
+            <a:prstDash val="dash"/>
+          </a:ln>
+        </p:spPr>
+        <p:style>
+          <a:lnRef idx="2">
+            <a:schemeClr val="accent1">
+              <a:shade val="50000"/>
+            </a:schemeClr>
+          </a:lnRef>
+          <a:fillRef idx="1">
+            <a:schemeClr val="accent1"/>
+          </a:fillRef>
+          <a:effectRef idx="0">
+            <a:schemeClr val="accent1"/>
+          </a:effectRef>
+          <a:fontRef idx="minor">
+            <a:schemeClr val="lt1"/>
+          </a:fontRef>
+        </p:style>
+        <p:txBody>
+          <a:bodyPr rtlCol="0" anchor="ctr"/>
+          <a:lstStyle/>
+          <a:p>
+            <a:r>
+              <a:rPr lang="en-US" altLang="zh-CN" sz="1000" dirty="0">
+                <a:latin typeface="Clarendon Blk BT" panose="02040905050505020204" pitchFamily="18" charset="0"/>
+              </a:rPr>
+              <a:t>-: std::queue_mutex</a:t>
+            </a:r>
+            <a:endParaRPr lang="zh-CN" altLang="en-US" sz="1000" dirty="0">
+              <a:latin typeface="Clarendon Blk BT" panose="02040905050505020204" pitchFamily="18" charset="0"/>
+            </a:endParaRPr>
+          </a:p>
+        </p:txBody>
+      </p:sp>
+      <p:sp>
+        <p:nvSpPr>
+          <p:cNvPr id="15" name="Rectangle: Rounded Corners 14">
+            <a:extLst>
+              <a:ext uri="{FF2B5EF4-FFF2-40B4-BE49-F238E27FC236}">
+                <a16:creationId xmlns:a16="http://schemas.microsoft.com/office/drawing/2014/main" id="{7AF91535-0B04-4F0B-BBC4-37E12C09E64C}"/>
+              </a:ext>
+            </a:extLst>
+          </p:cNvPr>
+          <p:cNvSpPr/>
+          <p:nvPr/>
+        </p:nvSpPr>
+        <p:spPr>
+          <a:xfrm>
+            <a:off x="6341093" y="5671890"/>
+            <a:ext cx="2807376" cy="363316"/>
+          </a:xfrm>
+          <a:prstGeom prst="roundRect">
+            <a:avLst/>
+          </a:prstGeom>
+          <a:solidFill>
+            <a:schemeClr val="accent3">
+              <a:lumMod val="60000"/>
+              <a:lumOff val="40000"/>
+            </a:schemeClr>
+          </a:solidFill>
+          <a:ln>
+            <a:solidFill>
+              <a:schemeClr val="bg2"/>
+            </a:solidFill>
+            <a:prstDash val="dash"/>
+          </a:ln>
+        </p:spPr>
+        <p:style>
+          <a:lnRef idx="2">
+            <a:schemeClr val="accent1">
+              <a:shade val="50000"/>
+            </a:schemeClr>
+          </a:lnRef>
+          <a:fillRef idx="1">
+            <a:schemeClr val="accent1"/>
+          </a:fillRef>
+          <a:effectRef idx="0">
+            <a:schemeClr val="accent1"/>
+          </a:effectRef>
+          <a:fontRef idx="minor">
+            <a:schemeClr val="lt1"/>
+          </a:fontRef>
+        </p:style>
+        <p:txBody>
+          <a:bodyPr rtlCol="0" anchor="ctr"/>
+          <a:lstStyle/>
+          <a:p>
+            <a:r>
+              <a:rPr lang="en-US" altLang="zh-CN" sz="1000" dirty="0">
+                <a:latin typeface="Clarendon Blk BT" panose="02040905050505020204" pitchFamily="18" charset="0"/>
+              </a:rPr>
+              <a:t>-: std::thread</a:t>
+            </a:r>
+            <a:endParaRPr lang="zh-CN" altLang="en-US" sz="1000" dirty="0">
+              <a:latin typeface="Clarendon Blk BT" panose="02040905050505020204" pitchFamily="18" charset="0"/>
+            </a:endParaRPr>
+          </a:p>
+        </p:txBody>
+      </p:sp>
+      <p:sp>
+        <p:nvSpPr>
+          <p:cNvPr id="17" name="Rectangle: Rounded Corners 16">
+            <a:extLst>
+              <a:ext uri="{FF2B5EF4-FFF2-40B4-BE49-F238E27FC236}">
+                <a16:creationId xmlns:a16="http://schemas.microsoft.com/office/drawing/2014/main" id="{225B4CE2-39EF-41E0-A291-6CDC6063B0AE}"/>
+              </a:ext>
+            </a:extLst>
+          </p:cNvPr>
+          <p:cNvSpPr/>
+          <p:nvPr/>
+        </p:nvSpPr>
+        <p:spPr>
+          <a:xfrm>
+            <a:off x="6341093" y="6055622"/>
+            <a:ext cx="2807376" cy="363316"/>
+          </a:xfrm>
+          <a:prstGeom prst="roundRect">
+            <a:avLst/>
+          </a:prstGeom>
+          <a:solidFill>
+            <a:schemeClr val="accent3">
+              <a:lumMod val="60000"/>
+              <a:lumOff val="40000"/>
+            </a:schemeClr>
+          </a:solidFill>
+          <a:ln>
+            <a:solidFill>
+              <a:schemeClr val="bg2"/>
+            </a:solidFill>
+            <a:prstDash val="dash"/>
+          </a:ln>
+        </p:spPr>
+        <p:style>
+          <a:lnRef idx="2">
+            <a:schemeClr val="accent1">
+              <a:shade val="50000"/>
+            </a:schemeClr>
+          </a:lnRef>
+          <a:fillRef idx="1">
+            <a:schemeClr val="accent1"/>
+          </a:fillRef>
+          <a:effectRef idx="0">
+            <a:schemeClr val="accent1"/>
+          </a:effectRef>
+          <a:fontRef idx="minor">
+            <a:schemeClr val="lt1"/>
+          </a:fontRef>
+        </p:style>
+        <p:txBody>
+          <a:bodyPr rtlCol="0" anchor="ctr"/>
+          <a:lstStyle/>
+          <a:p>
+            <a:r>
+              <a:rPr lang="en-US" altLang="zh-CN" sz="1000" dirty="0">
+                <a:latin typeface="Clarendon Blk BT" panose="02040905050505020204" pitchFamily="18" charset="0"/>
+              </a:rPr>
+              <a:t>-: quit : bool</a:t>
+            </a:r>
+            <a:endParaRPr lang="zh-CN" altLang="en-US" sz="1000" dirty="0">
+              <a:latin typeface="Clarendon Blk BT" panose="02040905050505020204" pitchFamily="18" charset="0"/>
+            </a:endParaRPr>
+          </a:p>
+        </p:txBody>
+      </p:sp>
+      <p:sp>
+        <p:nvSpPr>
+          <p:cNvPr id="21" name="Rectangle: Rounded Corners 20">
+            <a:extLst>
+              <a:ext uri="{FF2B5EF4-FFF2-40B4-BE49-F238E27FC236}">
+                <a16:creationId xmlns:a16="http://schemas.microsoft.com/office/drawing/2014/main" id="{2EAA62AF-7F12-4043-B215-36043B360CEC}"/>
+              </a:ext>
+            </a:extLst>
+          </p:cNvPr>
+          <p:cNvSpPr/>
+          <p:nvPr/>
+        </p:nvSpPr>
+        <p:spPr>
+          <a:xfrm>
+            <a:off x="6341093" y="963275"/>
+            <a:ext cx="2807376" cy="334986"/>
+          </a:xfrm>
+          <a:prstGeom prst="roundRect">
+            <a:avLst/>
+          </a:prstGeom>
+          <a:solidFill>
+            <a:schemeClr val="accent6">
+              <a:lumMod val="50000"/>
+            </a:schemeClr>
+          </a:solidFill>
+          <a:ln w="12700" cmpd="sng">
+            <a:noFill/>
+            <a:prstDash val="dash"/>
+          </a:ln>
+        </p:spPr>
+        <p:style>
+          <a:lnRef idx="2">
+            <a:schemeClr val="accent1">
+              <a:shade val="50000"/>
+            </a:schemeClr>
+          </a:lnRef>
+          <a:fillRef idx="1">
+            <a:schemeClr val="accent1"/>
+          </a:fillRef>
+          <a:effectRef idx="0">
+            <a:schemeClr val="accent1"/>
+          </a:effectRef>
+          <a:fontRef idx="minor">
+            <a:schemeClr val="lt1"/>
+          </a:fontRef>
+        </p:style>
+        <p:txBody>
+          <a:bodyPr rtlCol="0" anchor="ctr"/>
+          <a:lstStyle/>
+          <a:p>
+            <a:r>
+              <a:rPr lang="en-US" altLang="zh-CN" sz="1000" dirty="0">
+                <a:latin typeface="Arial Black" panose="020B0A04020102020204" pitchFamily="34" charset="0"/>
+              </a:rPr>
+              <a:t>*: OnMsgReceived</a:t>
+            </a:r>
+            <a:endParaRPr lang="zh-CN" altLang="en-US" sz="1000" dirty="0">
+              <a:latin typeface="Arial Black" panose="020B0A04020102020204" pitchFamily="34" charset="0"/>
+            </a:endParaRPr>
+          </a:p>
+        </p:txBody>
+      </p:sp>
+      <p:sp>
+        <p:nvSpPr>
+          <p:cNvPr id="9" name="Isosceles Triangle 8">
+            <a:extLst>
+              <a:ext uri="{FF2B5EF4-FFF2-40B4-BE49-F238E27FC236}">
+                <a16:creationId xmlns:a16="http://schemas.microsoft.com/office/drawing/2014/main" id="{03111AF9-BD4C-40B8-8D88-250F207C698E}"/>
+              </a:ext>
+            </a:extLst>
+          </p:cNvPr>
+          <p:cNvSpPr/>
+          <p:nvPr/>
+        </p:nvSpPr>
+        <p:spPr>
+          <a:xfrm>
+            <a:off x="1868187" y="2997724"/>
+            <a:ext cx="184344" cy="158917"/>
+          </a:xfrm>
+          <a:prstGeom prst="triangle">
+            <a:avLst/>
+          </a:prstGeom>
+        </p:spPr>
+        <p:style>
+          <a:lnRef idx="2">
+            <a:schemeClr val="accent1">
+              <a:shade val="50000"/>
+            </a:schemeClr>
+          </a:lnRef>
+          <a:fillRef idx="1">
+            <a:schemeClr val="accent1"/>
+          </a:fillRef>
+          <a:effectRef idx="0">
+            <a:schemeClr val="accent1"/>
+          </a:effectRef>
+          <a:fontRef idx="minor">
+            <a:schemeClr val="lt1"/>
+          </a:fontRef>
+        </p:style>
+        <p:txBody>
+          <a:bodyPr rtlCol="0" anchor="ctr"/>
+          <a:lstStyle/>
+          <a:p>
+            <a:pPr algn="ctr"/>
+            <a:endParaRPr lang="zh-CN" altLang="en-US"/>
+          </a:p>
+        </p:txBody>
+      </p:sp>
+      <p:cxnSp>
+        <p:nvCxnSpPr>
+          <p:cNvPr id="22" name="Connector: Elbow 21">
+            <a:extLst>
+              <a:ext uri="{FF2B5EF4-FFF2-40B4-BE49-F238E27FC236}">
+                <a16:creationId xmlns:a16="http://schemas.microsoft.com/office/drawing/2014/main" id="{3468D5DE-14EA-4276-B6FA-1DBDE059D526}"/>
+              </a:ext>
+            </a:extLst>
+          </p:cNvPr>
+          <p:cNvCxnSpPr>
+            <a:cxnSpLocks/>
+            <a:stCxn id="9" idx="3"/>
+            <a:endCxn id="15" idx="1"/>
+          </p:cNvCxnSpPr>
+          <p:nvPr/>
+        </p:nvCxnSpPr>
+        <p:spPr>
+          <a:xfrm rot="16200000" flipH="1">
+            <a:off x="2802273" y="2314727"/>
+            <a:ext cx="2696907" cy="4380734"/>
+          </a:xfrm>
+          <a:prstGeom prst="bentConnector2">
+            <a:avLst/>
+          </a:prstGeom>
+        </p:spPr>
+        <p:style>
+          <a:lnRef idx="1">
+            <a:schemeClr val="accent1"/>
+          </a:lnRef>
+          <a:fillRef idx="0">
+            <a:schemeClr val="accent1"/>
+          </a:fillRef>
+          <a:effectRef idx="0">
+            <a:schemeClr val="accent1"/>
+          </a:effectRef>
+          <a:fontRef idx="minor">
+            <a:schemeClr val="tx1"/>
+          </a:fontRef>
+        </p:style>
+      </p:cxnSp>
+      <p:sp>
+        <p:nvSpPr>
+          <p:cNvPr id="26" name="Rectangle: Rounded Corners 25">
+            <a:extLst>
+              <a:ext uri="{FF2B5EF4-FFF2-40B4-BE49-F238E27FC236}">
+                <a16:creationId xmlns:a16="http://schemas.microsoft.com/office/drawing/2014/main" id="{6B7027A6-B506-4A83-B63F-B532726E9D94}"/>
+              </a:ext>
+            </a:extLst>
+          </p:cNvPr>
+          <p:cNvSpPr/>
+          <p:nvPr/>
+        </p:nvSpPr>
+        <p:spPr>
+          <a:xfrm>
+            <a:off x="6341090" y="4496642"/>
+            <a:ext cx="2807376" cy="438108"/>
+          </a:xfrm>
+          <a:prstGeom prst="roundRect">
+            <a:avLst/>
+          </a:prstGeom>
+          <a:solidFill>
+            <a:schemeClr val="accent3">
+              <a:lumMod val="60000"/>
+              <a:lumOff val="40000"/>
+            </a:schemeClr>
+          </a:solidFill>
+          <a:ln>
+            <a:solidFill>
+              <a:schemeClr val="bg2"/>
+            </a:solidFill>
+            <a:prstDash val="dash"/>
+          </a:ln>
+        </p:spPr>
+        <p:style>
+          <a:lnRef idx="2">
+            <a:schemeClr val="accent1">
+              <a:shade val="50000"/>
+            </a:schemeClr>
+          </a:lnRef>
+          <a:fillRef idx="1">
+            <a:schemeClr val="accent1"/>
+          </a:fillRef>
+          <a:effectRef idx="0">
+            <a:schemeClr val="accent1"/>
+          </a:effectRef>
+          <a:fontRef idx="minor">
+            <a:schemeClr val="lt1"/>
+          </a:fontRef>
+        </p:style>
+        <p:txBody>
+          <a:bodyPr rtlCol="0" anchor="ctr"/>
+          <a:lstStyle/>
+          <a:p>
+            <a:r>
+              <a:rPr lang="en-US" altLang="zh-CN" sz="1000" dirty="0">
+                <a:latin typeface="Clarendon Blk BT" panose="02040905050505020204" pitchFamily="18" charset="0"/>
+              </a:rPr>
+              <a:t>-: EventListener : map(MSG_ID, std::set&lt;listener*&gt;</a:t>
+            </a:r>
+            <a:endParaRPr lang="zh-CN" altLang="en-US" sz="1000" dirty="0">
+              <a:latin typeface="Clarendon Blk BT" panose="02040905050505020204" pitchFamily="18" charset="0"/>
+            </a:endParaRPr>
+          </a:p>
+        </p:txBody>
+      </p:sp>
+      <p:sp>
+        <p:nvSpPr>
+          <p:cNvPr id="28" name="Rectangle: Rounded Corners 27">
+            <a:extLst>
+              <a:ext uri="{FF2B5EF4-FFF2-40B4-BE49-F238E27FC236}">
+                <a16:creationId xmlns:a16="http://schemas.microsoft.com/office/drawing/2014/main" id="{32BB96C3-F82E-4239-B357-066BD897A2B1}"/>
+              </a:ext>
+            </a:extLst>
+          </p:cNvPr>
+          <p:cNvSpPr/>
+          <p:nvPr/>
+        </p:nvSpPr>
+        <p:spPr>
+          <a:xfrm>
+            <a:off x="6341090" y="2072471"/>
+            <a:ext cx="2807376" cy="353489"/>
+          </a:xfrm>
+          <a:prstGeom prst="roundRect">
+            <a:avLst/>
+          </a:prstGeom>
+          <a:solidFill>
+            <a:schemeClr val="accent6">
+              <a:lumMod val="60000"/>
+              <a:lumOff val="40000"/>
+            </a:schemeClr>
+          </a:solidFill>
+          <a:ln>
+            <a:solidFill>
+              <a:srgbClr val="FF0000"/>
+            </a:solidFill>
+            <a:prstDash val="dash"/>
+          </a:ln>
+        </p:spPr>
+        <p:style>
+          <a:lnRef idx="2">
+            <a:schemeClr val="accent1">
+              <a:shade val="50000"/>
+            </a:schemeClr>
+          </a:lnRef>
+          <a:fillRef idx="1">
+            <a:schemeClr val="accent1"/>
+          </a:fillRef>
+          <a:effectRef idx="0">
+            <a:schemeClr val="accent1"/>
+          </a:effectRef>
+          <a:fontRef idx="minor">
+            <a:schemeClr val="lt1"/>
+          </a:fontRef>
+        </p:style>
+        <p:txBody>
+          <a:bodyPr rtlCol="0" anchor="ctr"/>
+          <a:lstStyle/>
+          <a:p>
+            <a:r>
+              <a:rPr lang="en-US" altLang="zh-CN" sz="1000" dirty="0">
+                <a:latin typeface="Arial Black" panose="020B0A04020102020204" pitchFamily="34" charset="0"/>
+              </a:rPr>
+              <a:t>+: RegisterEventListener</a:t>
+            </a:r>
+            <a:endParaRPr lang="zh-CN" altLang="en-US" sz="1000" dirty="0">
+              <a:latin typeface="Arial Black" panose="020B0A04020102020204" pitchFamily="34" charset="0"/>
+            </a:endParaRPr>
+          </a:p>
+        </p:txBody>
+      </p:sp>
+      <p:sp>
+        <p:nvSpPr>
+          <p:cNvPr id="29" name="Rectangle: Rounded Corners 28">
+            <a:extLst>
+              <a:ext uri="{FF2B5EF4-FFF2-40B4-BE49-F238E27FC236}">
+                <a16:creationId xmlns:a16="http://schemas.microsoft.com/office/drawing/2014/main" id="{AA66D56F-C213-4308-B068-1E0627F39BF8}"/>
+              </a:ext>
+            </a:extLst>
+          </p:cNvPr>
+          <p:cNvSpPr/>
+          <p:nvPr/>
+        </p:nvSpPr>
+        <p:spPr>
+          <a:xfrm>
+            <a:off x="6341090" y="2455341"/>
+            <a:ext cx="2807376" cy="353489"/>
+          </a:xfrm>
+          <a:prstGeom prst="roundRect">
+            <a:avLst/>
+          </a:prstGeom>
+          <a:solidFill>
+            <a:schemeClr val="accent6">
+              <a:lumMod val="60000"/>
+              <a:lumOff val="40000"/>
+            </a:schemeClr>
+          </a:solidFill>
+          <a:ln>
+            <a:solidFill>
+              <a:srgbClr val="FF0000"/>
+            </a:solidFill>
+            <a:prstDash val="dash"/>
+          </a:ln>
+        </p:spPr>
+        <p:style>
+          <a:lnRef idx="2">
+            <a:schemeClr val="accent1">
+              <a:shade val="50000"/>
+            </a:schemeClr>
+          </a:lnRef>
+          <a:fillRef idx="1">
+            <a:schemeClr val="accent1"/>
+          </a:fillRef>
+          <a:effectRef idx="0">
+            <a:schemeClr val="accent1"/>
+          </a:effectRef>
+          <a:fontRef idx="minor">
+            <a:schemeClr val="lt1"/>
+          </a:fontRef>
+        </p:style>
+        <p:txBody>
+          <a:bodyPr rtlCol="0" anchor="ctr"/>
+          <a:lstStyle/>
+          <a:p>
+            <a:r>
+              <a:rPr lang="en-US" altLang="zh-CN" sz="1000" dirty="0">
+                <a:latin typeface="Arial Black" panose="020B0A04020102020204" pitchFamily="34" charset="0"/>
+              </a:rPr>
+              <a:t>+: UnregisterEventListener</a:t>
+            </a:r>
+            <a:endParaRPr lang="zh-CN" altLang="en-US" sz="1000" dirty="0">
+              <a:latin typeface="Arial Black" panose="020B0A04020102020204" pitchFamily="34" charset="0"/>
+            </a:endParaRPr>
+          </a:p>
+        </p:txBody>
+      </p:sp>
+      <p:sp>
+        <p:nvSpPr>
+          <p:cNvPr id="30" name="Rectangle: Rounded Corners 29">
+            <a:extLst>
+              <a:ext uri="{FF2B5EF4-FFF2-40B4-BE49-F238E27FC236}">
+                <a16:creationId xmlns:a16="http://schemas.microsoft.com/office/drawing/2014/main" id="{3F07B5E9-93C6-4C54-8F8A-D4590BD44468}"/>
+              </a:ext>
+            </a:extLst>
+          </p:cNvPr>
+          <p:cNvSpPr/>
+          <p:nvPr/>
+        </p:nvSpPr>
+        <p:spPr>
+          <a:xfrm>
+            <a:off x="6341090" y="3260567"/>
+            <a:ext cx="2807376" cy="353489"/>
+          </a:xfrm>
+          <a:prstGeom prst="roundRect">
+            <a:avLst/>
+          </a:prstGeom>
+          <a:solidFill>
+            <a:schemeClr val="accent6">
+              <a:lumMod val="60000"/>
+              <a:lumOff val="40000"/>
+            </a:schemeClr>
+          </a:solidFill>
+          <a:ln>
+            <a:noFill/>
+            <a:prstDash val="dash"/>
+          </a:ln>
+        </p:spPr>
+        <p:style>
+          <a:lnRef idx="2">
+            <a:schemeClr val="accent1">
+              <a:shade val="50000"/>
+            </a:schemeClr>
+          </a:lnRef>
+          <a:fillRef idx="1">
+            <a:schemeClr val="accent1"/>
+          </a:fillRef>
+          <a:effectRef idx="0">
+            <a:schemeClr val="accent1"/>
+          </a:effectRef>
+          <a:fontRef idx="minor">
+            <a:schemeClr val="lt1"/>
+          </a:fontRef>
+        </p:style>
+        <p:txBody>
+          <a:bodyPr rtlCol="0" anchor="ctr"/>
+          <a:lstStyle/>
+          <a:p>
+            <a:r>
+              <a:rPr lang="en-US" altLang="zh-CN" sz="1000" dirty="0">
+                <a:latin typeface="Arial Black" panose="020B0A04020102020204" pitchFamily="34" charset="0"/>
+              </a:rPr>
+              <a:t>*: RegisterListener</a:t>
+            </a:r>
+            <a:endParaRPr lang="zh-CN" altLang="en-US" sz="1000" dirty="0">
+              <a:latin typeface="Arial Black" panose="020B0A04020102020204" pitchFamily="34" charset="0"/>
+            </a:endParaRPr>
+          </a:p>
+        </p:txBody>
+      </p:sp>
+      <p:sp>
+        <p:nvSpPr>
+          <p:cNvPr id="31" name="Rectangle: Rounded Corners 30">
+            <a:extLst>
+              <a:ext uri="{FF2B5EF4-FFF2-40B4-BE49-F238E27FC236}">
+                <a16:creationId xmlns:a16="http://schemas.microsoft.com/office/drawing/2014/main" id="{194DD8E0-DCCC-40CB-B71B-8441CF2708AB}"/>
+              </a:ext>
+            </a:extLst>
+          </p:cNvPr>
+          <p:cNvSpPr/>
+          <p:nvPr/>
+        </p:nvSpPr>
+        <p:spPr>
+          <a:xfrm>
+            <a:off x="6341090" y="3652239"/>
+            <a:ext cx="2807376" cy="353489"/>
+          </a:xfrm>
+          <a:prstGeom prst="roundRect">
+            <a:avLst/>
+          </a:prstGeom>
+          <a:solidFill>
+            <a:schemeClr val="accent6">
+              <a:lumMod val="60000"/>
+              <a:lumOff val="40000"/>
+            </a:schemeClr>
+          </a:solidFill>
+          <a:ln>
+            <a:noFill/>
+            <a:prstDash val="dash"/>
+          </a:ln>
+        </p:spPr>
+        <p:style>
+          <a:lnRef idx="2">
+            <a:schemeClr val="accent1">
+              <a:shade val="50000"/>
+            </a:schemeClr>
+          </a:lnRef>
+          <a:fillRef idx="1">
+            <a:schemeClr val="accent1"/>
+          </a:fillRef>
+          <a:effectRef idx="0">
+            <a:schemeClr val="accent1"/>
+          </a:effectRef>
+          <a:fontRef idx="minor">
+            <a:schemeClr val="lt1"/>
+          </a:fontRef>
+        </p:style>
+        <p:txBody>
+          <a:bodyPr rtlCol="0" anchor="ctr"/>
+          <a:lstStyle/>
+          <a:p>
+            <a:r>
+              <a:rPr lang="en-US" altLang="zh-CN" sz="1000" dirty="0">
+                <a:latin typeface="Arial Black" panose="020B0A04020102020204" pitchFamily="34" charset="0"/>
+              </a:rPr>
+              <a:t>*: UnregisterListener</a:t>
+            </a:r>
+            <a:endParaRPr lang="zh-CN" altLang="en-US" sz="1000" dirty="0">
+              <a:latin typeface="Arial Black" panose="020B0A04020102020204" pitchFamily="34" charset="0"/>
+            </a:endParaRPr>
+          </a:p>
+        </p:txBody>
+      </p:sp>
+    </p:spTree>
+    <p:extLst>
+      <p:ext uri="{BB962C8B-B14F-4D97-AF65-F5344CB8AC3E}">
+        <p14:creationId xmlns:p14="http://schemas.microsoft.com/office/powerpoint/2010/main" val="606250742"/>
+      </p:ext>
+    </p:extLst>
+  </p:cSld>
+  <p:clrMapOvr>
+    <a:masterClrMapping/>
+  </p:clrMapOvr>
+</p:sld>
+</file>
+
+<file path=ppt/slides/slide32.xml><?xml version="1.0" encoding="utf-8"?>
+<p:sld xmlns:a="http://schemas.openxmlformats.org/drawingml/2006/main" xmlns:r="http://schemas.openxmlformats.org/officeDocument/2006/relationships" xmlns:p="http://schemas.openxmlformats.org/presentationml/2006/main">
+  <p:cSld>
+    <p:spTree>
+      <p:nvGrpSpPr>
+        <p:cNvPr id="1" name=""/>
+        <p:cNvGrpSpPr/>
+        <p:nvPr/>
+      </p:nvGrpSpPr>
+      <p:grpSpPr>
+        <a:xfrm>
+          <a:off x="0" y="0"/>
+          <a:ext cx="0" cy="0"/>
+          <a:chOff x="0" y="0"/>
+          <a:chExt cx="0" cy="0"/>
+        </a:xfrm>
+      </p:grpSpPr>
+      <p:sp>
+        <p:nvSpPr>
+          <p:cNvPr id="2" name="TextBox 1">
+            <a:extLst>
+              <a:ext uri="{FF2B5EF4-FFF2-40B4-BE49-F238E27FC236}">
+                <a16:creationId xmlns:a16="http://schemas.microsoft.com/office/drawing/2014/main" id="{6616D8AB-9DB0-4F58-B6DE-0689A6510426}"/>
+              </a:ext>
+            </a:extLst>
+          </p:cNvPr>
+          <p:cNvSpPr txBox="1"/>
+          <p:nvPr/>
+        </p:nvSpPr>
+        <p:spPr>
+          <a:xfrm>
+            <a:off x="562708" y="432079"/>
+            <a:ext cx="1571264" cy="369332"/>
+          </a:xfrm>
+          <a:prstGeom prst="rect">
+            <a:avLst/>
+          </a:prstGeom>
+          <a:noFill/>
+        </p:spPr>
+        <p:txBody>
+          <a:bodyPr wrap="none" rtlCol="0">
+            <a:spAutoFit/>
+          </a:bodyPr>
+          <a:lstStyle/>
+          <a:p>
+            <a:r>
+              <a:rPr lang="en-US" altLang="zh-CN" dirty="0">
+                <a:latin typeface="Clarendon Blk BT" panose="02040905050505020204" pitchFamily="18" charset="0"/>
+              </a:rPr>
+              <a:t>PGListener</a:t>
+            </a:r>
+            <a:endParaRPr lang="zh-CN" altLang="en-US" dirty="0">
+              <a:latin typeface="Clarendon Blk BT" panose="02040905050505020204" pitchFamily="18" charset="0"/>
+            </a:endParaRPr>
+          </a:p>
+        </p:txBody>
+      </p:sp>
+      <p:sp>
+        <p:nvSpPr>
+          <p:cNvPr id="20" name="Rectangle: Diagonal Corners Rounded 19">
+            <a:extLst>
+              <a:ext uri="{FF2B5EF4-FFF2-40B4-BE49-F238E27FC236}">
+                <a16:creationId xmlns:a16="http://schemas.microsoft.com/office/drawing/2014/main" id="{56D5BA8E-739B-4034-BFE6-0ACBB3A95E60}"/>
+              </a:ext>
+            </a:extLst>
+          </p:cNvPr>
+          <p:cNvSpPr/>
+          <p:nvPr/>
+        </p:nvSpPr>
+        <p:spPr>
+          <a:xfrm>
+            <a:off x="562708" y="850204"/>
+            <a:ext cx="2807376" cy="2096372"/>
+          </a:xfrm>
+          <a:prstGeom prst="round2DiagRect">
+            <a:avLst>
+              <a:gd name="adj1" fmla="val 6397"/>
+              <a:gd name="adj2" fmla="val 4890"/>
+            </a:avLst>
+          </a:prstGeom>
+          <a:solidFill>
+            <a:schemeClr val="accent1">
+              <a:lumMod val="60000"/>
+              <a:lumOff val="40000"/>
+            </a:schemeClr>
+          </a:solidFill>
+          <a:ln w="9525">
+            <a:prstDash val="dash"/>
+          </a:ln>
+        </p:spPr>
+        <p:style>
+          <a:lnRef idx="2">
+            <a:schemeClr val="accent1">
+              <a:shade val="50000"/>
+            </a:schemeClr>
+          </a:lnRef>
+          <a:fillRef idx="1">
+            <a:schemeClr val="accent1"/>
+          </a:fillRef>
+          <a:effectRef idx="0">
+            <a:schemeClr val="accent1"/>
+          </a:effectRef>
+          <a:fontRef idx="minor">
+            <a:schemeClr val="lt1"/>
+          </a:fontRef>
+        </p:style>
+        <p:txBody>
+          <a:bodyPr rtlCol="0" anchor="t" anchorCtr="1"/>
+          <a:lstStyle/>
+          <a:p>
+            <a:pPr algn="ctr"/>
+            <a:r>
+              <a:rPr lang="en-US" altLang="zh-CN" dirty="0">
+                <a:latin typeface="Britannic Bold" panose="020B0903060703020204" pitchFamily="34" charset="0"/>
+              </a:rPr>
+              <a:t>CListener</a:t>
+            </a:r>
+            <a:endParaRPr lang="zh-CN" altLang="en-US" dirty="0">
+              <a:latin typeface="Britannic Bold" panose="020B0903060703020204" pitchFamily="34" charset="0"/>
+            </a:endParaRPr>
+          </a:p>
+        </p:txBody>
+      </p:sp>
+      <p:sp>
+        <p:nvSpPr>
+          <p:cNvPr id="34" name="Rectangle: Rounded Corners 33">
+            <a:extLst>
+              <a:ext uri="{FF2B5EF4-FFF2-40B4-BE49-F238E27FC236}">
+                <a16:creationId xmlns:a16="http://schemas.microsoft.com/office/drawing/2014/main" id="{387D6FE2-F6DC-42DB-95F4-E30A7E489605}"/>
+              </a:ext>
+            </a:extLst>
+          </p:cNvPr>
+          <p:cNvSpPr/>
+          <p:nvPr/>
+        </p:nvSpPr>
+        <p:spPr>
+          <a:xfrm>
+            <a:off x="562708" y="1349884"/>
+            <a:ext cx="2807376" cy="334986"/>
+          </a:xfrm>
+          <a:prstGeom prst="roundRect">
+            <a:avLst/>
+          </a:prstGeom>
+          <a:solidFill>
+            <a:schemeClr val="accent6">
+              <a:lumMod val="60000"/>
+              <a:lumOff val="40000"/>
+            </a:schemeClr>
+          </a:solidFill>
+          <a:ln w="12700" cmpd="sng">
+            <a:solidFill>
+              <a:srgbClr val="FF0000"/>
+            </a:solidFill>
+            <a:prstDash val="dash"/>
+          </a:ln>
+        </p:spPr>
+        <p:style>
+          <a:lnRef idx="2">
+            <a:schemeClr val="accent1">
+              <a:shade val="50000"/>
+            </a:schemeClr>
+          </a:lnRef>
+          <a:fillRef idx="1">
+            <a:schemeClr val="accent1"/>
+          </a:fillRef>
+          <a:effectRef idx="0">
+            <a:schemeClr val="accent1"/>
+          </a:effectRef>
+          <a:fontRef idx="minor">
+            <a:schemeClr val="lt1"/>
+          </a:fontRef>
+        </p:style>
+        <p:txBody>
+          <a:bodyPr rtlCol="0" anchor="ctr"/>
+          <a:lstStyle/>
+          <a:p>
+            <a:pPr algn="ctr"/>
+            <a:r>
+              <a:rPr lang="en-US" altLang="zh-CN" sz="1400" dirty="0">
+                <a:latin typeface="Arial Black" panose="020B0A04020102020204" pitchFamily="34" charset="0"/>
+              </a:rPr>
+              <a:t>OnEventFired</a:t>
+            </a:r>
+            <a:endParaRPr lang="zh-CN" altLang="en-US" sz="1400" dirty="0">
+              <a:latin typeface="Arial Black" panose="020B0A04020102020204" pitchFamily="34" charset="0"/>
+            </a:endParaRPr>
+          </a:p>
+        </p:txBody>
+      </p:sp>
     </p:spTree>
     <p:extLst>
       <p:ext uri="{BB962C8B-B14F-4D97-AF65-F5344CB8AC3E}">
@@ -25674,7 +29275,7 @@
 </p:sld>
 </file>
 
-<file path=ppt/slides/slide31.xml><?xml version="1.0" encoding="utf-8"?>
+<file path=ppt/slides/slide33.xml><?xml version="1.0" encoding="utf-8"?>
 <p:sld xmlns:a="http://schemas.openxmlformats.org/drawingml/2006/main" xmlns:r="http://schemas.openxmlformats.org/officeDocument/2006/relationships" xmlns:p="http://schemas.openxmlformats.org/presentationml/2006/main">
   <p:cSld>
     <p:spTree>

</xml_diff>